<commit_message>
works with visual, but long legend
</commit_message>
<xml_diff>
--- a/Reports/Midterm Presentation.pptx
+++ b/Reports/Midterm Presentation.pptx
@@ -896,8 +896,8 @@
         <a:lstStyle/>
         <a:p>
           <a:r>
-            <a:rPr lang="en-US"/>
-            <a:t>Latent variable models (LVMs) are used to capture the dynamics of neural circuits given recordings of signals from the brain </a:t>
+            <a:rPr lang="en-US" dirty="0"/>
+            <a:t>Add monkey (bench mark) brain/task + neural data (the real “ground truth”)</a:t>
           </a:r>
         </a:p>
       </dgm:t>
@@ -931,9 +931,10 @@
         <a:bodyPr/>
         <a:lstStyle/>
         <a:p>
+          <a:pPr rtl="0"/>
           <a:r>
-            <a:rPr lang="en-US"/>
-            <a:t>LVMs assume that the dynamical system remains fixed. However, the brain is continuously evolving with time, i.e. ’learning’</a:t>
+            <a:rPr lang="en-US" dirty="0"/>
+            <a:t>illustrate the dynamics of the monkey brain aren’t constant (can use arrows to dub)</a:t>
           </a:r>
         </a:p>
       </dgm:t>
@@ -967,15 +968,7 @@
         <a:bodyPr/>
         <a:lstStyle/>
         <a:p>
-          <a:r>
-            <a:rPr lang="en-US"/>
-            <a:t>We study the novel scenario of fitting LVMs to a learning brain using a student-teacher setting </a:t>
-          </a:r>
-          <a:r>
-            <a:rPr lang="en-US" i="1"/>
-            <a:t>(“How?” slide)  </a:t>
-          </a:r>
-          <a:endParaRPr lang="en-US"/>
+          <a:endParaRPr lang="en-US" dirty="0"/>
         </a:p>
       </dgm:t>
     </dgm:pt>
@@ -1009,7 +1002,10 @@
         <a:lstStyle/>
         <a:p>
           <a:pPr rtl="0"/>
-          <a:endParaRPr lang="en-US" dirty="0"/>
+          <a:r>
+            <a:rPr lang="en-US" dirty="0"/>
+            <a:t>Show student-teacher settings (replace monkey and dynamics with model) </a:t>
+          </a:r>
         </a:p>
       </dgm:t>
     </dgm:pt>
@@ -1267,12 +1263,12 @@
         <a:fontRef idx="minor"/>
       </dsp:style>
       <dsp:txBody>
-        <a:bodyPr spcFirstLastPara="0" vert="horz" wrap="square" lIns="83820" tIns="83820" rIns="83820" bIns="83820" numCol="1" spcCol="1270" anchor="t" anchorCtr="0">
+        <a:bodyPr spcFirstLastPara="0" vert="horz" wrap="square" lIns="106680" tIns="106680" rIns="106680" bIns="106680" numCol="1" spcCol="1270" anchor="t" anchorCtr="0">
           <a:noAutofit/>
         </a:bodyPr>
         <a:lstStyle/>
         <a:p>
-          <a:pPr marL="0" lvl="0" indent="0" algn="l" defTabSz="977900">
+          <a:pPr marL="0" lvl="0" indent="0" algn="l" defTabSz="1244600">
             <a:lnSpc>
               <a:spcPct val="90000"/>
             </a:lnSpc>
@@ -1285,8 +1281,8 @@
             <a:buNone/>
           </a:pPr>
           <a:r>
-            <a:rPr lang="en-US" sz="2200" kern="1200"/>
-            <a:t>Latent variable models (LVMs) are used to capture the dynamics of neural circuits given recordings of signals from the brain </a:t>
+            <a:rPr lang="en-US" sz="2800" kern="1200" dirty="0"/>
+            <a:t>Add monkey (bench mark) brain/task + neural data (the real “ground truth”)</a:t>
           </a:r>
         </a:p>
       </dsp:txBody>
@@ -1407,12 +1403,12 @@
         <a:fontRef idx="minor"/>
       </dsp:style>
       <dsp:txBody>
-        <a:bodyPr spcFirstLastPara="0" vert="horz" wrap="square" lIns="83820" tIns="83820" rIns="83820" bIns="83820" numCol="1" spcCol="1270" anchor="t" anchorCtr="0">
+        <a:bodyPr spcFirstLastPara="0" vert="horz" wrap="square" lIns="106680" tIns="106680" rIns="106680" bIns="106680" numCol="1" spcCol="1270" anchor="t" anchorCtr="0">
           <a:noAutofit/>
         </a:bodyPr>
         <a:lstStyle/>
         <a:p>
-          <a:pPr marL="0" lvl="0" indent="0" algn="l" defTabSz="977900">
+          <a:pPr marL="0" lvl="0" indent="0" algn="l" defTabSz="1244600" rtl="0">
             <a:lnSpc>
               <a:spcPct val="90000"/>
             </a:lnSpc>
@@ -1425,8 +1421,8 @@
             <a:buNone/>
           </a:pPr>
           <a:r>
-            <a:rPr lang="en-US" sz="2200" kern="1200"/>
-            <a:t>LVMs assume that the dynamical system remains fixed. However, the brain is continuously evolving with time, i.e. ’learning’</a:t>
+            <a:rPr lang="en-US" sz="2800" kern="1200" dirty="0"/>
+            <a:t>illustrate the dynamics of the monkey brain aren’t constant (can use arrows to dub)</a:t>
           </a:r>
         </a:p>
       </dsp:txBody>
@@ -1547,12 +1543,12 @@
         <a:fontRef idx="minor"/>
       </dsp:style>
       <dsp:txBody>
-        <a:bodyPr spcFirstLastPara="0" vert="horz" wrap="square" lIns="83820" tIns="83820" rIns="83820" bIns="83820" numCol="1" spcCol="1270" anchor="t" anchorCtr="0">
+        <a:bodyPr spcFirstLastPara="0" vert="horz" wrap="square" lIns="106680" tIns="106680" rIns="106680" bIns="106680" numCol="1" spcCol="1270" anchor="t" anchorCtr="0">
           <a:noAutofit/>
         </a:bodyPr>
         <a:lstStyle/>
         <a:p>
-          <a:pPr marL="0" lvl="0" indent="0" algn="l" defTabSz="977900">
+          <a:pPr marL="0" lvl="0" indent="0" algn="l" defTabSz="1244600">
             <a:lnSpc>
               <a:spcPct val="90000"/>
             </a:lnSpc>
@@ -1564,15 +1560,7 @@
             </a:spcAft>
             <a:buNone/>
           </a:pPr>
-          <a:r>
-            <a:rPr lang="en-US" sz="2200" kern="1200"/>
-            <a:t>We study the novel scenario of fitting LVMs to a learning brain using a student-teacher setting </a:t>
-          </a:r>
-          <a:r>
-            <a:rPr lang="en-US" sz="2200" i="1" kern="1200"/>
-            <a:t>(“How?” slide)  </a:t>
-          </a:r>
-          <a:endParaRPr lang="en-US" sz="2200" kern="1200"/>
+          <a:endParaRPr lang="en-US" sz="2800" kern="1200" dirty="0"/>
         </a:p>
       </dsp:txBody>
       <dsp:txXfrm>
@@ -1692,12 +1680,12 @@
         <a:fontRef idx="minor"/>
       </dsp:style>
       <dsp:txBody>
-        <a:bodyPr spcFirstLastPara="0" vert="horz" wrap="square" lIns="83820" tIns="83820" rIns="83820" bIns="83820" numCol="1" spcCol="1270" anchor="t" anchorCtr="0">
+        <a:bodyPr spcFirstLastPara="0" vert="horz" wrap="square" lIns="106680" tIns="106680" rIns="106680" bIns="106680" numCol="1" spcCol="1270" anchor="t" anchorCtr="0">
           <a:noAutofit/>
         </a:bodyPr>
         <a:lstStyle/>
         <a:p>
-          <a:pPr marL="0" lvl="0" indent="0" algn="l" defTabSz="977900" rtl="0">
+          <a:pPr marL="0" lvl="0" indent="0" algn="l" defTabSz="1244600" rtl="0">
             <a:lnSpc>
               <a:spcPct val="90000"/>
             </a:lnSpc>
@@ -1709,7 +1697,10 @@
             </a:spcAft>
             <a:buNone/>
           </a:pPr>
-          <a:endParaRPr lang="en-US" sz="2200" kern="1200" dirty="0"/>
+          <a:r>
+            <a:rPr lang="en-US" sz="2800" kern="1200" dirty="0"/>
+            <a:t>Show student-teacher settings (replace monkey and dynamics with model) </a:t>
+          </a:r>
         </a:p>
       </dsp:txBody>
       <dsp:txXfrm>
@@ -3237,23 +3228,51 @@
           <inkml:channelProperty channel="F" name="resolution" value="0" units="1/dev"/>
         </inkml:channelProperties>
       </inkml:inkSource>
-      <inkml:timestamp xml:id="ts0" timeString="2024-10-07T00:18:14.899"/>
+      <inkml:timestamp xml:id="ts0" timeString="2024-10-07T05:39:29.789"/>
+    </inkml:context>
+    <inkml:brush xml:id="br0">
+      <inkml:brushProperty name="width" value="0.05" units="cm"/>
+      <inkml:brushProperty name="height" value="0.05" units="cm"/>
+      <inkml:brushProperty name="color" value="#E71224"/>
+    </inkml:brush>
+  </inkml:definitions>
+  <inkml:trace contextRef="#ctx0" brushRef="#br0">1 18 16888,'23'-10'0,"35"4"0,17 5 0,18 6 0,9 8 0,-31-3 0,4 3 0,3 3 0,1 5-1389,7 9 1,2 6-1,1 5 1,1 3 1388,-7-1 0,1 3 0,1 3 0,2 2 0,0 2-179,-16-9 0,1 2 0,1 1 1,1 2-1,0 1 0,1 0 0,0 2 179,-3-1 0,1 1 0,1 1 0,1 1 0,-1 1 0,1 0 0,0 1 0,0 0-68,3 2 0,0 1 1,0 0-1,1 0 0,-1 2 1,1 0-1,-1 1 0,-1 1 68,-6-5 0,-1 1 0,0 2 0,0 0 0,0 0 0,0 1 0,-1 0 0,0 1 0,0 0-150,0 0 0,0 0 0,0 1 0,0 1 0,-1-1 1,0 1-1,-1 0 0,-1 1 0,0-1 150,-1 0 0,0 1 0,0 1 0,-1 0 0,0 0 0,-2-1 0,-1 0 0,-3-2 0,-1-2 0,10 13 0,-4-3 0,-2-1 0,-1 0 0,-1 1 0,2 2 0,-4-2 0,2 2 0,1 2 0,-2-1 0,-1 1 0,-3-3 0,-4-2 0,2 7 0,-4-1 0,-3-3 0,0 0 0,1-1 0,-1-3 0,1-1 0,-1-1 0,0 1 0,0 2 173,2 5 0,0 4 1,-1 0-1,-1-4 0,-4-6-173,4 6 0,-4-6 0,-2-1 432,-1 1 0,-1-1 0,0 0-432,2-1 0,0 1 0,-5-8 1445,-7-9 0,-3-3-1445,5 8 0,0-3 0,15 23 0,-21-34 0,-2-11 4531,-12-14-4531,-1-6 3205,-4-17-3205,-41 0 0,27-7 0,-31 6 0</inkml:trace>
+</inkml:ink>
+</file>
+
+<file path=ppt/ink/ink10.xml><?xml version="1.0" encoding="utf-8"?>
+<inkml:ink xmlns:inkml="http://www.w3.org/2003/InkML">
+  <inkml:definitions>
+    <inkml:context xml:id="ctx0">
+      <inkml:inkSource xml:id="inkSrc0">
+        <inkml:traceFormat>
+          <inkml:channel name="X" type="integer" min="-2.14748E9" max="2.14748E9" units="cm"/>
+          <inkml:channel name="Y" type="integer" min="-2.14748E9" max="2.14748E9" units="cm"/>
+          <inkml:channel name="F" type="integer" max="32767" units="dev"/>
+        </inkml:traceFormat>
+        <inkml:channelProperties>
+          <inkml:channelProperty channel="X" name="resolution" value="1000" units="1/cm"/>
+          <inkml:channelProperty channel="Y" name="resolution" value="1000" units="1/cm"/>
+          <inkml:channelProperty channel="F" name="resolution" value="0" units="1/dev"/>
+        </inkml:channelProperties>
+      </inkml:inkSource>
+      <inkml:timestamp xml:id="ts0" timeString="2024-10-07T00:18:14.907"/>
     </inkml:context>
     <inkml:brush xml:id="br0">
       <inkml:brushProperty name="width" value="0.1" units="cm"/>
       <inkml:brushProperty name="height" value="0.1" units="cm"/>
       <inkml:brushProperty name="color" value="#AE198D"/>
       <inkml:brushProperty name="inkEffects" value="galaxy"/>
-      <inkml:brushProperty name="anchorX" value="0"/>
-      <inkml:brushProperty name="anchorY" value="0"/>
+      <inkml:brushProperty name="anchorX" value="-280851"/>
+      <inkml:brushProperty name="anchorY" value="-263575.53125"/>
       <inkml:brushProperty name="scaleFactor" value="0.5"/>
     </inkml:brush>
   </inkml:definitions>
-  <inkml:trace contextRef="#ctx0" brushRef="#br0">0 1 24575,'0'23'0,"0"13"0,0-14 0,0 26 0,0-21 0,0 19 0,0 0 0,0-10 0,0 3 0,0-16 0,0-2 0,0-8 0,0-1 0,0-5 0,0 1 0,0-1 0,0 1 0,0-1 0,0 1 0,0 3 0,0 2 0,0 4 0,0-5 0,0 4 0,0-8 0,0 4 0,0-5 0,0 1 0,0-1 0,0 1 0,4-1 0,-4-5 0,4-7 0,-4-3 0,0-3 0,0 4 0,0-1 0,-4 1 0,4-1 0,-4 4 0,4 1 0</inkml:trace>
+  <inkml:trace contextRef="#ctx0" brushRef="#br0">0 7 24575,'10'-4'0,"0"1"0,0 3 0,-3 0 0,6 0 0,-6 0 0,5 0 0,-1 3 0,2 1 0,-2 2 0,-2-2 0,-2-1 0,8 1 0,-7 0 0,10 3 0,-10 0 0,1-1 0,-2 1 0,0-1 0,2 1 0,-1 3 0,1-3 0,-5 3 0,-1-4 0,0 4 0,0-3 0,1 3 0,-1-4 0,-3 1 0,0 3 0,0-3 0,0 3 0,0-4 0,-3 4 0,-1-3 0,-2 3 0,-1-4 0,0 1 0,0 0 0,1-1 0,-1 1 0,0-3 0,0-2 0,1-2 0,-1 0 0,0 0 0,1 0 0,-1 0 0,0 0 0,0 0 0,1-3 0,2 0 0,1-4 0,6 0 0,0 4 0,4 0 0,3 5 0,0-1 0,3 5 0,1-2 0,-1 2 0,0 1 0,1 0 0,-1 2 0,0-1 0,1 4 0,-1-4 0,0 4 0,1-5 0,-4 3 0,0-6 0,-1 2 0,-1-3 0,1 4 0,1 0 0,0-1 0,1 1 0,-2-4 0,1 3 0,-3-2 0,6 0 0,-6-1 0,6 0 0,-6-3 0,3 3 0,-1-3 0,2 0 0,-1 0 0,3 0 0,-3 0 0,3 0 0,-2 0 0,-2 0 0,-2 0 0,0 0 0,-1 0 0,1 0 0,-4 0 0,0 0 0</inkml:trace>
 </inkml:ink>
 </file>
 
-<file path=ppt/ink/ink10.xml><?xml version="1.0" encoding="utf-8"?>
+<file path=ppt/ink/ink11.xml><?xml version="1.0" encoding="utf-8"?>
 <inkml:ink xmlns:inkml="http://www.w3.org/2003/InkML">
   <inkml:definitions>
     <inkml:context xml:id="ctx0">
@@ -3280,7 +3299,7 @@
 </inkml:ink>
 </file>
 
-<file path=ppt/ink/ink11.xml><?xml version="1.0" encoding="utf-8"?>
+<file path=ppt/ink/ink12.xml><?xml version="1.0" encoding="utf-8"?>
 <inkml:ink xmlns:inkml="http://www.w3.org/2003/InkML">
   <inkml:definitions>
     <inkml:context xml:id="ctx0">
@@ -3307,7 +3326,7 @@
 </inkml:ink>
 </file>
 
-<file path=ppt/ink/ink12.xml><?xml version="1.0" encoding="utf-8"?>
+<file path=ppt/ink/ink13.xml><?xml version="1.0" encoding="utf-8"?>
 <inkml:ink xmlns:inkml="http://www.w3.org/2003/InkML">
   <inkml:definitions>
     <inkml:context xml:id="ctx0">
@@ -3334,7 +3353,7 @@
 </inkml:ink>
 </file>
 
-<file path=ppt/ink/ink13.xml><?xml version="1.0" encoding="utf-8"?>
+<file path=ppt/ink/ink14.xml><?xml version="1.0" encoding="utf-8"?>
 <inkml:ink xmlns:inkml="http://www.w3.org/2003/InkML">
   <inkml:definitions>
     <inkml:context xml:id="ctx0">
@@ -3362,7 +3381,7 @@
 </inkml:ink>
 </file>
 
-<file path=ppt/ink/ink14.xml><?xml version="1.0" encoding="utf-8"?>
+<file path=ppt/ink/ink15.xml><?xml version="1.0" encoding="utf-8"?>
 <inkml:ink xmlns:inkml="http://www.w3.org/2003/InkML">
   <inkml:definitions>
     <inkml:context xml:id="ctx0">
@@ -3390,7 +3409,7 @@
 </inkml:ink>
 </file>
 
-<file path=ppt/ink/ink15.xml><?xml version="1.0" encoding="utf-8"?>
+<file path=ppt/ink/ink16.xml><?xml version="1.0" encoding="utf-8"?>
 <inkml:ink xmlns:inkml="http://www.w3.org/2003/InkML">
   <inkml:definitions>
     <inkml:context xml:id="ctx0">
@@ -3418,7 +3437,7 @@
 </inkml:ink>
 </file>
 
-<file path=ppt/ink/ink16.xml><?xml version="1.0" encoding="utf-8"?>
+<file path=ppt/ink/ink17.xml><?xml version="1.0" encoding="utf-8"?>
 <inkml:ink xmlns:inkml="http://www.w3.org/2003/InkML">
   <inkml:definitions>
     <inkml:context xml:id="ctx0">
@@ -3446,7 +3465,7 @@
 </inkml:ink>
 </file>
 
-<file path=ppt/ink/ink17.xml><?xml version="1.0" encoding="utf-8"?>
+<file path=ppt/ink/ink18.xml><?xml version="1.0" encoding="utf-8"?>
 <inkml:ink xmlns:inkml="http://www.w3.org/2003/InkML">
   <inkml:definitions>
     <inkml:context xml:id="ctx0">
@@ -3474,7 +3493,7 @@
 </inkml:ink>
 </file>
 
-<file path=ppt/ink/ink18.xml><?xml version="1.0" encoding="utf-8"?>
+<file path=ppt/ink/ink19.xml><?xml version="1.0" encoding="utf-8"?>
 <inkml:ink xmlns:inkml="http://www.w3.org/2003/InkML">
   <inkml:definitions>
     <inkml:context xml:id="ctx0">
@@ -3502,7 +3521,39 @@
 </inkml:ink>
 </file>
 
-<file path=ppt/ink/ink19.xml><?xml version="1.0" encoding="utf-8"?>
+<file path=ppt/ink/ink2.xml><?xml version="1.0" encoding="utf-8"?>
+<inkml:ink xmlns:inkml="http://www.w3.org/2003/InkML">
+  <inkml:definitions>
+    <inkml:context xml:id="ctx0">
+      <inkml:inkSource xml:id="inkSrc0">
+        <inkml:traceFormat>
+          <inkml:channel name="X" type="integer" min="-2.14748E9" max="2.14748E9" units="cm"/>
+          <inkml:channel name="Y" type="integer" min="-2.14748E9" max="2.14748E9" units="cm"/>
+          <inkml:channel name="F" type="integer" max="32767" units="dev"/>
+        </inkml:traceFormat>
+        <inkml:channelProperties>
+          <inkml:channelProperty channel="X" name="resolution" value="1000" units="1/cm"/>
+          <inkml:channelProperty channel="Y" name="resolution" value="1000" units="1/cm"/>
+          <inkml:channelProperty channel="F" name="resolution" value="0" units="1/dev"/>
+        </inkml:channelProperties>
+      </inkml:inkSource>
+      <inkml:timestamp xml:id="ts0" timeString="2024-10-07T00:18:14.899"/>
+    </inkml:context>
+    <inkml:brush xml:id="br0">
+      <inkml:brushProperty name="width" value="0.1" units="cm"/>
+      <inkml:brushProperty name="height" value="0.1" units="cm"/>
+      <inkml:brushProperty name="color" value="#AE198D"/>
+      <inkml:brushProperty name="inkEffects" value="galaxy"/>
+      <inkml:brushProperty name="anchorX" value="0"/>
+      <inkml:brushProperty name="anchorY" value="0"/>
+      <inkml:brushProperty name="scaleFactor" value="0.5"/>
+    </inkml:brush>
+  </inkml:definitions>
+  <inkml:trace contextRef="#ctx0" brushRef="#br0">0 1 24575,'0'23'0,"0"13"0,0-14 0,0 26 0,0-21 0,0 19 0,0 0 0,0-10 0,0 3 0,0-16 0,0-2 0,0-8 0,0-1 0,0-5 0,0 1 0,0-1 0,0 1 0,0-1 0,0 1 0,0 3 0,0 2 0,0 4 0,0-5 0,0 4 0,0-8 0,0 4 0,0-5 0,0 1 0,0-1 0,0 1 0,4-1 0,-4-5 0,4-7 0,-4-3 0,0-3 0,0 4 0,0-1 0,-4 1 0,4-1 0,-4 4 0,4 1 0</inkml:trace>
+</inkml:ink>
+</file>
+
+<file path=ppt/ink/ink20.xml><?xml version="1.0" encoding="utf-8"?>
 <inkml:ink xmlns:inkml="http://www.w3.org/2003/InkML">
   <inkml:definitions>
     <inkml:context xml:id="ctx0">
@@ -3530,7 +3581,258 @@
 </inkml:ink>
 </file>
 
-<file path=ppt/ink/ink2.xml><?xml version="1.0" encoding="utf-8"?>
+<file path=ppt/ink/ink21.xml><?xml version="1.0" encoding="utf-8"?>
+<inkml:ink xmlns:inkml="http://www.w3.org/2003/InkML">
+  <inkml:definitions>
+    <inkml:context xml:id="ctx0">
+      <inkml:inkSource xml:id="inkSrc0">
+        <inkml:traceFormat>
+          <inkml:channel name="X" type="integer" min="-2.14748E9" max="2.14748E9" units="cm"/>
+          <inkml:channel name="Y" type="integer" min="-2.14748E9" max="2.14748E9" units="cm"/>
+          <inkml:channel name="F" type="integer" max="32767" units="dev"/>
+        </inkml:traceFormat>
+        <inkml:channelProperties>
+          <inkml:channelProperty channel="X" name="resolution" value="1000" units="1/cm"/>
+          <inkml:channelProperty channel="Y" name="resolution" value="1000" units="1/cm"/>
+          <inkml:channelProperty channel="F" name="resolution" value="0" units="1/dev"/>
+        </inkml:channelProperties>
+      </inkml:inkSource>
+      <inkml:timestamp xml:id="ts0" timeString="2024-10-07T00:18:14.918"/>
+    </inkml:context>
+    <inkml:brush xml:id="br0">
+      <inkml:brushProperty name="width" value="0.05" units="cm"/>
+      <inkml:brushProperty name="height" value="0.05" units="cm"/>
+      <inkml:brushProperty name="color" value="#AB008B"/>
+    </inkml:brush>
+  </inkml:definitions>
+  <inkml:trace contextRef="#ctx0" brushRef="#br0">41 0 24575,'-7'0'0,"0"3"0,0 1 0,1 5 0,-1 2 0,3-1 0,1 3 0,3-6 0,0 6 0,0-6 0,0 3 0,0-4 0,0 1 0,0-1 0,3 4 0,1-3 0,2 6 0,1-6 0,0 3 0,-1-6 0,1-1 0,0-3 0,-1 0 0,1 0 0,-1 0 0,1 0 0,0 0 0,-1 0 0,1 0 0,-1 0 0,4-3 0,-3 2 0,6-5 0,-6-1 0,3-3 0,0-1 0,-3 1 0,3 4 0,-7-1 0,0 0 0,-6-2 0,-1-2 0,-5-2 0,1 2 0,-4 1 0,4 4 0,-5-1 0,6 3 0,-3 1 0,3 3 0,1 0 0,-1 0 0,0 0 0,1 0 0,2 0 0,1 0 0</inkml:trace>
+</inkml:ink>
+</file>
+
+<file path=ppt/ink/ink22.xml><?xml version="1.0" encoding="utf-8"?>
+<inkml:ink xmlns:inkml="http://www.w3.org/2003/InkML">
+  <inkml:definitions>
+    <inkml:context xml:id="ctx0">
+      <inkml:inkSource xml:id="inkSrc0">
+        <inkml:traceFormat>
+          <inkml:channel name="X" type="integer" min="-2.14748E9" max="2.14748E9" units="cm"/>
+          <inkml:channel name="Y" type="integer" min="-2.14748E9" max="2.14748E9" units="cm"/>
+          <inkml:channel name="F" type="integer" max="32767" units="dev"/>
+        </inkml:traceFormat>
+        <inkml:channelProperties>
+          <inkml:channelProperty channel="X" name="resolution" value="1000" units="1/cm"/>
+          <inkml:channelProperty channel="Y" name="resolution" value="1000" units="1/cm"/>
+          <inkml:channelProperty channel="F" name="resolution" value="0" units="1/dev"/>
+        </inkml:channelProperties>
+      </inkml:inkSource>
+      <inkml:timestamp xml:id="ts0" timeString="2024-10-07T00:18:14.919"/>
+    </inkml:context>
+    <inkml:brush xml:id="br0">
+      <inkml:brushProperty name="width" value="0.05" units="cm"/>
+      <inkml:brushProperty name="height" value="0.05" units="cm"/>
+      <inkml:brushProperty name="color" value="#AB008B"/>
+    </inkml:brush>
+  </inkml:definitions>
+  <inkml:trace contextRef="#ctx0" brushRef="#br0">170 21 24575,'1'-11'0,"-2"4"0,-6 4 0,1 3 0,-1 0 0,0 3 0,0 9 0,-1 5 0,0 0 0,4-2 0,-2-5 0,5-3 0,-2 3 0,3 0 0,0 0 0,0 3 0,0 1 0,-3-1 0,-1 0 0,0 1 0,1-4 0,3 3 0,0-3 0,0 3 0,0 1 0,0-1 0,0 0 0,0 1 0,0-4 0,0 3 0,0-6 0,0 6 0,3-3 0,1 3 0,0-2 0,-1-2 0,0 1 0,-3-3 0,6 6 0,-2-6 0,2 6 0,-2-6 0,-1 3 0,0-1 0,1-1 0,-1 1 0,0-2 0,-3 0 0,0-1 0,0 1 0,0-1 0,0 1 0,-3 3 0,0-3 0,-4 3 0,0-7 0,-3 3 0,3-2 0,-6 0 0,6-2 0,-6-2 0,6 0 0,-3 0 0,3 0 0,0 0 0,1 0 0,-1 0 0,0 0 0,-3-3 0,3-3 0,3 1 0,2-1 0,5 6 0</inkml:trace>
+</inkml:ink>
+</file>
+
+<file path=ppt/ink/ink23.xml><?xml version="1.0" encoding="utf-8"?>
+<inkml:ink xmlns:inkml="http://www.w3.org/2003/InkML">
+  <inkml:definitions>
+    <inkml:context xml:id="ctx0">
+      <inkml:inkSource xml:id="inkSrc0">
+        <inkml:traceFormat>
+          <inkml:channel name="X" type="integer" min="-2.14748E9" max="2.14748E9" units="cm"/>
+          <inkml:channel name="Y" type="integer" min="-2.14748E9" max="2.14748E9" units="cm"/>
+          <inkml:channel name="F" type="integer" max="32767" units="dev"/>
+        </inkml:traceFormat>
+        <inkml:channelProperties>
+          <inkml:channelProperty channel="X" name="resolution" value="1000" units="1/cm"/>
+          <inkml:channelProperty channel="Y" name="resolution" value="1000" units="1/cm"/>
+          <inkml:channelProperty channel="F" name="resolution" value="0" units="1/dev"/>
+        </inkml:channelProperties>
+      </inkml:inkSource>
+      <inkml:timestamp xml:id="ts0" timeString="2024-10-07T00:18:14.920"/>
+    </inkml:context>
+    <inkml:brush xml:id="br0">
+      <inkml:brushProperty name="width" value="0.05" units="cm"/>
+      <inkml:brushProperty name="height" value="0.05" units="cm"/>
+      <inkml:brushProperty name="color" value="#AB008B"/>
+    </inkml:brush>
+  </inkml:definitions>
+  <inkml:trace contextRef="#ctx0" brushRef="#br0">35 1 24575,'-7'6'0,"-2"4"0,5-3 0,0 3 0,1-3 0,3 2 0,-3 2 0,3-1 0,-3 3 0,3-3 0,0 3 0,0-2 0,0 1 0,3-1 0,-3-1 0,6 3 0,-2-6 0,3 2 0,-1-2 0,1-3 0,-1-1 0,1-3 0,0 0 0,-1 0 0,1 0 0,-1 0 0,1 0 0,0 0 0,2 0 0,2-3 0,-1-1 0,0 0 0,-4-2 0,-2 3 0,-1-4 0,-3-3 0,0 3 0,0-3 0,0 3 0,0 0 0,0 1 0,-3-4 0,-1 0 0,-3-1 0,4 1 0,-3 1 0,2 1 0,0-2 0,-2 1 0,5 1 0,-5-1 0,3 5 0,-1 1 0,1 3 0</inkml:trace>
+</inkml:ink>
+</file>
+
+<file path=ppt/ink/ink24.xml><?xml version="1.0" encoding="utf-8"?>
+<inkml:ink xmlns:inkml="http://www.w3.org/2003/InkML">
+  <inkml:definitions>
+    <inkml:context xml:id="ctx0">
+      <inkml:inkSource xml:id="inkSrc0">
+        <inkml:traceFormat>
+          <inkml:channel name="X" type="integer" min="-2.14748E9" max="2.14748E9" units="cm"/>
+          <inkml:channel name="Y" type="integer" min="-2.14748E9" max="2.14748E9" units="cm"/>
+          <inkml:channel name="F" type="integer" max="32767" units="dev"/>
+        </inkml:traceFormat>
+        <inkml:channelProperties>
+          <inkml:channelProperty channel="X" name="resolution" value="1000" units="1/cm"/>
+          <inkml:channelProperty channel="Y" name="resolution" value="1000" units="1/cm"/>
+          <inkml:channelProperty channel="F" name="resolution" value="0" units="1/dev"/>
+        </inkml:channelProperties>
+      </inkml:inkSource>
+      <inkml:timestamp xml:id="ts0" timeString="2024-10-07T00:18:14.921"/>
+    </inkml:context>
+    <inkml:brush xml:id="br0">
+      <inkml:brushProperty name="width" value="0.05" units="cm"/>
+      <inkml:brushProperty name="height" value="0.05" units="cm"/>
+      <inkml:brushProperty name="color" value="#AB008B"/>
+    </inkml:brush>
+  </inkml:definitions>
+  <inkml:trace contextRef="#ctx0" brushRef="#br0">168 1 24575,'-7'0'0,"0"0"0,0 0 0,1 0 0,-4 3 0,3 1 0,-3 2 0,3 1 0,0-1 0,4 4 0,0-3 0,3 6 0,0-6 0,0 6 0,0-3 0,0 4 0,0-1 0,0 0 0,0 1 0,0-1 0,0-3 0,0 3 0,0-6 0,0 3 0,0-4 0,0 1 0,0 0 0,3 2 0,-3-1 0,3 1 0,-3-2 0,0 3 0,0-3 0,4 11 0,0-9 0,0 6 0,-1-9 0,-3 4 0,0-3 0,0 3 0,0-4 0,0 1 0,0 0 0,-3 2 0,0-1 0,-4 1 0,3-2 0,-2-1 0,2 1 0,-5 0 0,1-1 0,-4 1 0,4-4 0,-2 0 0,4-3 0,-1 0 0,0 0 0,0 0 0,1-3 0,2 0 0,1-1 0,3 1 0</inkml:trace>
+</inkml:ink>
+</file>
+
+<file path=ppt/ink/ink25.xml><?xml version="1.0" encoding="utf-8"?>
+<inkml:ink xmlns:inkml="http://www.w3.org/2003/InkML">
+  <inkml:definitions>
+    <inkml:context xml:id="ctx0">
+      <inkml:inkSource xml:id="inkSrc0">
+        <inkml:traceFormat>
+          <inkml:channel name="X" type="integer" min="-2.14748E9" max="2.14748E9" units="cm"/>
+          <inkml:channel name="Y" type="integer" min="-2.14748E9" max="2.14748E9" units="cm"/>
+          <inkml:channel name="F" type="integer" max="32767" units="dev"/>
+        </inkml:traceFormat>
+        <inkml:channelProperties>
+          <inkml:channelProperty channel="X" name="resolution" value="1000" units="1/cm"/>
+          <inkml:channelProperty channel="Y" name="resolution" value="1000" units="1/cm"/>
+          <inkml:channelProperty channel="F" name="resolution" value="0" units="1/dev"/>
+        </inkml:channelProperties>
+      </inkml:inkSource>
+      <inkml:timestamp xml:id="ts0" timeString="2024-10-07T00:18:14.922"/>
+    </inkml:context>
+    <inkml:brush xml:id="br0">
+      <inkml:brushProperty name="width" value="0.05" units="cm"/>
+      <inkml:brushProperty name="height" value="0.05" units="cm"/>
+      <inkml:brushProperty name="color" value="#AB008B"/>
+    </inkml:brush>
+  </inkml:definitions>
+  <inkml:trace contextRef="#ctx0" brushRef="#br0">8 1 24575,'-4'6'0,"1"1"0,3 0 0,0-1 0,0 1 0,0 0 0,0 2 0,0-1 0,0 1 0,0-2 0,0-1 0,0 1 0,0 3 0,0-3 0,0 3 0,3-1 0,-2-1 0,1 1 0,1 1 0,1-3 0,3 3 0,-1-4 0,1-2 0,0-1 0,2 0 0,-1 1 0,1-1 0,-2 0 0,-1-3 0,1 0 0,0 0 0,-1-3 0,-2-1 0,2-2 0,-3-1 0,1-3 0,-1 3 0,-3-3 0,0 0 0,0 3 0,0-3 0,0 3 0,0 1 0,0-1 0,0 0 0,0-3 0,0 3 0,0-3 0,0 4 0,0-1 0,0 0 0,-3 0 0,-1 4 0,-2 0 0,-4 0 0,2-1 0,-1 0 0,2 1 0,0 3 0,3 0 0,1 0 0</inkml:trace>
+</inkml:ink>
+</file>
+
+<file path=ppt/ink/ink26.xml><?xml version="1.0" encoding="utf-8"?>
+<inkml:ink xmlns:inkml="http://www.w3.org/2003/InkML">
+  <inkml:definitions>
+    <inkml:context xml:id="ctx0">
+      <inkml:inkSource xml:id="inkSrc0">
+        <inkml:traceFormat>
+          <inkml:channel name="X" type="integer" min="-2.14748E9" max="2.14748E9" units="cm"/>
+          <inkml:channel name="Y" type="integer" min="-2.14748E9" max="2.14748E9" units="cm"/>
+          <inkml:channel name="F" type="integer" max="32767" units="dev"/>
+        </inkml:traceFormat>
+        <inkml:channelProperties>
+          <inkml:channelProperty channel="X" name="resolution" value="1000" units="1/cm"/>
+          <inkml:channelProperty channel="Y" name="resolution" value="1000" units="1/cm"/>
+          <inkml:channelProperty channel="F" name="resolution" value="0" units="1/dev"/>
+        </inkml:channelProperties>
+      </inkml:inkSource>
+      <inkml:timestamp xml:id="ts0" timeString="2024-10-07T00:18:14.923"/>
+    </inkml:context>
+    <inkml:brush xml:id="br0">
+      <inkml:brushProperty name="width" value="0.05" units="cm"/>
+      <inkml:brushProperty name="height" value="0.05" units="cm"/>
+    </inkml:brush>
+  </inkml:definitions>
+  <inkml:trace contextRef="#ctx0" brushRef="#br0">868 1 24575,'-11'0'0,"-14"0"0,6 0 0,-10 0 0,7 0 0,4 0 0,-12 0 0,12 0 0,-12 0 0,12 0 0,-14 0 0,13 0 0,-19 4 0,14 5 0,-9 6 0,11 2 0,-5 2 0,9-6 0,-8 4 0,8-4 0,-3 4 0,3 5 0,-4-4 0,7 4 0,-5-5 0,10 0 0,-1-5 0,6 4 0,2-7 0,3 2 0,0 1 0,0 5 0,0 1 0,0 3 0,0 1 0,0-4 0,4 8 0,1-4 0,8 6 0,6 0 0,0-5 0,10 6 0,-5-5 0,0 4 0,5 2 0,-6-6 0,7 4 0,-7-9 0,5 9 0,-10-9 0,6 8 0,-11-9 0,3 3 0,-6-4 0,2-1 0,-4-3 0,0 3 0,-4-8 0,0 4 0,-4-5 0,0 1 0,-3-1 0,-6 1 0,-3 0 0,-10 0 0,0 1 0,-6 0 0,-5 1 0,4-1 0,-9 1 0,9-1 0,-4 0 0,5 0 0,6-4 0,-5 0 0,10-5 0,-10 0 0,9 0 0,-8 0 0,8 0 0,-8 0 0,8 0 0,-4-4 0,5-1 0,1-3 0,-1-1 0,0 1 0,4 3 0,-2-2 0,6 2 0,-3 1 0,5-3 0,-1 6 0,4-6 0,-2 6 0,5-5 0,-2 5 0,3-2 0</inkml:trace>
+</inkml:ink>
+</file>
+
+<file path=ppt/ink/ink27.xml><?xml version="1.0" encoding="utf-8"?>
+<inkml:ink xmlns:inkml="http://www.w3.org/2003/InkML">
+  <inkml:definitions>
+    <inkml:context xml:id="ctx0">
+      <inkml:inkSource xml:id="inkSrc0">
+        <inkml:traceFormat>
+          <inkml:channel name="X" type="integer" min="-2.14748E9" max="2.14748E9" units="cm"/>
+          <inkml:channel name="Y" type="integer" min="-2.14748E9" max="2.14748E9" units="cm"/>
+          <inkml:channel name="F" type="integer" max="32767" units="dev"/>
+        </inkml:traceFormat>
+        <inkml:channelProperties>
+          <inkml:channelProperty channel="X" name="resolution" value="1000" units="1/cm"/>
+          <inkml:channelProperty channel="Y" name="resolution" value="1000" units="1/cm"/>
+          <inkml:channelProperty channel="F" name="resolution" value="0" units="1/dev"/>
+        </inkml:channelProperties>
+      </inkml:inkSource>
+      <inkml:timestamp xml:id="ts0" timeString="2024-10-07T00:18:14.924"/>
+    </inkml:context>
+    <inkml:brush xml:id="br0">
+      <inkml:brushProperty name="width" value="0.1" units="cm"/>
+      <inkml:brushProperty name="height" value="0.1" units="cm"/>
+      <inkml:brushProperty name="color" value="#004F8B"/>
+    </inkml:brush>
+  </inkml:definitions>
+  <inkml:trace contextRef="#ctx0" brushRef="#br0">137 0 24575,'-11'25'0,"4"-9"0,3 2 0,4-12 0,6 10 0,-2-7 0,6 6 0,-4-8 0,4-1 0,-3 4 0,6-3 0,-6 6 0,6-6 0,-6 6 0,3-6 0,-3 3 0,-1-3 0,-2-1 0,-1 1 0,-3-1 0,0 1 0,0 0 0,0-1 0,0 1 0,0-1 0,0 1 0,0 0 0,-3-1 0,-4 1 0,0 3 0,-3-3 0,0 3 0,3-4 0,-3-2 0,3-1 0,-8 0 0,6 1 0,-6 1 0,8-2 0,1-3 0,-1 0 0,0 0 0,1 0 0,-1 0 0,0 0 0,-3 0 0,0-3 0,-1-1 0,-1-3 0,1 1 0,1-1 0,0 0 0,6 3 0,1 1 0</inkml:trace>
+</inkml:ink>
+</file>
+
+<file path=ppt/ink/ink28.xml><?xml version="1.0" encoding="utf-8"?>
+<inkml:ink xmlns:inkml="http://www.w3.org/2003/InkML">
+  <inkml:definitions>
+    <inkml:context xml:id="ctx0">
+      <inkml:inkSource xml:id="inkSrc0">
+        <inkml:traceFormat>
+          <inkml:channel name="X" type="integer" min="-2.14748E9" max="2.14748E9" units="cm"/>
+          <inkml:channel name="Y" type="integer" min="-2.14748E9" max="2.14748E9" units="cm"/>
+          <inkml:channel name="F" type="integer" max="32767" units="dev"/>
+        </inkml:traceFormat>
+        <inkml:channelProperties>
+          <inkml:channelProperty channel="X" name="resolution" value="1000" units="1/cm"/>
+          <inkml:channelProperty channel="Y" name="resolution" value="1000" units="1/cm"/>
+          <inkml:channelProperty channel="F" name="resolution" value="0" units="1/dev"/>
+        </inkml:channelProperties>
+      </inkml:inkSource>
+      <inkml:timestamp xml:id="ts0" timeString="2024-10-07T00:18:14.925"/>
+    </inkml:context>
+    <inkml:brush xml:id="br0">
+      <inkml:brushProperty name="width" value="0.1" units="cm"/>
+      <inkml:brushProperty name="height" value="0.1" units="cm"/>
+      <inkml:brushProperty name="color" value="#004F8B"/>
+    </inkml:brush>
+  </inkml:definitions>
+  <inkml:trace contextRef="#ctx0" brushRef="#br0">21 43 24575,'-11'9'0,"4"-1"0,4 1 0,3-2 0,0-1 0,0 4 0,0-3 0,0 6 0,0-6 0,0 6 0,0-6 0,0 6 0,0-6 0,3 6 0,1-3 0,3 4 0,-1-4 0,1 0 0,-1-7 0,1 0 0,0-3 0,-1 0 0,1 0 0,-1 0 0,1 0 0,0 0 0,2-3 0,-4-1 0,4-5 0,-9 1 0,3-4 0,-3 4 0,0-5 0,0 6 0,0-6 0,0 6 0,0-6 0,0 6 0,0-3 0,0 3 0,0 0 0,0 1 0,0-1 0,-3-3 0,3 3 0,-6-6 0,2 5 0,-3-1 0,0 2 0,1 0 0,-4 1 0,2-1 0,-1 3 0,2 1 0,3 3 0,1 0 0</inkml:trace>
+</inkml:ink>
+</file>
+
+<file path=ppt/ink/ink29.xml><?xml version="1.0" encoding="utf-8"?>
+<inkml:ink xmlns:inkml="http://www.w3.org/2003/InkML">
+  <inkml:definitions>
+    <inkml:context xml:id="ctx0">
+      <inkml:inkSource xml:id="inkSrc0">
+        <inkml:traceFormat>
+          <inkml:channel name="X" type="integer" min="-2.14748E9" max="2.14748E9" units="cm"/>
+          <inkml:channel name="Y" type="integer" min="-2.14748E9" max="2.14748E9" units="cm"/>
+          <inkml:channel name="F" type="integer" max="32767" units="dev"/>
+        </inkml:traceFormat>
+        <inkml:channelProperties>
+          <inkml:channelProperty channel="X" name="resolution" value="1000" units="1/cm"/>
+          <inkml:channelProperty channel="Y" name="resolution" value="1000" units="1/cm"/>
+          <inkml:channelProperty channel="F" name="resolution" value="0" units="1/dev"/>
+        </inkml:channelProperties>
+      </inkml:inkSource>
+      <inkml:timestamp xml:id="ts0" timeString="2024-10-07T00:18:14.926"/>
+    </inkml:context>
+    <inkml:brush xml:id="br0">
+      <inkml:brushProperty name="width" value="0.1" units="cm"/>
+      <inkml:brushProperty name="height" value="0.1" units="cm"/>
+      <inkml:brushProperty name="color" value="#004F8B"/>
+    </inkml:brush>
+  </inkml:definitions>
+  <inkml:trace contextRef="#ctx0" brushRef="#br0">47 45 24575,'-3'10'0,"-1"0"0,0 0 0,-3 5 0,3 0 0,0 1 0,1-7 0,3 1 0,0-3 0,0 3 0,0-4 0,0 1 0,0 0 0,3-1 0,-3 1 0,6 2 0,-5-1 0,5 1 0,-2-2 0,2 0 0,1-1 0,-1-2 0,1-1 0,3 0 0,-3-2 0,3 2 0,-4-3 0,1 0 0,0 0 0,-1 0 0,1 0 0,-1 0 0,4-3 0,-3 2 0,6-5 0,-6 2 0,3-3 0,-3 1 0,-1-1 0,1-3 0,-1 3 0,1-6 0,-3 3 0,-1-1 0,-3-2 0,0 6 0,0-3 0,0 3 0,0 1 0,0-1 0,-3-3 0,-1 3 0,-3-3 0,0 0 0,1 0 0,-1-1 0,0 2 0,0 2 0,1 0 0,-4 0 0,3 4 0,-6-3 0,5 2 0,-1-3 0,2 4 0,0 0 0,0 3 0,1 0 0,-1 0 0,0 0 0,1 0 0,-4 0 0,-16 0 0,15 0 0,-10 0 0</inkml:trace>
+</inkml:ink>
+</file>
+
+<file path=ppt/ink/ink3.xml><?xml version="1.0" encoding="utf-8"?>
 <inkml:ink xmlns:inkml="http://www.w3.org/2003/InkML">
   <inkml:definitions>
     <inkml:context xml:id="ctx0">
@@ -3562,258 +3864,7 @@
 </inkml:ink>
 </file>
 
-<file path=ppt/ink/ink20.xml><?xml version="1.0" encoding="utf-8"?>
-<inkml:ink xmlns:inkml="http://www.w3.org/2003/InkML">
-  <inkml:definitions>
-    <inkml:context xml:id="ctx0">
-      <inkml:inkSource xml:id="inkSrc0">
-        <inkml:traceFormat>
-          <inkml:channel name="X" type="integer" min="-2.14748E9" max="2.14748E9" units="cm"/>
-          <inkml:channel name="Y" type="integer" min="-2.14748E9" max="2.14748E9" units="cm"/>
-          <inkml:channel name="F" type="integer" max="32767" units="dev"/>
-        </inkml:traceFormat>
-        <inkml:channelProperties>
-          <inkml:channelProperty channel="X" name="resolution" value="1000" units="1/cm"/>
-          <inkml:channelProperty channel="Y" name="resolution" value="1000" units="1/cm"/>
-          <inkml:channelProperty channel="F" name="resolution" value="0" units="1/dev"/>
-        </inkml:channelProperties>
-      </inkml:inkSource>
-      <inkml:timestamp xml:id="ts0" timeString="2024-10-07T00:18:14.918"/>
-    </inkml:context>
-    <inkml:brush xml:id="br0">
-      <inkml:brushProperty name="width" value="0.05" units="cm"/>
-      <inkml:brushProperty name="height" value="0.05" units="cm"/>
-      <inkml:brushProperty name="color" value="#AB008B"/>
-    </inkml:brush>
-  </inkml:definitions>
-  <inkml:trace contextRef="#ctx0" brushRef="#br0">41 0 24575,'-7'0'0,"0"3"0,0 1 0,1 5 0,-1 2 0,3-1 0,1 3 0,3-6 0,0 6 0,0-6 0,0 3 0,0-4 0,0 1 0,0-1 0,3 4 0,1-3 0,2 6 0,1-6 0,0 3 0,-1-6 0,1-1 0,0-3 0,-1 0 0,1 0 0,-1 0 0,1 0 0,0 0 0,-1 0 0,1 0 0,-1 0 0,4-3 0,-3 2 0,6-5 0,-6-1 0,3-3 0,0-1 0,-3 1 0,3 4 0,-7-1 0,0 0 0,-6-2 0,-1-2 0,-5-2 0,1 2 0,-4 1 0,4 4 0,-5-1 0,6 3 0,-3 1 0,3 3 0,1 0 0,-1 0 0,0 0 0,1 0 0,2 0 0,1 0 0</inkml:trace>
-</inkml:ink>
-</file>
-
-<file path=ppt/ink/ink21.xml><?xml version="1.0" encoding="utf-8"?>
-<inkml:ink xmlns:inkml="http://www.w3.org/2003/InkML">
-  <inkml:definitions>
-    <inkml:context xml:id="ctx0">
-      <inkml:inkSource xml:id="inkSrc0">
-        <inkml:traceFormat>
-          <inkml:channel name="X" type="integer" min="-2.14748E9" max="2.14748E9" units="cm"/>
-          <inkml:channel name="Y" type="integer" min="-2.14748E9" max="2.14748E9" units="cm"/>
-          <inkml:channel name="F" type="integer" max="32767" units="dev"/>
-        </inkml:traceFormat>
-        <inkml:channelProperties>
-          <inkml:channelProperty channel="X" name="resolution" value="1000" units="1/cm"/>
-          <inkml:channelProperty channel="Y" name="resolution" value="1000" units="1/cm"/>
-          <inkml:channelProperty channel="F" name="resolution" value="0" units="1/dev"/>
-        </inkml:channelProperties>
-      </inkml:inkSource>
-      <inkml:timestamp xml:id="ts0" timeString="2024-10-07T00:18:14.919"/>
-    </inkml:context>
-    <inkml:brush xml:id="br0">
-      <inkml:brushProperty name="width" value="0.05" units="cm"/>
-      <inkml:brushProperty name="height" value="0.05" units="cm"/>
-      <inkml:brushProperty name="color" value="#AB008B"/>
-    </inkml:brush>
-  </inkml:definitions>
-  <inkml:trace contextRef="#ctx0" brushRef="#br0">170 21 24575,'1'-11'0,"-2"4"0,-6 4 0,1 3 0,-1 0 0,0 3 0,0 9 0,-1 5 0,0 0 0,4-2 0,-2-5 0,5-3 0,-2 3 0,3 0 0,0 0 0,0 3 0,0 1 0,-3-1 0,-1 0 0,0 1 0,1-4 0,3 3 0,0-3 0,0 3 0,0 1 0,0-1 0,0 0 0,0 1 0,0-4 0,0 3 0,0-6 0,0 6 0,3-3 0,1 3 0,0-2 0,-1-2 0,0 1 0,-3-3 0,6 6 0,-2-6 0,2 6 0,-2-6 0,-1 3 0,0-1 0,1-1 0,-1 1 0,0-2 0,-3 0 0,0-1 0,0 1 0,0-1 0,0 1 0,-3 3 0,0-3 0,-4 3 0,0-7 0,-3 3 0,3-2 0,-6 0 0,6-2 0,-6-2 0,6 0 0,-3 0 0,3 0 0,0 0 0,1 0 0,-1 0 0,0 0 0,-3-3 0,3-3 0,3 1 0,2-1 0,5 6 0</inkml:trace>
-</inkml:ink>
-</file>
-
-<file path=ppt/ink/ink22.xml><?xml version="1.0" encoding="utf-8"?>
-<inkml:ink xmlns:inkml="http://www.w3.org/2003/InkML">
-  <inkml:definitions>
-    <inkml:context xml:id="ctx0">
-      <inkml:inkSource xml:id="inkSrc0">
-        <inkml:traceFormat>
-          <inkml:channel name="X" type="integer" min="-2.14748E9" max="2.14748E9" units="cm"/>
-          <inkml:channel name="Y" type="integer" min="-2.14748E9" max="2.14748E9" units="cm"/>
-          <inkml:channel name="F" type="integer" max="32767" units="dev"/>
-        </inkml:traceFormat>
-        <inkml:channelProperties>
-          <inkml:channelProperty channel="X" name="resolution" value="1000" units="1/cm"/>
-          <inkml:channelProperty channel="Y" name="resolution" value="1000" units="1/cm"/>
-          <inkml:channelProperty channel="F" name="resolution" value="0" units="1/dev"/>
-        </inkml:channelProperties>
-      </inkml:inkSource>
-      <inkml:timestamp xml:id="ts0" timeString="2024-10-07T00:18:14.920"/>
-    </inkml:context>
-    <inkml:brush xml:id="br0">
-      <inkml:brushProperty name="width" value="0.05" units="cm"/>
-      <inkml:brushProperty name="height" value="0.05" units="cm"/>
-      <inkml:brushProperty name="color" value="#AB008B"/>
-    </inkml:brush>
-  </inkml:definitions>
-  <inkml:trace contextRef="#ctx0" brushRef="#br0">35 1 24575,'-7'6'0,"-2"4"0,5-3 0,0 3 0,1-3 0,3 2 0,-3 2 0,3-1 0,-3 3 0,3-3 0,0 3 0,0-2 0,0 1 0,3-1 0,-3-1 0,6 3 0,-2-6 0,3 2 0,-1-2 0,1-3 0,-1-1 0,1-3 0,0 0 0,-1 0 0,1 0 0,-1 0 0,1 0 0,0 0 0,2 0 0,2-3 0,-1-1 0,0 0 0,-4-2 0,-2 3 0,-1-4 0,-3-3 0,0 3 0,0-3 0,0 3 0,0 0 0,0 1 0,-3-4 0,-1 0 0,-3-1 0,4 1 0,-3 1 0,2 1 0,0-2 0,-2 1 0,5 1 0,-5-1 0,3 5 0,-1 1 0,1 3 0</inkml:trace>
-</inkml:ink>
-</file>
-
-<file path=ppt/ink/ink23.xml><?xml version="1.0" encoding="utf-8"?>
-<inkml:ink xmlns:inkml="http://www.w3.org/2003/InkML">
-  <inkml:definitions>
-    <inkml:context xml:id="ctx0">
-      <inkml:inkSource xml:id="inkSrc0">
-        <inkml:traceFormat>
-          <inkml:channel name="X" type="integer" min="-2.14748E9" max="2.14748E9" units="cm"/>
-          <inkml:channel name="Y" type="integer" min="-2.14748E9" max="2.14748E9" units="cm"/>
-          <inkml:channel name="F" type="integer" max="32767" units="dev"/>
-        </inkml:traceFormat>
-        <inkml:channelProperties>
-          <inkml:channelProperty channel="X" name="resolution" value="1000" units="1/cm"/>
-          <inkml:channelProperty channel="Y" name="resolution" value="1000" units="1/cm"/>
-          <inkml:channelProperty channel="F" name="resolution" value="0" units="1/dev"/>
-        </inkml:channelProperties>
-      </inkml:inkSource>
-      <inkml:timestamp xml:id="ts0" timeString="2024-10-07T00:18:14.921"/>
-    </inkml:context>
-    <inkml:brush xml:id="br0">
-      <inkml:brushProperty name="width" value="0.05" units="cm"/>
-      <inkml:brushProperty name="height" value="0.05" units="cm"/>
-      <inkml:brushProperty name="color" value="#AB008B"/>
-    </inkml:brush>
-  </inkml:definitions>
-  <inkml:trace contextRef="#ctx0" brushRef="#br0">168 1 24575,'-7'0'0,"0"0"0,0 0 0,1 0 0,-4 3 0,3 1 0,-3 2 0,3 1 0,0-1 0,4 4 0,0-3 0,3 6 0,0-6 0,0 6 0,0-3 0,0 4 0,0-1 0,0 0 0,0 1 0,0-1 0,0-3 0,0 3 0,0-6 0,0 3 0,0-4 0,0 1 0,0 0 0,3 2 0,-3-1 0,3 1 0,-3-2 0,0 3 0,0-3 0,4 11 0,0-9 0,0 6 0,-1-9 0,-3 4 0,0-3 0,0 3 0,0-4 0,0 1 0,0 0 0,-3 2 0,0-1 0,-4 1 0,3-2 0,-2-1 0,2 1 0,-5 0 0,1-1 0,-4 1 0,4-4 0,-2 0 0,4-3 0,-1 0 0,0 0 0,0 0 0,1-3 0,2 0 0,1-1 0,3 1 0</inkml:trace>
-</inkml:ink>
-</file>
-
-<file path=ppt/ink/ink24.xml><?xml version="1.0" encoding="utf-8"?>
-<inkml:ink xmlns:inkml="http://www.w3.org/2003/InkML">
-  <inkml:definitions>
-    <inkml:context xml:id="ctx0">
-      <inkml:inkSource xml:id="inkSrc0">
-        <inkml:traceFormat>
-          <inkml:channel name="X" type="integer" min="-2.14748E9" max="2.14748E9" units="cm"/>
-          <inkml:channel name="Y" type="integer" min="-2.14748E9" max="2.14748E9" units="cm"/>
-          <inkml:channel name="F" type="integer" max="32767" units="dev"/>
-        </inkml:traceFormat>
-        <inkml:channelProperties>
-          <inkml:channelProperty channel="X" name="resolution" value="1000" units="1/cm"/>
-          <inkml:channelProperty channel="Y" name="resolution" value="1000" units="1/cm"/>
-          <inkml:channelProperty channel="F" name="resolution" value="0" units="1/dev"/>
-        </inkml:channelProperties>
-      </inkml:inkSource>
-      <inkml:timestamp xml:id="ts0" timeString="2024-10-07T00:18:14.922"/>
-    </inkml:context>
-    <inkml:brush xml:id="br0">
-      <inkml:brushProperty name="width" value="0.05" units="cm"/>
-      <inkml:brushProperty name="height" value="0.05" units="cm"/>
-      <inkml:brushProperty name="color" value="#AB008B"/>
-    </inkml:brush>
-  </inkml:definitions>
-  <inkml:trace contextRef="#ctx0" brushRef="#br0">8 1 24575,'-4'6'0,"1"1"0,3 0 0,0-1 0,0 1 0,0 0 0,0 2 0,0-1 0,0 1 0,0-2 0,0-1 0,0 1 0,0 3 0,0-3 0,0 3 0,3-1 0,-2-1 0,1 1 0,1 1 0,1-3 0,3 3 0,-1-4 0,1-2 0,0-1 0,2 0 0,-1 1 0,1-1 0,-2 0 0,-1-3 0,1 0 0,0 0 0,-1-3 0,-2-1 0,2-2 0,-3-1 0,1-3 0,-1 3 0,-3-3 0,0 0 0,0 3 0,0-3 0,0 3 0,0 1 0,0-1 0,0 0 0,0-3 0,0 3 0,0-3 0,0 4 0,0-1 0,0 0 0,-3 0 0,-1 4 0,-2 0 0,-4 0 0,2-1 0,-1 0 0,2 1 0,0 3 0,3 0 0,1 0 0</inkml:trace>
-</inkml:ink>
-</file>
-
-<file path=ppt/ink/ink25.xml><?xml version="1.0" encoding="utf-8"?>
-<inkml:ink xmlns:inkml="http://www.w3.org/2003/InkML">
-  <inkml:definitions>
-    <inkml:context xml:id="ctx0">
-      <inkml:inkSource xml:id="inkSrc0">
-        <inkml:traceFormat>
-          <inkml:channel name="X" type="integer" min="-2.14748E9" max="2.14748E9" units="cm"/>
-          <inkml:channel name="Y" type="integer" min="-2.14748E9" max="2.14748E9" units="cm"/>
-          <inkml:channel name="F" type="integer" max="32767" units="dev"/>
-        </inkml:traceFormat>
-        <inkml:channelProperties>
-          <inkml:channelProperty channel="X" name="resolution" value="1000" units="1/cm"/>
-          <inkml:channelProperty channel="Y" name="resolution" value="1000" units="1/cm"/>
-          <inkml:channelProperty channel="F" name="resolution" value="0" units="1/dev"/>
-        </inkml:channelProperties>
-      </inkml:inkSource>
-      <inkml:timestamp xml:id="ts0" timeString="2024-10-07T00:18:14.923"/>
-    </inkml:context>
-    <inkml:brush xml:id="br0">
-      <inkml:brushProperty name="width" value="0.05" units="cm"/>
-      <inkml:brushProperty name="height" value="0.05" units="cm"/>
-    </inkml:brush>
-  </inkml:definitions>
-  <inkml:trace contextRef="#ctx0" brushRef="#br0">868 1 24575,'-11'0'0,"-14"0"0,6 0 0,-10 0 0,7 0 0,4 0 0,-12 0 0,12 0 0,-12 0 0,12 0 0,-14 0 0,13 0 0,-19 4 0,14 5 0,-9 6 0,11 2 0,-5 2 0,9-6 0,-8 4 0,8-4 0,-3 4 0,3 5 0,-4-4 0,7 4 0,-5-5 0,10 0 0,-1-5 0,6 4 0,2-7 0,3 2 0,0 1 0,0 5 0,0 1 0,0 3 0,0 1 0,0-4 0,4 8 0,1-4 0,8 6 0,6 0 0,0-5 0,10 6 0,-5-5 0,0 4 0,5 2 0,-6-6 0,7 4 0,-7-9 0,5 9 0,-10-9 0,6 8 0,-11-9 0,3 3 0,-6-4 0,2-1 0,-4-3 0,0 3 0,-4-8 0,0 4 0,-4-5 0,0 1 0,-3-1 0,-6 1 0,-3 0 0,-10 0 0,0 1 0,-6 0 0,-5 1 0,4-1 0,-9 1 0,9-1 0,-4 0 0,5 0 0,6-4 0,-5 0 0,10-5 0,-10 0 0,9 0 0,-8 0 0,8 0 0,-8 0 0,8 0 0,-4-4 0,5-1 0,1-3 0,-1-1 0,0 1 0,4 3 0,-2-2 0,6 2 0,-3 1 0,5-3 0,-1 6 0,4-6 0,-2 6 0,5-5 0,-2 5 0,3-2 0</inkml:trace>
-</inkml:ink>
-</file>
-
-<file path=ppt/ink/ink26.xml><?xml version="1.0" encoding="utf-8"?>
-<inkml:ink xmlns:inkml="http://www.w3.org/2003/InkML">
-  <inkml:definitions>
-    <inkml:context xml:id="ctx0">
-      <inkml:inkSource xml:id="inkSrc0">
-        <inkml:traceFormat>
-          <inkml:channel name="X" type="integer" min="-2.14748E9" max="2.14748E9" units="cm"/>
-          <inkml:channel name="Y" type="integer" min="-2.14748E9" max="2.14748E9" units="cm"/>
-          <inkml:channel name="F" type="integer" max="32767" units="dev"/>
-        </inkml:traceFormat>
-        <inkml:channelProperties>
-          <inkml:channelProperty channel="X" name="resolution" value="1000" units="1/cm"/>
-          <inkml:channelProperty channel="Y" name="resolution" value="1000" units="1/cm"/>
-          <inkml:channelProperty channel="F" name="resolution" value="0" units="1/dev"/>
-        </inkml:channelProperties>
-      </inkml:inkSource>
-      <inkml:timestamp xml:id="ts0" timeString="2024-10-07T00:18:14.924"/>
-    </inkml:context>
-    <inkml:brush xml:id="br0">
-      <inkml:brushProperty name="width" value="0.1" units="cm"/>
-      <inkml:brushProperty name="height" value="0.1" units="cm"/>
-      <inkml:brushProperty name="color" value="#004F8B"/>
-    </inkml:brush>
-  </inkml:definitions>
-  <inkml:trace contextRef="#ctx0" brushRef="#br0">137 0 24575,'-11'25'0,"4"-9"0,3 2 0,4-12 0,6 10 0,-2-7 0,6 6 0,-4-8 0,4-1 0,-3 4 0,6-3 0,-6 6 0,6-6 0,-6 6 0,3-6 0,-3 3 0,-1-3 0,-2-1 0,-1 1 0,-3-1 0,0 1 0,0 0 0,0-1 0,0 1 0,0-1 0,0 1 0,0 0 0,-3-1 0,-4 1 0,0 3 0,-3-3 0,0 3 0,3-4 0,-3-2 0,3-1 0,-8 0 0,6 1 0,-6 1 0,8-2 0,1-3 0,-1 0 0,0 0 0,1 0 0,-1 0 0,0 0 0,-3 0 0,0-3 0,-1-1 0,-1-3 0,1 1 0,1-1 0,0 0 0,6 3 0,1 1 0</inkml:trace>
-</inkml:ink>
-</file>
-
-<file path=ppt/ink/ink27.xml><?xml version="1.0" encoding="utf-8"?>
-<inkml:ink xmlns:inkml="http://www.w3.org/2003/InkML">
-  <inkml:definitions>
-    <inkml:context xml:id="ctx0">
-      <inkml:inkSource xml:id="inkSrc0">
-        <inkml:traceFormat>
-          <inkml:channel name="X" type="integer" min="-2.14748E9" max="2.14748E9" units="cm"/>
-          <inkml:channel name="Y" type="integer" min="-2.14748E9" max="2.14748E9" units="cm"/>
-          <inkml:channel name="F" type="integer" max="32767" units="dev"/>
-        </inkml:traceFormat>
-        <inkml:channelProperties>
-          <inkml:channelProperty channel="X" name="resolution" value="1000" units="1/cm"/>
-          <inkml:channelProperty channel="Y" name="resolution" value="1000" units="1/cm"/>
-          <inkml:channelProperty channel="F" name="resolution" value="0" units="1/dev"/>
-        </inkml:channelProperties>
-      </inkml:inkSource>
-      <inkml:timestamp xml:id="ts0" timeString="2024-10-07T00:18:14.925"/>
-    </inkml:context>
-    <inkml:brush xml:id="br0">
-      <inkml:brushProperty name="width" value="0.1" units="cm"/>
-      <inkml:brushProperty name="height" value="0.1" units="cm"/>
-      <inkml:brushProperty name="color" value="#004F8B"/>
-    </inkml:brush>
-  </inkml:definitions>
-  <inkml:trace contextRef="#ctx0" brushRef="#br0">21 43 24575,'-11'9'0,"4"-1"0,4 1 0,3-2 0,0-1 0,0 4 0,0-3 0,0 6 0,0-6 0,0 6 0,0-6 0,0 6 0,0-6 0,3 6 0,1-3 0,3 4 0,-1-4 0,1 0 0,-1-7 0,1 0 0,0-3 0,-1 0 0,1 0 0,-1 0 0,1 0 0,0 0 0,2-3 0,-4-1 0,4-5 0,-9 1 0,3-4 0,-3 4 0,0-5 0,0 6 0,0-6 0,0 6 0,0-6 0,0 6 0,0-3 0,0 3 0,0 0 0,0 1 0,0-1 0,-3-3 0,3 3 0,-6-6 0,2 5 0,-3-1 0,0 2 0,1 0 0,-4 1 0,2-1 0,-1 3 0,2 1 0,3 3 0,1 0 0</inkml:trace>
-</inkml:ink>
-</file>
-
-<file path=ppt/ink/ink28.xml><?xml version="1.0" encoding="utf-8"?>
-<inkml:ink xmlns:inkml="http://www.w3.org/2003/InkML">
-  <inkml:definitions>
-    <inkml:context xml:id="ctx0">
-      <inkml:inkSource xml:id="inkSrc0">
-        <inkml:traceFormat>
-          <inkml:channel name="X" type="integer" min="-2.14748E9" max="2.14748E9" units="cm"/>
-          <inkml:channel name="Y" type="integer" min="-2.14748E9" max="2.14748E9" units="cm"/>
-          <inkml:channel name="F" type="integer" max="32767" units="dev"/>
-        </inkml:traceFormat>
-        <inkml:channelProperties>
-          <inkml:channelProperty channel="X" name="resolution" value="1000" units="1/cm"/>
-          <inkml:channelProperty channel="Y" name="resolution" value="1000" units="1/cm"/>
-          <inkml:channelProperty channel="F" name="resolution" value="0" units="1/dev"/>
-        </inkml:channelProperties>
-      </inkml:inkSource>
-      <inkml:timestamp xml:id="ts0" timeString="2024-10-07T00:18:14.926"/>
-    </inkml:context>
-    <inkml:brush xml:id="br0">
-      <inkml:brushProperty name="width" value="0.1" units="cm"/>
-      <inkml:brushProperty name="height" value="0.1" units="cm"/>
-      <inkml:brushProperty name="color" value="#004F8B"/>
-    </inkml:brush>
-  </inkml:definitions>
-  <inkml:trace contextRef="#ctx0" brushRef="#br0">47 45 24575,'-3'10'0,"-1"0"0,0 0 0,-3 5 0,3 0 0,0 1 0,1-7 0,3 1 0,0-3 0,0 3 0,0-4 0,0 1 0,0 0 0,3-1 0,-3 1 0,6 2 0,-5-1 0,5 1 0,-2-2 0,2 0 0,1-1 0,-1-2 0,1-1 0,3 0 0,-3-2 0,3 2 0,-4-3 0,1 0 0,0 0 0,-1 0 0,1 0 0,-1 0 0,4-3 0,-3 2 0,6-5 0,-6 2 0,3-3 0,-3 1 0,-1-1 0,1-3 0,-1 3 0,1-6 0,-3 3 0,-1-1 0,-3-2 0,0 6 0,0-3 0,0 3 0,0 1 0,0-1 0,-3-3 0,-1 3 0,-3-3 0,0 0 0,1 0 0,-1-1 0,0 2 0,0 2 0,1 0 0,-4 0 0,3 4 0,-6-3 0,5 2 0,-1-3 0,2 4 0,0 0 0,0 3 0,1 0 0,-1 0 0,0 0 0,1 0 0,-4 0 0,-16 0 0,15 0 0,-10 0 0</inkml:trace>
-</inkml:ink>
-</file>
-
-<file path=ppt/ink/ink29.xml><?xml version="1.0" encoding="utf-8"?>
+<file path=ppt/ink/ink30.xml><?xml version="1.0" encoding="utf-8"?>
 <inkml:ink xmlns:inkml="http://www.w3.org/2003/InkML">
   <inkml:definitions>
     <inkml:context xml:id="ctx0">
@@ -3841,7 +3892,259 @@
 </inkml:ink>
 </file>
 
-<file path=ppt/ink/ink3.xml><?xml version="1.0" encoding="utf-8"?>
+<file path=ppt/ink/ink31.xml><?xml version="1.0" encoding="utf-8"?>
+<inkml:ink xmlns:inkml="http://www.w3.org/2003/InkML">
+  <inkml:definitions>
+    <inkml:context xml:id="ctx0">
+      <inkml:inkSource xml:id="inkSrc0">
+        <inkml:traceFormat>
+          <inkml:channel name="X" type="integer" min="-2.14748E9" max="2.14748E9" units="cm"/>
+          <inkml:channel name="Y" type="integer" min="-2.14748E9" max="2.14748E9" units="cm"/>
+          <inkml:channel name="F" type="integer" max="32767" units="dev"/>
+        </inkml:traceFormat>
+        <inkml:channelProperties>
+          <inkml:channelProperty channel="X" name="resolution" value="1000" units="1/cm"/>
+          <inkml:channelProperty channel="Y" name="resolution" value="1000" units="1/cm"/>
+          <inkml:channelProperty channel="F" name="resolution" value="0" units="1/dev"/>
+        </inkml:channelProperties>
+      </inkml:inkSource>
+      <inkml:timestamp xml:id="ts0" timeString="2024-10-07T00:18:14.928"/>
+    </inkml:context>
+    <inkml:brush xml:id="br0">
+      <inkml:brushProperty name="width" value="0.05" units="cm"/>
+      <inkml:brushProperty name="height" value="0.05" units="cm"/>
+      <inkml:brushProperty name="color" value="#E71224"/>
+    </inkml:brush>
+  </inkml:definitions>
+  <inkml:trace contextRef="#ctx0" brushRef="#br0">0 1 24575,'0'7'0,"0"0"0,0 0 0,0 1 0,0 0 0,0-1 0,0 0 0,0 1 0,0-1 0,0 5 0,0-4 0,0 8 0,4-8 0,-3 8 0,5-7 0,-5 2 0,2 1 0,1-4 0,-3 4 0,2-5 0,-3 1 0,0 0 0,0-1 0,0 1 0,0-1 0,0 1 0,3-1 0,-2 1 0,2-1 0,1-3 0,-4-4 0,4-1 0,-4-2 0</inkml:trace>
+</inkml:ink>
+</file>
+
+<file path=ppt/ink/ink32.xml><?xml version="1.0" encoding="utf-8"?>
+<inkml:ink xmlns:inkml="http://www.w3.org/2003/InkML">
+  <inkml:definitions>
+    <inkml:context xml:id="ctx0">
+      <inkml:inkSource xml:id="inkSrc0">
+        <inkml:traceFormat>
+          <inkml:channel name="X" type="integer" min="-2.14748E9" max="2.14748E9" units="cm"/>
+          <inkml:channel name="Y" type="integer" min="-2.14748E9" max="2.14748E9" units="cm"/>
+          <inkml:channel name="F" type="integer" max="32767" units="dev"/>
+        </inkml:traceFormat>
+        <inkml:channelProperties>
+          <inkml:channelProperty channel="X" name="resolution" value="1000" units="1/cm"/>
+          <inkml:channelProperty channel="Y" name="resolution" value="1000" units="1/cm"/>
+          <inkml:channelProperty channel="F" name="resolution" value="0" units="1/dev"/>
+        </inkml:channelProperties>
+      </inkml:inkSource>
+      <inkml:timestamp xml:id="ts0" timeString="2024-10-07T00:18:14.929"/>
+    </inkml:context>
+    <inkml:brush xml:id="br0">
+      <inkml:brushProperty name="width" value="0.05" units="cm"/>
+      <inkml:brushProperty name="height" value="0.05" units="cm"/>
+      <inkml:brushProperty name="color" value="#E71224"/>
+    </inkml:brush>
+  </inkml:definitions>
+  <inkml:trace contextRef="#ctx0" brushRef="#br0">0 1 24575,'0'11'0,"0"-1"0,0-3 0,0 1 0,0 0 0,0-1 0,0 1 0,0-1 0,0 1 0,0-1 0,0 0 0,0 1 0,0-1 0,0 0 0,0 0 0,0 0 0,4 0 0,-4 0 0,7 0 0,-7 1 0,7-1 0,-7 0 0,7 0 0,-6 0 0,5 0 0,-5 0 0,5-3 0,-5 3 0,5-3 0,-5 3 0,5 0 0,-5 0 0,5 0 0,-5 0 0,5 0 0,-2 0 0,0-9 0,-1 3 0,-3-7 0</inkml:trace>
+</inkml:ink>
+</file>
+
+<file path=ppt/ink/ink33.xml><?xml version="1.0" encoding="utf-8"?>
+<inkml:ink xmlns:inkml="http://www.w3.org/2003/InkML">
+  <inkml:definitions>
+    <inkml:context xml:id="ctx0">
+      <inkml:inkSource xml:id="inkSrc0">
+        <inkml:traceFormat>
+          <inkml:channel name="X" type="integer" min="-2.14748E9" max="2.14748E9" units="cm"/>
+          <inkml:channel name="Y" type="integer" min="-2.14748E9" max="2.14748E9" units="cm"/>
+          <inkml:channel name="F" type="integer" max="32767" units="dev"/>
+        </inkml:traceFormat>
+        <inkml:channelProperties>
+          <inkml:channelProperty channel="X" name="resolution" value="1000" units="1/cm"/>
+          <inkml:channelProperty channel="Y" name="resolution" value="1000" units="1/cm"/>
+          <inkml:channelProperty channel="F" name="resolution" value="0" units="1/dev"/>
+        </inkml:channelProperties>
+      </inkml:inkSource>
+      <inkml:timestamp xml:id="ts0" timeString="2024-10-07T00:18:14.930"/>
+    </inkml:context>
+    <inkml:brush xml:id="br0">
+      <inkml:brushProperty name="width" value="0.05" units="cm"/>
+      <inkml:brushProperty name="height" value="0.05" units="cm"/>
+      <inkml:brushProperty name="color" value="#E71224"/>
+    </inkml:brush>
+  </inkml:definitions>
+  <inkml:trace contextRef="#ctx0" brushRef="#br0">132 1 24575,'-11'0'0,"0"0"0,4 0 0,-1 0 0,1 0 0,0 3 0,2 10 0,2 0 0,3 4 0,0-6 0,0-4 0,0 1 0,0 8 0,0-6 0,0 10 0,0-7 0,0 8 0,0-3 0,0 8 0,4-8 0,1 8 0,8-3 0,6 5 0,1 0 0,9 7 0,-4-4 0,1 3 0,3-4 0,-10-2 0,4-5 0,-9-1 0,-3-10 0,-3 0 0,0-5 0,-1 1 0,1 0 0,-4-1 0,-1 1 0,-3-1 0,0 1 0,0-1 0,0 0 0,-3-3 0,-1 3 0,-8-3 0,-1 0 0,-4 4 0,1-4 0,-6 5 0,4 0 0,-3-4 0,-1-2 0,4-3 0,1 0 0,1 0 0,7 0 0,-2 0 0,3 0 0,0 0 0,-3 0 0,2 0 0,-7 0 0,4 0 0,-1-3 0,-3-2 0,7 1 0,-2-3 0,6 3 0,-1 0 0,5-3 0,-3 6 0,4-2 0</inkml:trace>
+</inkml:ink>
+</file>
+
+<file path=ppt/ink/ink34.xml><?xml version="1.0" encoding="utf-8"?>
+<inkml:ink xmlns:inkml="http://www.w3.org/2003/InkML">
+  <inkml:definitions>
+    <inkml:context xml:id="ctx0">
+      <inkml:inkSource xml:id="inkSrc0">
+        <inkml:traceFormat>
+          <inkml:channel name="X" type="integer" min="-2.14748E9" max="2.14748E9" units="cm"/>
+          <inkml:channel name="Y" type="integer" min="-2.14748E9" max="2.14748E9" units="cm"/>
+          <inkml:channel name="F" type="integer" max="32767" units="dev"/>
+        </inkml:traceFormat>
+        <inkml:channelProperties>
+          <inkml:channelProperty channel="X" name="resolution" value="1000" units="1/cm"/>
+          <inkml:channelProperty channel="Y" name="resolution" value="1000" units="1/cm"/>
+          <inkml:channelProperty channel="F" name="resolution" value="0" units="1/dev"/>
+        </inkml:channelProperties>
+      </inkml:inkSource>
+      <inkml:timestamp xml:id="ts0" timeString="2024-10-07T00:18:14.931"/>
+    </inkml:context>
+    <inkml:brush xml:id="br0">
+      <inkml:brushProperty name="width" value="0.05" units="cm"/>
+      <inkml:brushProperty name="height" value="0.05" units="cm"/>
+      <inkml:brushProperty name="color" value="#E71224"/>
+    </inkml:brush>
+  </inkml:definitions>
+  <inkml:trace contextRef="#ctx0" brushRef="#br0">1 1 24575,'0'11'0,"0"-3"0,0 7 0,0-7 0,0 3 0,0-4 0,0 0 0,0 0 0,0 1 0,0-1 0,0 1 0,0-1 0,0 1 0,0-1 0,0 0 0,0 0 0,0 1 0,0-1 0,0 0 0,3-3 0,-2 3 0,6-4 0,-7 4 0,3 1 0,0-1 0,-2 0 0,6-3 0,-7-1 0,3-3 0</inkml:trace>
+</inkml:ink>
+</file>
+
+<file path=ppt/ink/ink35.xml><?xml version="1.0" encoding="utf-8"?>
+<inkml:ink xmlns:inkml="http://www.w3.org/2003/InkML">
+  <inkml:definitions>
+    <inkml:context xml:id="ctx0">
+      <inkml:inkSource xml:id="inkSrc0">
+        <inkml:traceFormat>
+          <inkml:channel name="X" type="integer" min="-2.14748E9" max="2.14748E9" units="cm"/>
+          <inkml:channel name="Y" type="integer" min="-2.14748E9" max="2.14748E9" units="cm"/>
+          <inkml:channel name="F" type="integer" max="32767" units="dev"/>
+        </inkml:traceFormat>
+        <inkml:channelProperties>
+          <inkml:channelProperty channel="X" name="resolution" value="1000" units="1/cm"/>
+          <inkml:channelProperty channel="Y" name="resolution" value="1000" units="1/cm"/>
+          <inkml:channelProperty channel="F" name="resolution" value="0" units="1/dev"/>
+        </inkml:channelProperties>
+      </inkml:inkSource>
+      <inkml:timestamp xml:id="ts0" timeString="2024-10-07T00:18:14.932"/>
+    </inkml:context>
+    <inkml:brush xml:id="br0">
+      <inkml:brushProperty name="width" value="0.05" units="cm"/>
+      <inkml:brushProperty name="height" value="0.05" units="cm"/>
+      <inkml:brushProperty name="color" value="#E71224"/>
+    </inkml:brush>
+  </inkml:definitions>
+  <inkml:trace contextRef="#ctx0" brushRef="#br0">0 1 24575,'0'5'0,"0"-2"0,0 11 0,0-2 0,0-4 0,0 8 0,0-8 0,0 8 0,0-8 0,0 8 0,0-7 0,0 2 0,0-3 0,0-1 0,0 1 0,0-1 0,0 1 0,0-1 0,0 0 0,0-10 0,0-7 0,0-17 0,0-2 0,0 8 0,0 9 0</inkml:trace>
+</inkml:ink>
+</file>
+
+<file path=ppt/ink/ink36.xml><?xml version="1.0" encoding="utf-8"?>
+<inkml:ink xmlns:inkml="http://www.w3.org/2003/InkML">
+  <inkml:definitions>
+    <inkml:context xml:id="ctx0">
+      <inkml:inkSource xml:id="inkSrc0">
+        <inkml:traceFormat>
+          <inkml:channel name="X" type="integer" min="-2.14748E9" max="2.14748E9" units="cm"/>
+          <inkml:channel name="Y" type="integer" min="-2.14748E9" max="2.14748E9" units="cm"/>
+          <inkml:channel name="F" type="integer" max="32767" units="dev"/>
+        </inkml:traceFormat>
+        <inkml:channelProperties>
+          <inkml:channelProperty channel="X" name="resolution" value="1000" units="1/cm"/>
+          <inkml:channelProperty channel="Y" name="resolution" value="1000" units="1/cm"/>
+          <inkml:channelProperty channel="F" name="resolution" value="0" units="1/dev"/>
+        </inkml:channelProperties>
+      </inkml:inkSource>
+      <inkml:timestamp xml:id="ts0" timeString="2024-10-07T00:18:14.933"/>
+    </inkml:context>
+    <inkml:brush xml:id="br0">
+      <inkml:brushProperty name="width" value="0.05" units="cm"/>
+      <inkml:brushProperty name="height" value="0.05" units="cm"/>
+      <inkml:brushProperty name="color" value="#E71224"/>
+    </inkml:brush>
+  </inkml:definitions>
+  <inkml:trace contextRef="#ctx0" brushRef="#br0">335 1 24575,'-3'4'0,"-5"-1"0,0-3 0,-8 0 0,3 0 0,-4 0 0,5 0 0,-4 0 0,7 0 0,-3 0 0,5 0 0,-4 0 0,3 0 0,-7 0 0,7 3 0,-3 5 0,3 1 0,0 6 0,-4-2 0,3 4 0,-7-1 0,7-3 0,-3 3 0,8-8 0,-3 4 0,6-5 0,-3 1 0,4-1 0,0 1 0,0-1 0,0 0 0,0 0 0,4 1 0,0-1 0,7 5 0,-2 1 0,7 3 0,-3 1 0,4 0 0,-4-1 0,2 1 0,-5-1 0,5-3 0,-6-1 0,3 0 0,-4-3 0,0 2 0,-1-3 0,1-1 0,-1 1 0,1 3 0,0-2 0,0 2 0,-1 1 0,1-3 0,0 2 0,-1-3 0,-2-1 0,-2 1 0,0-1 0,-2 1 0,3-1 0,-4 0 0,0 0 0,-4-3 0,0-1 0,-4-3 0,-3 0 0,2 0 0,-7 4 0,3-3 0,-3 2 0,-1-3 0,0 0 0,-4 0 0,3 0 0,-9 0 0,9 0 0,-3 0 0,4 0 0,0 0 0,1 0 0,3 0 0,-3 0 0,7 0 0,-2 0 0,7-3 0,1-1 0,3 0 0,0 1 0</inkml:trace>
+</inkml:ink>
+</file>
+
+<file path=ppt/ink/ink37.xml><?xml version="1.0" encoding="utf-8"?>
+<inkml:ink xmlns:inkml="http://www.w3.org/2003/InkML">
+  <inkml:definitions>
+    <inkml:context xml:id="ctx0">
+      <inkml:inkSource xml:id="inkSrc0">
+        <inkml:traceFormat>
+          <inkml:channel name="X" type="integer" min="-2.14748E9" max="2.14748E9" units="cm"/>
+          <inkml:channel name="Y" type="integer" min="-2.14748E9" max="2.14748E9" units="cm"/>
+          <inkml:channel name="F" type="integer" max="32767" units="dev"/>
+        </inkml:traceFormat>
+        <inkml:channelProperties>
+          <inkml:channelProperty channel="X" name="resolution" value="1000" units="1/cm"/>
+          <inkml:channelProperty channel="Y" name="resolution" value="1000" units="1/cm"/>
+          <inkml:channelProperty channel="F" name="resolution" value="0" units="1/dev"/>
+        </inkml:channelProperties>
+      </inkml:inkSource>
+      <inkml:timestamp xml:id="ts0" timeString="2024-10-07T00:18:14.934"/>
+    </inkml:context>
+    <inkml:brush xml:id="br0">
+      <inkml:brushProperty name="width" value="0.05" units="cm"/>
+      <inkml:brushProperty name="height" value="0.05" units="cm"/>
+      <inkml:brushProperty name="color" value="#E71224"/>
+    </inkml:brush>
+  </inkml:definitions>
+  <inkml:trace contextRef="#ctx0" brushRef="#br0">1 1 24575,'0'7'0,"0"0"0,0 0 0,0 1 0,0 0 0,0-1 0,0 0 0,0 1 0,0-1 0,0 5 0,0-4 0,0 8 0,3-8 0,-2 8 0,6-7 0,-6 2 0,2 1 0,0-4 0,-2 4 0,3-5 0,-4 1 0,0-1 0,0 1 0,0 0 0,0-1 0,0 1 0,3-1 0,-2 1 0,2-1 0,0-3 0,-2-4 0,2-1 0,-3-2 0</inkml:trace>
+</inkml:ink>
+</file>
+
+<file path=ppt/ink/ink38.xml><?xml version="1.0" encoding="utf-8"?>
+<inkml:ink xmlns:inkml="http://www.w3.org/2003/InkML">
+  <inkml:definitions>
+    <inkml:context xml:id="ctx0">
+      <inkml:inkSource xml:id="inkSrc0">
+        <inkml:traceFormat>
+          <inkml:channel name="X" type="integer" min="-2.14748E9" max="2.14748E9" units="cm"/>
+          <inkml:channel name="Y" type="integer" min="-2.14748E9" max="2.14748E9" units="cm"/>
+          <inkml:channel name="F" type="integer" max="32767" units="dev"/>
+        </inkml:traceFormat>
+        <inkml:channelProperties>
+          <inkml:channelProperty channel="X" name="resolution" value="1000" units="1/cm"/>
+          <inkml:channelProperty channel="Y" name="resolution" value="1000" units="1/cm"/>
+          <inkml:channelProperty channel="F" name="resolution" value="0" units="1/dev"/>
+        </inkml:channelProperties>
+      </inkml:inkSource>
+      <inkml:timestamp xml:id="ts0" timeString="2024-10-07T00:18:14.935"/>
+    </inkml:context>
+    <inkml:brush xml:id="br0">
+      <inkml:brushProperty name="width" value="0.05" units="cm"/>
+      <inkml:brushProperty name="height" value="0.05" units="cm"/>
+      <inkml:brushProperty name="color" value="#E71224"/>
+    </inkml:brush>
+  </inkml:definitions>
+  <inkml:trace contextRef="#ctx0" brushRef="#br0">0 1 24575,'0'11'0,"0"-1"0,0-3 0,0 1 0,0 0 0,0-1 0,0 1 0,0-1 0,0 1 0,0-1 0,0 0 0,0 1 0,0-1 0,0 0 0,0 0 0,0 0 0,4 0 0,-4 0 0,7 0 0,-7 1 0,7-1 0,-7 0 0,7 0 0,-6 0 0,5 0 0,-5 0 0,5-3 0,-5 3 0,5-3 0,-5 3 0,5 0 0,-5 0 0,5 0 0,-5 0 0,5 0 0,-2 0 0,0-9 0,-1 3 0,-3-7 0</inkml:trace>
+</inkml:ink>
+</file>
+
+<file path=ppt/ink/ink39.xml><?xml version="1.0" encoding="utf-8"?>
+<inkml:ink xmlns:inkml="http://www.w3.org/2003/InkML">
+  <inkml:definitions>
+    <inkml:context xml:id="ctx0">
+      <inkml:inkSource xml:id="inkSrc0">
+        <inkml:traceFormat>
+          <inkml:channel name="X" type="integer" min="-2.14748E9" max="2.14748E9" units="cm"/>
+          <inkml:channel name="Y" type="integer" min="-2.14748E9" max="2.14748E9" units="cm"/>
+          <inkml:channel name="F" type="integer" max="32767" units="dev"/>
+        </inkml:traceFormat>
+        <inkml:channelProperties>
+          <inkml:channelProperty channel="X" name="resolution" value="1000" units="1/cm"/>
+          <inkml:channelProperty channel="Y" name="resolution" value="1000" units="1/cm"/>
+          <inkml:channelProperty channel="F" name="resolution" value="0" units="1/dev"/>
+        </inkml:channelProperties>
+      </inkml:inkSource>
+      <inkml:timestamp xml:id="ts0" timeString="2024-10-07T00:21:14.558"/>
+    </inkml:context>
+    <inkml:brush xml:id="br0">
+      <inkml:brushProperty name="width" value="0.05" units="cm"/>
+      <inkml:brushProperty name="height" value="0.05" units="cm"/>
+      <inkml:brushProperty name="color" value="#FFC114"/>
+    </inkml:brush>
+  </inkml:definitions>
+  <inkml:trace contextRef="#ctx0" brushRef="#br0">398 1 24575,'-15'0'0,"-2"0"0,-8 0 0,-1 0 0,1 4 0,4-3 0,3 2 0,-11 3 0,15-2 0,-14 2 0,20-3 0,-4 0 0,7 0 0,-1 7 0,6 6 0,0-2 0,0 11 0,0-5 0,0 5 0,0 1 0,4-1 0,-3-8 0,6 6 0,-3-11 0,4 7 0,-1-1 0,0-6 0,-3 3 0,2-5 0,-5-3 0,2 3 0,-3-4 0,-3 4 0,-1-3 0,-2 6 0,-4-6 0,2 3 0,-1-6 0,-1-2 0,-16 4 0,4-1 0,-8 1 0,11-2 0,5-4 0,4 0 0,0 0 0,3 0 0,1 0 0,2 0 0,1 0 0</inkml:trace>
+</inkml:ink>
+</file>
+
+<file path=ppt/ink/ink4.xml><?xml version="1.0" encoding="utf-8"?>
 <inkml:ink xmlns:inkml="http://www.w3.org/2003/InkML">
   <inkml:definitions>
     <inkml:context xml:id="ctx0">
@@ -3873,259 +4176,7 @@
 </inkml:ink>
 </file>
 
-<file path=ppt/ink/ink30.xml><?xml version="1.0" encoding="utf-8"?>
-<inkml:ink xmlns:inkml="http://www.w3.org/2003/InkML">
-  <inkml:definitions>
-    <inkml:context xml:id="ctx0">
-      <inkml:inkSource xml:id="inkSrc0">
-        <inkml:traceFormat>
-          <inkml:channel name="X" type="integer" min="-2.14748E9" max="2.14748E9" units="cm"/>
-          <inkml:channel name="Y" type="integer" min="-2.14748E9" max="2.14748E9" units="cm"/>
-          <inkml:channel name="F" type="integer" max="32767" units="dev"/>
-        </inkml:traceFormat>
-        <inkml:channelProperties>
-          <inkml:channelProperty channel="X" name="resolution" value="1000" units="1/cm"/>
-          <inkml:channelProperty channel="Y" name="resolution" value="1000" units="1/cm"/>
-          <inkml:channelProperty channel="F" name="resolution" value="0" units="1/dev"/>
-        </inkml:channelProperties>
-      </inkml:inkSource>
-      <inkml:timestamp xml:id="ts0" timeString="2024-10-07T00:18:14.928"/>
-    </inkml:context>
-    <inkml:brush xml:id="br0">
-      <inkml:brushProperty name="width" value="0.05" units="cm"/>
-      <inkml:brushProperty name="height" value="0.05" units="cm"/>
-      <inkml:brushProperty name="color" value="#E71224"/>
-    </inkml:brush>
-  </inkml:definitions>
-  <inkml:trace contextRef="#ctx0" brushRef="#br0">0 1 24575,'0'7'0,"0"0"0,0 0 0,0 1 0,0 0 0,0-1 0,0 0 0,0 1 0,0-1 0,0 5 0,0-4 0,0 8 0,4-8 0,-3 8 0,5-7 0,-5 2 0,2 1 0,1-4 0,-3 4 0,2-5 0,-3 1 0,0 0 0,0-1 0,0 1 0,0-1 0,0 1 0,3-1 0,-2 1 0,2-1 0,1-3 0,-4-4 0,4-1 0,-4-2 0</inkml:trace>
-</inkml:ink>
-</file>
-
-<file path=ppt/ink/ink31.xml><?xml version="1.0" encoding="utf-8"?>
-<inkml:ink xmlns:inkml="http://www.w3.org/2003/InkML">
-  <inkml:definitions>
-    <inkml:context xml:id="ctx0">
-      <inkml:inkSource xml:id="inkSrc0">
-        <inkml:traceFormat>
-          <inkml:channel name="X" type="integer" min="-2.14748E9" max="2.14748E9" units="cm"/>
-          <inkml:channel name="Y" type="integer" min="-2.14748E9" max="2.14748E9" units="cm"/>
-          <inkml:channel name="F" type="integer" max="32767" units="dev"/>
-        </inkml:traceFormat>
-        <inkml:channelProperties>
-          <inkml:channelProperty channel="X" name="resolution" value="1000" units="1/cm"/>
-          <inkml:channelProperty channel="Y" name="resolution" value="1000" units="1/cm"/>
-          <inkml:channelProperty channel="F" name="resolution" value="0" units="1/dev"/>
-        </inkml:channelProperties>
-      </inkml:inkSource>
-      <inkml:timestamp xml:id="ts0" timeString="2024-10-07T00:18:14.929"/>
-    </inkml:context>
-    <inkml:brush xml:id="br0">
-      <inkml:brushProperty name="width" value="0.05" units="cm"/>
-      <inkml:brushProperty name="height" value="0.05" units="cm"/>
-      <inkml:brushProperty name="color" value="#E71224"/>
-    </inkml:brush>
-  </inkml:definitions>
-  <inkml:trace contextRef="#ctx0" brushRef="#br0">0 1 24575,'0'11'0,"0"-1"0,0-3 0,0 1 0,0 0 0,0-1 0,0 1 0,0-1 0,0 1 0,0-1 0,0 0 0,0 1 0,0-1 0,0 0 0,0 0 0,0 0 0,4 0 0,-4 0 0,7 0 0,-7 1 0,7-1 0,-7 0 0,7 0 0,-6 0 0,5 0 0,-5 0 0,5-3 0,-5 3 0,5-3 0,-5 3 0,5 0 0,-5 0 0,5 0 0,-5 0 0,5 0 0,-2 0 0,0-9 0,-1 3 0,-3-7 0</inkml:trace>
-</inkml:ink>
-</file>
-
-<file path=ppt/ink/ink32.xml><?xml version="1.0" encoding="utf-8"?>
-<inkml:ink xmlns:inkml="http://www.w3.org/2003/InkML">
-  <inkml:definitions>
-    <inkml:context xml:id="ctx0">
-      <inkml:inkSource xml:id="inkSrc0">
-        <inkml:traceFormat>
-          <inkml:channel name="X" type="integer" min="-2.14748E9" max="2.14748E9" units="cm"/>
-          <inkml:channel name="Y" type="integer" min="-2.14748E9" max="2.14748E9" units="cm"/>
-          <inkml:channel name="F" type="integer" max="32767" units="dev"/>
-        </inkml:traceFormat>
-        <inkml:channelProperties>
-          <inkml:channelProperty channel="X" name="resolution" value="1000" units="1/cm"/>
-          <inkml:channelProperty channel="Y" name="resolution" value="1000" units="1/cm"/>
-          <inkml:channelProperty channel="F" name="resolution" value="0" units="1/dev"/>
-        </inkml:channelProperties>
-      </inkml:inkSource>
-      <inkml:timestamp xml:id="ts0" timeString="2024-10-07T00:18:14.930"/>
-    </inkml:context>
-    <inkml:brush xml:id="br0">
-      <inkml:brushProperty name="width" value="0.05" units="cm"/>
-      <inkml:brushProperty name="height" value="0.05" units="cm"/>
-      <inkml:brushProperty name="color" value="#E71224"/>
-    </inkml:brush>
-  </inkml:definitions>
-  <inkml:trace contextRef="#ctx0" brushRef="#br0">132 1 24575,'-11'0'0,"0"0"0,4 0 0,-1 0 0,1 0 0,0 3 0,2 10 0,2 0 0,3 4 0,0-6 0,0-4 0,0 1 0,0 8 0,0-6 0,0 10 0,0-7 0,0 8 0,0-3 0,0 8 0,4-8 0,1 8 0,8-3 0,6 5 0,1 0 0,9 7 0,-4-4 0,1 3 0,3-4 0,-10-2 0,4-5 0,-9-1 0,-3-10 0,-3 0 0,0-5 0,-1 1 0,1 0 0,-4-1 0,-1 1 0,-3-1 0,0 1 0,0-1 0,0 0 0,-3-3 0,-1 3 0,-8-3 0,-1 0 0,-4 4 0,1-4 0,-6 5 0,4 0 0,-3-4 0,-1-2 0,4-3 0,1 0 0,1 0 0,7 0 0,-2 0 0,3 0 0,0 0 0,-3 0 0,2 0 0,-7 0 0,4 0 0,-1-3 0,-3-2 0,7 1 0,-2-3 0,6 3 0,-1 0 0,5-3 0,-3 6 0,4-2 0</inkml:trace>
-</inkml:ink>
-</file>
-
-<file path=ppt/ink/ink33.xml><?xml version="1.0" encoding="utf-8"?>
-<inkml:ink xmlns:inkml="http://www.w3.org/2003/InkML">
-  <inkml:definitions>
-    <inkml:context xml:id="ctx0">
-      <inkml:inkSource xml:id="inkSrc0">
-        <inkml:traceFormat>
-          <inkml:channel name="X" type="integer" min="-2.14748E9" max="2.14748E9" units="cm"/>
-          <inkml:channel name="Y" type="integer" min="-2.14748E9" max="2.14748E9" units="cm"/>
-          <inkml:channel name="F" type="integer" max="32767" units="dev"/>
-        </inkml:traceFormat>
-        <inkml:channelProperties>
-          <inkml:channelProperty channel="X" name="resolution" value="1000" units="1/cm"/>
-          <inkml:channelProperty channel="Y" name="resolution" value="1000" units="1/cm"/>
-          <inkml:channelProperty channel="F" name="resolution" value="0" units="1/dev"/>
-        </inkml:channelProperties>
-      </inkml:inkSource>
-      <inkml:timestamp xml:id="ts0" timeString="2024-10-07T00:18:14.931"/>
-    </inkml:context>
-    <inkml:brush xml:id="br0">
-      <inkml:brushProperty name="width" value="0.05" units="cm"/>
-      <inkml:brushProperty name="height" value="0.05" units="cm"/>
-      <inkml:brushProperty name="color" value="#E71224"/>
-    </inkml:brush>
-  </inkml:definitions>
-  <inkml:trace contextRef="#ctx0" brushRef="#br0">1 1 24575,'0'11'0,"0"-3"0,0 7 0,0-7 0,0 3 0,0-4 0,0 0 0,0 0 0,0 1 0,0-1 0,0 1 0,0-1 0,0 1 0,0-1 0,0 0 0,0 0 0,0 1 0,0-1 0,0 0 0,3-3 0,-2 3 0,6-4 0,-7 4 0,3 1 0,0-1 0,-2 0 0,6-3 0,-7-1 0,3-3 0</inkml:trace>
-</inkml:ink>
-</file>
-
-<file path=ppt/ink/ink34.xml><?xml version="1.0" encoding="utf-8"?>
-<inkml:ink xmlns:inkml="http://www.w3.org/2003/InkML">
-  <inkml:definitions>
-    <inkml:context xml:id="ctx0">
-      <inkml:inkSource xml:id="inkSrc0">
-        <inkml:traceFormat>
-          <inkml:channel name="X" type="integer" min="-2.14748E9" max="2.14748E9" units="cm"/>
-          <inkml:channel name="Y" type="integer" min="-2.14748E9" max="2.14748E9" units="cm"/>
-          <inkml:channel name="F" type="integer" max="32767" units="dev"/>
-        </inkml:traceFormat>
-        <inkml:channelProperties>
-          <inkml:channelProperty channel="X" name="resolution" value="1000" units="1/cm"/>
-          <inkml:channelProperty channel="Y" name="resolution" value="1000" units="1/cm"/>
-          <inkml:channelProperty channel="F" name="resolution" value="0" units="1/dev"/>
-        </inkml:channelProperties>
-      </inkml:inkSource>
-      <inkml:timestamp xml:id="ts0" timeString="2024-10-07T00:18:14.932"/>
-    </inkml:context>
-    <inkml:brush xml:id="br0">
-      <inkml:brushProperty name="width" value="0.05" units="cm"/>
-      <inkml:brushProperty name="height" value="0.05" units="cm"/>
-      <inkml:brushProperty name="color" value="#E71224"/>
-    </inkml:brush>
-  </inkml:definitions>
-  <inkml:trace contextRef="#ctx0" brushRef="#br0">0 1 24575,'0'5'0,"0"-2"0,0 11 0,0-2 0,0-4 0,0 8 0,0-8 0,0 8 0,0-8 0,0 8 0,0-7 0,0 2 0,0-3 0,0-1 0,0 1 0,0-1 0,0 1 0,0-1 0,0 0 0,0-10 0,0-7 0,0-17 0,0-2 0,0 8 0,0 9 0</inkml:trace>
-</inkml:ink>
-</file>
-
-<file path=ppt/ink/ink35.xml><?xml version="1.0" encoding="utf-8"?>
-<inkml:ink xmlns:inkml="http://www.w3.org/2003/InkML">
-  <inkml:definitions>
-    <inkml:context xml:id="ctx0">
-      <inkml:inkSource xml:id="inkSrc0">
-        <inkml:traceFormat>
-          <inkml:channel name="X" type="integer" min="-2.14748E9" max="2.14748E9" units="cm"/>
-          <inkml:channel name="Y" type="integer" min="-2.14748E9" max="2.14748E9" units="cm"/>
-          <inkml:channel name="F" type="integer" max="32767" units="dev"/>
-        </inkml:traceFormat>
-        <inkml:channelProperties>
-          <inkml:channelProperty channel="X" name="resolution" value="1000" units="1/cm"/>
-          <inkml:channelProperty channel="Y" name="resolution" value="1000" units="1/cm"/>
-          <inkml:channelProperty channel="F" name="resolution" value="0" units="1/dev"/>
-        </inkml:channelProperties>
-      </inkml:inkSource>
-      <inkml:timestamp xml:id="ts0" timeString="2024-10-07T00:18:14.933"/>
-    </inkml:context>
-    <inkml:brush xml:id="br0">
-      <inkml:brushProperty name="width" value="0.05" units="cm"/>
-      <inkml:brushProperty name="height" value="0.05" units="cm"/>
-      <inkml:brushProperty name="color" value="#E71224"/>
-    </inkml:brush>
-  </inkml:definitions>
-  <inkml:trace contextRef="#ctx0" brushRef="#br0">335 1 24575,'-3'4'0,"-5"-1"0,0-3 0,-8 0 0,3 0 0,-4 0 0,5 0 0,-4 0 0,7 0 0,-3 0 0,5 0 0,-4 0 0,3 0 0,-7 0 0,7 3 0,-3 5 0,3 1 0,0 6 0,-4-2 0,3 4 0,-7-1 0,7-3 0,-3 3 0,8-8 0,-3 4 0,6-5 0,-3 1 0,4-1 0,0 1 0,0-1 0,0 0 0,0 0 0,4 1 0,0-1 0,7 5 0,-2 1 0,7 3 0,-3 1 0,4 0 0,-4-1 0,2 1 0,-5-1 0,5-3 0,-6-1 0,3 0 0,-4-3 0,0 2 0,-1-3 0,1-1 0,-1 1 0,1 3 0,0-2 0,0 2 0,-1 1 0,1-3 0,0 2 0,-1-3 0,-2-1 0,-2 1 0,0-1 0,-2 1 0,3-1 0,-4 0 0,0 0 0,-4-3 0,0-1 0,-4-3 0,-3 0 0,2 0 0,-7 4 0,3-3 0,-3 2 0,-1-3 0,0 0 0,-4 0 0,3 0 0,-9 0 0,9 0 0,-3 0 0,4 0 0,0 0 0,1 0 0,3 0 0,-3 0 0,7 0 0,-2 0 0,7-3 0,1-1 0,3 0 0,0 1 0</inkml:trace>
-</inkml:ink>
-</file>
-
-<file path=ppt/ink/ink36.xml><?xml version="1.0" encoding="utf-8"?>
-<inkml:ink xmlns:inkml="http://www.w3.org/2003/InkML">
-  <inkml:definitions>
-    <inkml:context xml:id="ctx0">
-      <inkml:inkSource xml:id="inkSrc0">
-        <inkml:traceFormat>
-          <inkml:channel name="X" type="integer" min="-2.14748E9" max="2.14748E9" units="cm"/>
-          <inkml:channel name="Y" type="integer" min="-2.14748E9" max="2.14748E9" units="cm"/>
-          <inkml:channel name="F" type="integer" max="32767" units="dev"/>
-        </inkml:traceFormat>
-        <inkml:channelProperties>
-          <inkml:channelProperty channel="X" name="resolution" value="1000" units="1/cm"/>
-          <inkml:channelProperty channel="Y" name="resolution" value="1000" units="1/cm"/>
-          <inkml:channelProperty channel="F" name="resolution" value="0" units="1/dev"/>
-        </inkml:channelProperties>
-      </inkml:inkSource>
-      <inkml:timestamp xml:id="ts0" timeString="2024-10-07T00:18:14.934"/>
-    </inkml:context>
-    <inkml:brush xml:id="br0">
-      <inkml:brushProperty name="width" value="0.05" units="cm"/>
-      <inkml:brushProperty name="height" value="0.05" units="cm"/>
-      <inkml:brushProperty name="color" value="#E71224"/>
-    </inkml:brush>
-  </inkml:definitions>
-  <inkml:trace contextRef="#ctx0" brushRef="#br0">1 1 24575,'0'7'0,"0"0"0,0 0 0,0 1 0,0 0 0,0-1 0,0 0 0,0 1 0,0-1 0,0 5 0,0-4 0,0 8 0,3-8 0,-2 8 0,6-7 0,-6 2 0,2 1 0,0-4 0,-2 4 0,3-5 0,-4 1 0,0-1 0,0 1 0,0 0 0,0-1 0,0 1 0,3-1 0,-2 1 0,2-1 0,0-3 0,-2-4 0,2-1 0,-3-2 0</inkml:trace>
-</inkml:ink>
-</file>
-
-<file path=ppt/ink/ink37.xml><?xml version="1.0" encoding="utf-8"?>
-<inkml:ink xmlns:inkml="http://www.w3.org/2003/InkML">
-  <inkml:definitions>
-    <inkml:context xml:id="ctx0">
-      <inkml:inkSource xml:id="inkSrc0">
-        <inkml:traceFormat>
-          <inkml:channel name="X" type="integer" min="-2.14748E9" max="2.14748E9" units="cm"/>
-          <inkml:channel name="Y" type="integer" min="-2.14748E9" max="2.14748E9" units="cm"/>
-          <inkml:channel name="F" type="integer" max="32767" units="dev"/>
-        </inkml:traceFormat>
-        <inkml:channelProperties>
-          <inkml:channelProperty channel="X" name="resolution" value="1000" units="1/cm"/>
-          <inkml:channelProperty channel="Y" name="resolution" value="1000" units="1/cm"/>
-          <inkml:channelProperty channel="F" name="resolution" value="0" units="1/dev"/>
-        </inkml:channelProperties>
-      </inkml:inkSource>
-      <inkml:timestamp xml:id="ts0" timeString="2024-10-07T00:18:14.935"/>
-    </inkml:context>
-    <inkml:brush xml:id="br0">
-      <inkml:brushProperty name="width" value="0.05" units="cm"/>
-      <inkml:brushProperty name="height" value="0.05" units="cm"/>
-      <inkml:brushProperty name="color" value="#E71224"/>
-    </inkml:brush>
-  </inkml:definitions>
-  <inkml:trace contextRef="#ctx0" brushRef="#br0">0 1 24575,'0'11'0,"0"-1"0,0-3 0,0 1 0,0 0 0,0-1 0,0 1 0,0-1 0,0 1 0,0-1 0,0 0 0,0 1 0,0-1 0,0 0 0,0 0 0,0 0 0,4 0 0,-4 0 0,7 0 0,-7 1 0,7-1 0,-7 0 0,7 0 0,-6 0 0,5 0 0,-5 0 0,5-3 0,-5 3 0,5-3 0,-5 3 0,5 0 0,-5 0 0,5 0 0,-5 0 0,5 0 0,-2 0 0,0-9 0,-1 3 0,-3-7 0</inkml:trace>
-</inkml:ink>
-</file>
-
-<file path=ppt/ink/ink38.xml><?xml version="1.0" encoding="utf-8"?>
-<inkml:ink xmlns:inkml="http://www.w3.org/2003/InkML">
-  <inkml:definitions>
-    <inkml:context xml:id="ctx0">
-      <inkml:inkSource xml:id="inkSrc0">
-        <inkml:traceFormat>
-          <inkml:channel name="X" type="integer" min="-2.14748E9" max="2.14748E9" units="cm"/>
-          <inkml:channel name="Y" type="integer" min="-2.14748E9" max="2.14748E9" units="cm"/>
-          <inkml:channel name="F" type="integer" max="32767" units="dev"/>
-        </inkml:traceFormat>
-        <inkml:channelProperties>
-          <inkml:channelProperty channel="X" name="resolution" value="1000" units="1/cm"/>
-          <inkml:channelProperty channel="Y" name="resolution" value="1000" units="1/cm"/>
-          <inkml:channelProperty channel="F" name="resolution" value="0" units="1/dev"/>
-        </inkml:channelProperties>
-      </inkml:inkSource>
-      <inkml:timestamp xml:id="ts0" timeString="2024-10-07T00:21:14.558"/>
-    </inkml:context>
-    <inkml:brush xml:id="br0">
-      <inkml:brushProperty name="width" value="0.05" units="cm"/>
-      <inkml:brushProperty name="height" value="0.05" units="cm"/>
-      <inkml:brushProperty name="color" value="#FFC114"/>
-    </inkml:brush>
-  </inkml:definitions>
-  <inkml:trace contextRef="#ctx0" brushRef="#br0">398 1 24575,'-15'0'0,"-2"0"0,-8 0 0,-1 0 0,1 4 0,4-3 0,3 2 0,-11 3 0,15-2 0,-14 2 0,20-3 0,-4 0 0,7 0 0,-1 7 0,6 6 0,0-2 0,0 11 0,0-5 0,0 5 0,0 1 0,4-1 0,-3-8 0,6 6 0,-3-11 0,4 7 0,-1-1 0,0-6 0,-3 3 0,2-5 0,-5-3 0,2 3 0,-3-4 0,-3 4 0,-1-3 0,-2 6 0,-4-6 0,2 3 0,-1-6 0,-1-2 0,-16 4 0,4-1 0,-8 1 0,11-2 0,5-4 0,4 0 0,0 0 0,3 0 0,1 0 0,2 0 0,1 0 0</inkml:trace>
-</inkml:ink>
-</file>
-
-<file path=ppt/ink/ink39.xml><?xml version="1.0" encoding="utf-8"?>
+<file path=ppt/ink/ink40.xml><?xml version="1.0" encoding="utf-8"?>
 <inkml:ink xmlns:inkml="http://www.w3.org/2003/InkML">
   <inkml:definitions>
     <inkml:context xml:id="ctx0">
@@ -4153,39 +4204,7 @@
 </inkml:ink>
 </file>
 
-<file path=ppt/ink/ink4.xml><?xml version="1.0" encoding="utf-8"?>
-<inkml:ink xmlns:inkml="http://www.w3.org/2003/InkML">
-  <inkml:definitions>
-    <inkml:context xml:id="ctx0">
-      <inkml:inkSource xml:id="inkSrc0">
-        <inkml:traceFormat>
-          <inkml:channel name="X" type="integer" min="-2.14748E9" max="2.14748E9" units="cm"/>
-          <inkml:channel name="Y" type="integer" min="-2.14748E9" max="2.14748E9" units="cm"/>
-          <inkml:channel name="F" type="integer" max="32767" units="dev"/>
-        </inkml:traceFormat>
-        <inkml:channelProperties>
-          <inkml:channelProperty channel="X" name="resolution" value="1000" units="1/cm"/>
-          <inkml:channelProperty channel="Y" name="resolution" value="1000" units="1/cm"/>
-          <inkml:channelProperty channel="F" name="resolution" value="0" units="1/dev"/>
-        </inkml:channelProperties>
-      </inkml:inkSource>
-      <inkml:timestamp xml:id="ts0" timeString="2024-10-07T00:18:14.902"/>
-    </inkml:context>
-    <inkml:brush xml:id="br0">
-      <inkml:brushProperty name="width" value="0.1" units="cm"/>
-      <inkml:brushProperty name="height" value="0.1" units="cm"/>
-      <inkml:brushProperty name="color" value="#AE198D"/>
-      <inkml:brushProperty name="inkEffects" value="galaxy"/>
-      <inkml:brushProperty name="anchorX" value="-78670.78125"/>
-      <inkml:brushProperty name="anchorY" value="-66124.96094"/>
-      <inkml:brushProperty name="scaleFactor" value="0.5"/>
-    </inkml:brush>
-  </inkml:definitions>
-  <inkml:trace contextRef="#ctx0" brushRef="#br0">1 1 24575,'0'27'0,"0"6"0,0 2 0,0 11 0,0-11 0,0 10 0,0 3 0,0-5 0,0 10 0,0-7 0,0-5 0,0-1 0,0-7 0,0-5 0,0-6 0,0-4 0,0-3 0,0-6 0,0 2 0,0-6 0,0-2 0</inkml:trace>
-</inkml:ink>
-</file>
-
-<file path=ppt/ink/ink40.xml><?xml version="1.0" encoding="utf-8"?>
+<file path=ppt/ink/ink41.xml><?xml version="1.0" encoding="utf-8"?>
 <inkml:ink xmlns:inkml="http://www.w3.org/2003/InkML">
   <inkml:definitions>
     <inkml:context xml:id="ctx0">
@@ -4213,7 +4232,7 @@
 </inkml:ink>
 </file>
 
-<file path=ppt/ink/ink41.xml><?xml version="1.0" encoding="utf-8"?>
+<file path=ppt/ink/ink42.xml><?xml version="1.0" encoding="utf-8"?>
 <inkml:ink xmlns:inkml="http://www.w3.org/2003/InkML">
   <inkml:definitions>
     <inkml:context xml:id="ctx0">
@@ -4241,7 +4260,7 @@
 </inkml:ink>
 </file>
 
-<file path=ppt/ink/ink42.xml><?xml version="1.0" encoding="utf-8"?>
+<file path=ppt/ink/ink43.xml><?xml version="1.0" encoding="utf-8"?>
 <inkml:ink xmlns:inkml="http://www.w3.org/2003/InkML">
   <inkml:definitions>
     <inkml:context xml:id="ctx0">
@@ -4269,7 +4288,7 @@
 </inkml:ink>
 </file>
 
-<file path=ppt/ink/ink43.xml><?xml version="1.0" encoding="utf-8"?>
+<file path=ppt/ink/ink44.xml><?xml version="1.0" encoding="utf-8"?>
 <inkml:ink xmlns:inkml="http://www.w3.org/2003/InkML">
   <inkml:definitions>
     <inkml:context xml:id="ctx0">
@@ -4297,7 +4316,7 @@
 </inkml:ink>
 </file>
 
-<file path=ppt/ink/ink44.xml><?xml version="1.0" encoding="utf-8"?>
+<file path=ppt/ink/ink45.xml><?xml version="1.0" encoding="utf-8"?>
 <inkml:ink xmlns:inkml="http://www.w3.org/2003/InkML">
   <inkml:definitions>
     <inkml:context xml:id="ctx0">
@@ -4325,7 +4344,7 @@
 </inkml:ink>
 </file>
 
-<file path=ppt/ink/ink45.xml><?xml version="1.0" encoding="utf-8"?>
+<file path=ppt/ink/ink46.xml><?xml version="1.0" encoding="utf-8"?>
 <inkml:ink xmlns:inkml="http://www.w3.org/2003/InkML">
   <inkml:definitions>
     <inkml:context xml:id="ctx0">
@@ -4353,7 +4372,7 @@
 </inkml:ink>
 </file>
 
-<file path=ppt/ink/ink46.xml><?xml version="1.0" encoding="utf-8"?>
+<file path=ppt/ink/ink47.xml><?xml version="1.0" encoding="utf-8"?>
 <inkml:ink xmlns:inkml="http://www.w3.org/2003/InkML">
   <inkml:definitions>
     <inkml:context xml:id="ctx0">
@@ -4397,6 +4416,38 @@
           <inkml:channelProperty channel="F" name="resolution" value="0" units="1/dev"/>
         </inkml:channelProperties>
       </inkml:inkSource>
+      <inkml:timestamp xml:id="ts0" timeString="2024-10-07T00:18:14.902"/>
+    </inkml:context>
+    <inkml:brush xml:id="br0">
+      <inkml:brushProperty name="width" value="0.1" units="cm"/>
+      <inkml:brushProperty name="height" value="0.1" units="cm"/>
+      <inkml:brushProperty name="color" value="#AE198D"/>
+      <inkml:brushProperty name="inkEffects" value="galaxy"/>
+      <inkml:brushProperty name="anchorX" value="-78670.78125"/>
+      <inkml:brushProperty name="anchorY" value="-66124.96094"/>
+      <inkml:brushProperty name="scaleFactor" value="0.5"/>
+    </inkml:brush>
+  </inkml:definitions>
+  <inkml:trace contextRef="#ctx0" brushRef="#br0">1 1 24575,'0'27'0,"0"6"0,0 2 0,0 11 0,0-11 0,0 10 0,0 3 0,0-5 0,0 10 0,0-7 0,0-5 0,0-1 0,0-7 0,0-5 0,0-6 0,0-4 0,0-3 0,0-6 0,0 2 0,0-6 0,0-2 0</inkml:trace>
+</inkml:ink>
+</file>
+
+<file path=ppt/ink/ink6.xml><?xml version="1.0" encoding="utf-8"?>
+<inkml:ink xmlns:inkml="http://www.w3.org/2003/InkML">
+  <inkml:definitions>
+    <inkml:context xml:id="ctx0">
+      <inkml:inkSource xml:id="inkSrc0">
+        <inkml:traceFormat>
+          <inkml:channel name="X" type="integer" min="-2.14748E9" max="2.14748E9" units="cm"/>
+          <inkml:channel name="Y" type="integer" min="-2.14748E9" max="2.14748E9" units="cm"/>
+          <inkml:channel name="F" type="integer" max="32767" units="dev"/>
+        </inkml:traceFormat>
+        <inkml:channelProperties>
+          <inkml:channelProperty channel="X" name="resolution" value="1000" units="1/cm"/>
+          <inkml:channelProperty channel="Y" name="resolution" value="1000" units="1/cm"/>
+          <inkml:channelProperty channel="F" name="resolution" value="0" units="1/dev"/>
+        </inkml:channelProperties>
+      </inkml:inkSource>
       <inkml:timestamp xml:id="ts0" timeString="2024-10-07T00:18:14.903"/>
     </inkml:context>
     <inkml:brush xml:id="br0">
@@ -4413,7 +4464,7 @@
 </inkml:ink>
 </file>
 
-<file path=ppt/ink/ink6.xml><?xml version="1.0" encoding="utf-8"?>
+<file path=ppt/ink/ink7.xml><?xml version="1.0" encoding="utf-8"?>
 <inkml:ink xmlns:inkml="http://www.w3.org/2003/InkML">
   <inkml:definitions>
     <inkml:context xml:id="ctx0">
@@ -4445,7 +4496,7 @@
 </inkml:ink>
 </file>
 
-<file path=ppt/ink/ink7.xml><?xml version="1.0" encoding="utf-8"?>
+<file path=ppt/ink/ink8.xml><?xml version="1.0" encoding="utf-8"?>
 <inkml:ink xmlns:inkml="http://www.w3.org/2003/InkML">
   <inkml:definitions>
     <inkml:context xml:id="ctx0">
@@ -4477,7 +4528,7 @@
 </inkml:ink>
 </file>
 
-<file path=ppt/ink/ink8.xml><?xml version="1.0" encoding="utf-8"?>
+<file path=ppt/ink/ink9.xml><?xml version="1.0" encoding="utf-8"?>
 <inkml:ink xmlns:inkml="http://www.w3.org/2003/InkML">
   <inkml:definitions>
     <inkml:context xml:id="ctx0">
@@ -4506,38 +4557,6 @@
     </inkml:brush>
   </inkml:definitions>
   <inkml:trace contextRef="#ctx0" brushRef="#br0">0 1 24575,'3'10'0,"1"-1"0,3-5 0,17 4 0,-10-3 0,20 4 0,-14-1 0,6 0 0,-6-3 0,4 3 0,-12-7 0,11 2 0,-11-3 0,12 4 0,-13 0 0,4 0 0,-5-1 0,6-3 0,4 0 0,5 0 0,1 0 0,-1 0 0,-5 0 0,-1 0 0,0 0 0,1 0 0,5 0 0,-5 0 0,4 0 0,-4 0 0,0 0 0,-1 0 0,-9 0 0,3 0 0,-6 0 0,3 0 0,-3 0 0,-1 0 0,1 0 0,-1 0 0,1 0 0,3 0 0,-3 0 0,3 0 0,-4 0 0,1 0 0,0 0 0,-4 0 0,0 0 0</inkml:trace>
-</inkml:ink>
-</file>
-
-<file path=ppt/ink/ink9.xml><?xml version="1.0" encoding="utf-8"?>
-<inkml:ink xmlns:inkml="http://www.w3.org/2003/InkML">
-  <inkml:definitions>
-    <inkml:context xml:id="ctx0">
-      <inkml:inkSource xml:id="inkSrc0">
-        <inkml:traceFormat>
-          <inkml:channel name="X" type="integer" min="-2.14748E9" max="2.14748E9" units="cm"/>
-          <inkml:channel name="Y" type="integer" min="-2.14748E9" max="2.14748E9" units="cm"/>
-          <inkml:channel name="F" type="integer" max="32767" units="dev"/>
-        </inkml:traceFormat>
-        <inkml:channelProperties>
-          <inkml:channelProperty channel="X" name="resolution" value="1000" units="1/cm"/>
-          <inkml:channelProperty channel="Y" name="resolution" value="1000" units="1/cm"/>
-          <inkml:channelProperty channel="F" name="resolution" value="0" units="1/dev"/>
-        </inkml:channelProperties>
-      </inkml:inkSource>
-      <inkml:timestamp xml:id="ts0" timeString="2024-10-07T00:18:14.907"/>
-    </inkml:context>
-    <inkml:brush xml:id="br0">
-      <inkml:brushProperty name="width" value="0.1" units="cm"/>
-      <inkml:brushProperty name="height" value="0.1" units="cm"/>
-      <inkml:brushProperty name="color" value="#AE198D"/>
-      <inkml:brushProperty name="inkEffects" value="galaxy"/>
-      <inkml:brushProperty name="anchorX" value="-280851"/>
-      <inkml:brushProperty name="anchorY" value="-263575.53125"/>
-      <inkml:brushProperty name="scaleFactor" value="0.5"/>
-    </inkml:brush>
-  </inkml:definitions>
-  <inkml:trace contextRef="#ctx0" brushRef="#br0">0 7 24575,'10'-4'0,"0"1"0,0 3 0,-3 0 0,6 0 0,-6 0 0,5 0 0,-1 3 0,2 1 0,-2 2 0,-2-2 0,-2-1 0,8 1 0,-7 0 0,10 3 0,-10 0 0,1-1 0,-2 1 0,0-1 0,2 1 0,-1 3 0,1-3 0,-5 3 0,-1-4 0,0 4 0,0-3 0,1 3 0,-1-4 0,-3 1 0,0 3 0,0-3 0,0 3 0,0-4 0,-3 4 0,-1-3 0,-2 3 0,-1-4 0,0 1 0,0 0 0,1-1 0,-1 1 0,0-3 0,0-2 0,1-2 0,-1 0 0,0 0 0,1 0 0,-1 0 0,0 0 0,0 0 0,1-3 0,2 0 0,1-4 0,6 0 0,0 4 0,4 0 0,3 5 0,0-1 0,3 5 0,1-2 0,-1 2 0,0 1 0,1 0 0,-1 2 0,0-1 0,1 4 0,-1-4 0,0 4 0,1-5 0,-4 3 0,0-6 0,-1 2 0,-1-3 0,1 4 0,1 0 0,0-1 0,1 1 0,-2-4 0,1 3 0,-3-2 0,6 0 0,-6-1 0,6 0 0,-6-3 0,3 3 0,-1-3 0,2 0 0,-1 0 0,3 0 0,-3 0 0,3 0 0,-2 0 0,-2 0 0,-2 0 0,0 0 0,-1 0 0,1 0 0,-4 0 0,0 0 0</inkml:trace>
 </inkml:ink>
 </file>
 
@@ -4934,10 +4953,65 @@
           <a:bodyPr/>
           <a:lstStyle/>
           <a:p>
+            <a:pPr marL="0" marR="0" lvl="0" indent="0" algn="l" defTabSz="914400" rtl="0" eaLnBrk="1" fontAlgn="auto" latinLnBrk="0" hangingPunct="1">
+              <a:lnSpc>
+                <a:spcPct val="100000"/>
+              </a:lnSpc>
+              <a:spcBef>
+                <a:spcPts val="0"/>
+              </a:spcBef>
+              <a:spcAft>
+                <a:spcPts val="0"/>
+              </a:spcAft>
+              <a:buClrTx/>
+              <a:buSzTx/>
+              <a:buFontTx/>
+              <a:buNone/>
+              <a:tabLst/>
+              <a:defRPr/>
+            </a:pPr>
             <a:r>
               <a:rPr lang="en-US" dirty="0"/>
-              <a:t>Talk about HMM</a:t>
+              <a:t>1. Latent variable models (LVMs) are used to capture the dynamics of neural circuits given recordings of signals from the brain</a:t>
             </a:r>
+            <a:br>
+              <a:rPr lang="en-US" dirty="0"/>
+            </a:br>
+            <a:r>
+              <a:rPr lang="en-US" dirty="0"/>
+              <a:t>2. LVMs assume that the dynamical system remains fixed. However, the brain is continuously evolving with time, i.e. ’learning’</a:t>
+            </a:r>
+          </a:p>
+          <a:p>
+            <a:pPr marL="0" marR="0" lvl="0" indent="0" algn="l" defTabSz="914400" rtl="0" eaLnBrk="1" fontAlgn="auto" latinLnBrk="0" hangingPunct="1">
+              <a:lnSpc>
+                <a:spcPct val="100000"/>
+              </a:lnSpc>
+              <a:spcBef>
+                <a:spcPts val="0"/>
+              </a:spcBef>
+              <a:spcAft>
+                <a:spcPts val="0"/>
+              </a:spcAft>
+              <a:buClrTx/>
+              <a:buSzTx/>
+              <a:buFontTx/>
+              <a:buNone/>
+              <a:tabLst/>
+              <a:defRPr/>
+            </a:pPr>
+            <a:r>
+              <a:rPr lang="en-US" dirty="0"/>
+              <a:t>3. We study the novel scenario of fitting LVMs to a learning brain using a student-teacher setting </a:t>
+            </a:r>
+            <a:r>
+              <a:rPr lang="en-US" i="1" dirty="0"/>
+              <a:t>(in a few slides)</a:t>
+            </a:r>
+            <a:endParaRPr lang="en-US" dirty="0"/>
+          </a:p>
+          <a:p>
+            <a:endParaRPr lang="en-US" dirty="0"/>
           </a:p>
         </p:txBody>
       </p:sp>
@@ -5021,7 +5095,10 @@
           <a:bodyPr/>
           <a:lstStyle/>
           <a:p>
-            <a:endParaRPr lang="en-US" dirty="0"/>
+            <a:r>
+              <a:rPr lang="en-US" dirty="0"/>
+              <a:t>Explain what ”bad” means</a:t>
+            </a:r>
           </a:p>
         </p:txBody>
       </p:sp>
@@ -5110,6 +5187,19 @@
               <a:t>Explain about the tuple. </a:t>
             </a:r>
           </a:p>
+          <a:p>
+            <a:r>
+              <a:rPr lang="en-US" dirty="0"/>
+              <a:t>1. h1 is discrete, e.g. h1=3</a:t>
+            </a:r>
+            <a:br>
+              <a:rPr lang="en-US" dirty="0"/>
+            </a:br>
+            <a:r>
+              <a:rPr lang="en-US" dirty="0"/>
+              <a:t>2. Explain the process</a:t>
+            </a:r>
+          </a:p>
         </p:txBody>
       </p:sp>
       <p:sp>
@@ -5177,6 +5267,460 @@
         </p:nvSpPr>
         <p:spPr/>
       </p:sp>
+      <mc:AlternateContent xmlns:mc="http://schemas.openxmlformats.org/markup-compatibility/2006">
+        <mc:Choice xmlns:a14="http://schemas.microsoft.com/office/drawing/2010/main" Requires="a14">
+          <p:sp>
+            <p:nvSpPr>
+              <p:cNvPr id="3" name="Notes Placeholder 2"/>
+              <p:cNvSpPr>
+                <a:spLocks noGrp="1"/>
+              </p:cNvSpPr>
+              <p:nvPr>
+                <p:ph type="body" idx="1"/>
+              </p:nvPr>
+            </p:nvSpPr>
+            <p:spPr/>
+            <p:txBody>
+              <a:bodyPr/>
+              <a:lstStyle/>
+              <a:p>
+                <a:pPr marL="228600" indent="-228600">
+                  <a:buAutoNum type="arabicPeriod"/>
+                </a:pPr>
+                <a:r>
+                  <a:rPr lang="en-US" baseline="0" dirty="0"/>
+                  <a:t>To represent the learning process, we </a:t>
+                </a:r>
+                <a:r>
+                  <a:rPr lang="en-US" baseline="0" dirty="0" err="1"/>
+                  <a:t>init</a:t>
+                </a:r>
+                <a:r>
+                  <a:rPr lang="en-US" baseline="0" dirty="0"/>
+                  <a:t> a teacher</a:t>
+                </a:r>
+              </a:p>
+              <a:p>
+                <a:pPr marL="228600" indent="-228600">
+                  <a:buAutoNum type="arabicPeriod"/>
+                </a:pPr>
+                <a:r>
+                  <a:rPr lang="en-US" baseline="0" dirty="0"/>
+                  <a:t>How we </a:t>
+                </a:r>
+                <a:r>
+                  <a:rPr lang="en-US" baseline="0" dirty="0" err="1"/>
+                  <a:t>init</a:t>
+                </a:r>
+                <a:r>
+                  <a:rPr lang="en-US" baseline="0" dirty="0"/>
+                  <a:t> the teacher (size of dim, states, params type- diagonal…)</a:t>
+                </a:r>
+              </a:p>
+              <a:p>
+                <a:pPr marL="228600" indent="-228600">
+                  <a:buAutoNum type="arabicPeriod"/>
+                </a:pPr>
+                <a:r>
+                  <a:rPr lang="en-US" baseline="0" dirty="0"/>
+                  <a:t>Explain the perturbation </a:t>
+                </a:r>
+                <a14:m>
+                  <m:oMath xmlns:m="http://schemas.openxmlformats.org/officeDocument/2006/math">
+                    <m:sSub>
+                      <m:sSubPr>
+                        <m:ctrlPr>
+                          <a:rPr lang="en-US" sz="1200" i="1" kern="0" smtClean="0">
+                            <a:uFill>
+                              <a:solidFill>
+                                <a:srgbClr val="000000"/>
+                              </a:solidFill>
+                            </a:uFill>
+                            <a:latin typeface="Cambria Math" panose="02040503050406030204" pitchFamily="18" charset="0"/>
+                            <a:ea typeface="Arial Unicode MS" panose="020B0604020202020204" pitchFamily="34" charset="-128"/>
+                            <a:cs typeface="Arial Unicode MS" panose="020B0604020202020204" pitchFamily="34" charset="-128"/>
+                          </a:rPr>
+                        </m:ctrlPr>
+                      </m:sSubPr>
+                      <m:e>
+                        <m:r>
+                          <a:rPr lang="en-US" sz="1200" i="1" kern="0">
+                            <a:uFill>
+                              <a:solidFill>
+                                <a:srgbClr val="000000"/>
+                              </a:solidFill>
+                            </a:uFill>
+                            <a:latin typeface="Cambria Math" panose="02040503050406030204" pitchFamily="18" charset="0"/>
+                            <a:ea typeface="Arial Unicode MS" panose="020B0604020202020204" pitchFamily="34" charset="-128"/>
+                            <a:cs typeface="Arial Unicode MS" panose="020B0604020202020204" pitchFamily="34" charset="-128"/>
+                          </a:rPr>
+                          <m:t>𝑇</m:t>
+                        </m:r>
+                      </m:e>
+                      <m:sub>
+                        <m:r>
+                          <a:rPr lang="en-US" sz="1200" i="1" kern="0">
+                            <a:uFill>
+                              <a:solidFill>
+                                <a:srgbClr val="000000"/>
+                              </a:solidFill>
+                            </a:uFill>
+                            <a:latin typeface="Cambria Math" panose="02040503050406030204" pitchFamily="18" charset="0"/>
+                            <a:ea typeface="Arial Unicode MS" panose="020B0604020202020204" pitchFamily="34" charset="-128"/>
+                            <a:cs typeface="Arial Unicode MS" panose="020B0604020202020204" pitchFamily="34" charset="-128"/>
+                          </a:rPr>
+                          <m:t>𝑖</m:t>
+                        </m:r>
+                      </m:sub>
+                    </m:sSub>
+                    <m:r>
+                      <m:rPr>
+                        <m:nor/>
+                      </m:rPr>
+                      <a:rPr lang="en-US" sz="1200" kern="0" dirty="0">
+                        <a:uFill>
+                          <a:solidFill>
+                            <a:srgbClr val="000000"/>
+                          </a:solidFill>
+                        </a:uFill>
+                        <a:latin typeface="Calibri" panose="020F0502020204030204" pitchFamily="34" charset="0"/>
+                        <a:ea typeface="Arial Unicode MS" panose="020B0604020202020204" pitchFamily="34" charset="-128"/>
+                        <a:cs typeface="Arial Unicode MS" panose="020B0604020202020204" pitchFamily="34" charset="-128"/>
+                      </a:rPr>
+                      <m:t> = </m:t>
+                    </m:r>
+                    <m:sSub>
+                      <m:sSubPr>
+                        <m:ctrlPr>
+                          <a:rPr lang="en-US" sz="1200" i="1" kern="0">
+                            <a:uFill>
+                              <a:solidFill>
+                                <a:srgbClr val="000000"/>
+                              </a:solidFill>
+                            </a:uFill>
+                            <a:latin typeface="Cambria Math" panose="02040503050406030204" pitchFamily="18" charset="0"/>
+                            <a:ea typeface="Arial Unicode MS" panose="020B0604020202020204" pitchFamily="34" charset="-128"/>
+                            <a:cs typeface="Arial Unicode MS" panose="020B0604020202020204" pitchFamily="34" charset="-128"/>
+                          </a:rPr>
+                        </m:ctrlPr>
+                      </m:sSubPr>
+                      <m:e>
+                        <m:r>
+                          <a:rPr lang="en-US" sz="1200" i="1" kern="0">
+                            <a:uFill>
+                              <a:solidFill>
+                                <a:srgbClr val="000000"/>
+                              </a:solidFill>
+                            </a:uFill>
+                            <a:latin typeface="Cambria Math" panose="02040503050406030204" pitchFamily="18" charset="0"/>
+                            <a:ea typeface="Arial Unicode MS" panose="020B0604020202020204" pitchFamily="34" charset="-128"/>
+                            <a:cs typeface="Arial Unicode MS" panose="020B0604020202020204" pitchFamily="34" charset="-128"/>
+                          </a:rPr>
+                          <m:t>𝑇</m:t>
+                        </m:r>
+                      </m:e>
+                      <m:sub>
+                        <m:r>
+                          <a:rPr lang="en-US" sz="1200" i="1" kern="0">
+                            <a:uFill>
+                              <a:solidFill>
+                                <a:srgbClr val="000000"/>
+                              </a:solidFill>
+                            </a:uFill>
+                            <a:latin typeface="Cambria Math" panose="02040503050406030204" pitchFamily="18" charset="0"/>
+                            <a:ea typeface="Arial Unicode MS" panose="020B0604020202020204" pitchFamily="34" charset="-128"/>
+                            <a:cs typeface="Arial Unicode MS" panose="020B0604020202020204" pitchFamily="34" charset="-128"/>
+                          </a:rPr>
+                          <m:t>𝑖</m:t>
+                        </m:r>
+                        <m:r>
+                          <a:rPr lang="en-US" sz="1200" i="1" kern="0">
+                            <a:uFill>
+                              <a:solidFill>
+                                <a:srgbClr val="000000"/>
+                              </a:solidFill>
+                            </a:uFill>
+                            <a:latin typeface="Cambria Math" panose="02040503050406030204" pitchFamily="18" charset="0"/>
+                            <a:ea typeface="Arial Unicode MS" panose="020B0604020202020204" pitchFamily="34" charset="-128"/>
+                            <a:cs typeface="Arial Unicode MS" panose="020B0604020202020204" pitchFamily="34" charset="-128"/>
+                          </a:rPr>
+                          <m:t>−1</m:t>
+                        </m:r>
+                      </m:sub>
+                    </m:sSub>
+                    <m:r>
+                      <m:rPr>
+                        <m:nor/>
+                      </m:rPr>
+                      <a:rPr lang="en-US" sz="1200" kern="0" dirty="0">
+                        <a:uFill>
+                          <a:solidFill>
+                            <a:srgbClr val="000000"/>
+                          </a:solidFill>
+                        </a:uFill>
+                        <a:latin typeface="Calibri" panose="020F0502020204030204" pitchFamily="34" charset="0"/>
+                        <a:ea typeface="Arial Unicode MS" panose="020B0604020202020204" pitchFamily="34" charset="-128"/>
+                        <a:cs typeface="Arial Unicode MS" panose="020B0604020202020204" pitchFamily="34" charset="-128"/>
+                      </a:rPr>
+                      <m:t> + </m:t>
+                    </m:r>
+                    <m:r>
+                      <a:rPr lang="en-US" sz="1200" i="1" kern="0">
+                        <a:uFill>
+                          <a:solidFill>
+                            <a:srgbClr val="000000"/>
+                          </a:solidFill>
+                        </a:uFill>
+                        <a:latin typeface="Cambria Math" panose="02040503050406030204" pitchFamily="18" charset="0"/>
+                        <a:ea typeface="Arial Unicode MS" panose="020B0604020202020204" pitchFamily="34" charset="-128"/>
+                        <a:cs typeface="Arial Unicode MS" panose="020B0604020202020204" pitchFamily="34" charset="-128"/>
+                      </a:rPr>
+                      <m:t>𝜖</m:t>
+                    </m:r>
+                  </m:oMath>
+                </a14:m>
+                <a:endParaRPr lang="en-US" baseline="0" dirty="0"/>
+              </a:p>
+              <a:p>
+                <a:pPr marL="228600" indent="-228600">
+                  <a:buAutoNum type="arabicPeriod"/>
+                </a:pPr>
+                <a:r>
+                  <a:rPr lang="en-US" dirty="0"/>
+                  <a:t>To capture</a:t>
+                </a:r>
+                <a:r>
+                  <a:rPr lang="en-US" baseline="0" dirty="0"/>
+                  <a:t> the learning process we use curriculum. Different options S1, S11, S01 … Explain notation</a:t>
+                </a:r>
+              </a:p>
+              <a:p>
+                <a:pPr marL="228600" indent="-228600">
+                  <a:buAutoNum type="arabicPeriod"/>
+                </a:pPr>
+                <a:r>
+                  <a:rPr lang="en-US" baseline="0" dirty="0"/>
+                  <a:t>We evaluate the “next” teacher (i.e. the next timestamp in the learning process of the brain)</a:t>
+                </a:r>
+              </a:p>
+            </p:txBody>
+          </p:sp>
+        </mc:Choice>
+        <mc:Fallback>
+          <p:sp>
+            <p:nvSpPr>
+              <p:cNvPr id="3" name="Notes Placeholder 2"/>
+              <p:cNvSpPr>
+                <a:spLocks noGrp="1"/>
+              </p:cNvSpPr>
+              <p:nvPr>
+                <p:ph type="body" idx="1"/>
+              </p:nvPr>
+            </p:nvSpPr>
+            <p:spPr/>
+            <p:txBody>
+              <a:bodyPr/>
+              <a:lstStyle/>
+              <a:p>
+                <a:pPr marL="228600" indent="-228600">
+                  <a:buAutoNum type="arabicPeriod"/>
+                </a:pPr>
+                <a:r>
+                  <a:rPr lang="en-US" baseline="0" dirty="0"/>
+                  <a:t>To represent the learning process, we </a:t>
+                </a:r>
+                <a:r>
+                  <a:rPr lang="en-US" baseline="0" dirty="0" err="1"/>
+                  <a:t>init</a:t>
+                </a:r>
+                <a:r>
+                  <a:rPr lang="en-US" baseline="0" dirty="0"/>
+                  <a:t> a teacher</a:t>
+                </a:r>
+              </a:p>
+              <a:p>
+                <a:pPr marL="228600" indent="-228600">
+                  <a:buAutoNum type="arabicPeriod"/>
+                </a:pPr>
+                <a:r>
+                  <a:rPr lang="en-US" baseline="0" dirty="0"/>
+                  <a:t>How we </a:t>
+                </a:r>
+                <a:r>
+                  <a:rPr lang="en-US" baseline="0" dirty="0" err="1"/>
+                  <a:t>init</a:t>
+                </a:r>
+                <a:r>
+                  <a:rPr lang="en-US" baseline="0" dirty="0"/>
+                  <a:t> the teacher (size of dim, states, params type- diagonal…)</a:t>
+                </a:r>
+              </a:p>
+              <a:p>
+                <a:pPr marL="228600" indent="-228600">
+                  <a:buAutoNum type="arabicPeriod"/>
+                </a:pPr>
+                <a:r>
+                  <a:rPr lang="en-US" baseline="0" dirty="0"/>
+                  <a:t>Explain the perturbation </a:t>
+                </a:r>
+                <a:r>
+                  <a:rPr lang="en-US" sz="1200" i="0" kern="0">
+                    <a:uFill>
+                      <a:solidFill>
+                        <a:srgbClr val="000000"/>
+                      </a:solidFill>
+                    </a:uFill>
+                    <a:latin typeface="Cambria Math" panose="02040503050406030204" pitchFamily="18" charset="0"/>
+                    <a:ea typeface="Arial Unicode MS" panose="020B0604020202020204" pitchFamily="34" charset="-128"/>
+                    <a:cs typeface="Arial Unicode MS" panose="020B0604020202020204" pitchFamily="34" charset="-128"/>
+                  </a:rPr>
+                  <a:t>𝑇_𝑖</a:t>
+                </a:r>
+                <a:r>
+                  <a:rPr lang="en-US" sz="1200" i="0" kern="0" dirty="0">
+                    <a:uFill>
+                      <a:solidFill>
+                        <a:srgbClr val="000000"/>
+                      </a:solidFill>
+                    </a:uFill>
+                    <a:latin typeface="Cambria Math" panose="02040503050406030204" pitchFamily="18" charset="0"/>
+                    <a:ea typeface="Arial Unicode MS" panose="020B0604020202020204" pitchFamily="34" charset="-128"/>
+                    <a:cs typeface="Arial Unicode MS" panose="020B0604020202020204" pitchFamily="34" charset="-128"/>
+                  </a:rPr>
+                  <a:t> " = </a:t>
+                </a:r>
+                <a:r>
+                  <a:rPr lang="en-US" sz="1200" i="0" kern="0">
+                    <a:uFill>
+                      <a:solidFill>
+                        <a:srgbClr val="000000"/>
+                      </a:solidFill>
+                    </a:uFill>
+                    <a:latin typeface="Cambria Math" panose="02040503050406030204" pitchFamily="18" charset="0"/>
+                    <a:ea typeface="Arial Unicode MS" panose="020B0604020202020204" pitchFamily="34" charset="-128"/>
+                    <a:cs typeface="Arial Unicode MS" panose="020B0604020202020204" pitchFamily="34" charset="-128"/>
+                  </a:rPr>
+                  <a:t>" 𝑇_(𝑖−1)</a:t>
+                </a:r>
+                <a:r>
+                  <a:rPr lang="en-US" sz="1200" i="0" kern="0" dirty="0">
+                    <a:uFill>
+                      <a:solidFill>
+                        <a:srgbClr val="000000"/>
+                      </a:solidFill>
+                    </a:uFill>
+                    <a:latin typeface="Cambria Math" panose="02040503050406030204" pitchFamily="18" charset="0"/>
+                    <a:ea typeface="Arial Unicode MS" panose="020B0604020202020204" pitchFamily="34" charset="-128"/>
+                    <a:cs typeface="Arial Unicode MS" panose="020B0604020202020204" pitchFamily="34" charset="-128"/>
+                  </a:rPr>
+                  <a:t> " + </a:t>
+                </a:r>
+                <a:r>
+                  <a:rPr lang="en-US" sz="1200" i="0" kern="0">
+                    <a:uFill>
+                      <a:solidFill>
+                        <a:srgbClr val="000000"/>
+                      </a:solidFill>
+                    </a:uFill>
+                    <a:latin typeface="Cambria Math" panose="02040503050406030204" pitchFamily="18" charset="0"/>
+                    <a:ea typeface="Arial Unicode MS" panose="020B0604020202020204" pitchFamily="34" charset="-128"/>
+                    <a:cs typeface="Arial Unicode MS" panose="020B0604020202020204" pitchFamily="34" charset="-128"/>
+                  </a:rPr>
+                  <a:t>" 𝜖</a:t>
+                </a:r>
+                <a:endParaRPr lang="en-US" baseline="0" dirty="0"/>
+              </a:p>
+              <a:p>
+                <a:pPr marL="228600" indent="-228600">
+                  <a:buAutoNum type="arabicPeriod"/>
+                </a:pPr>
+                <a:r>
+                  <a:rPr lang="en-US" dirty="0"/>
+                  <a:t>To capture</a:t>
+                </a:r>
+                <a:r>
+                  <a:rPr lang="en-US" baseline="0" dirty="0"/>
+                  <a:t> the learning process we use curriculum. Different options S1, S11, S01 … Explain notation</a:t>
+                </a:r>
+              </a:p>
+              <a:p>
+                <a:pPr marL="228600" indent="-228600">
+                  <a:buAutoNum type="arabicPeriod"/>
+                </a:pPr>
+                <a:r>
+                  <a:rPr lang="en-US" baseline="0" dirty="0"/>
+                  <a:t>We evaluate the “next” teacher (i.e. the next timestamp in the learning process of the brain)</a:t>
+                </a:r>
+              </a:p>
+            </p:txBody>
+          </p:sp>
+        </mc:Fallback>
+      </mc:AlternateContent>
+      <p:sp>
+        <p:nvSpPr>
+          <p:cNvPr id="4" name="Slide Number Placeholder 3"/>
+          <p:cNvSpPr>
+            <a:spLocks noGrp="1"/>
+          </p:cNvSpPr>
+          <p:nvPr>
+            <p:ph type="sldNum" sz="quarter" idx="5"/>
+          </p:nvPr>
+        </p:nvSpPr>
+        <p:spPr/>
+        <p:txBody>
+          <a:bodyPr/>
+          <a:lstStyle/>
+          <a:p>
+            <a:fld id="{24D2F596-B250-E649-AFF0-5D7C58A4148A}" type="slidenum">
+              <a:rPr lang="en-US" smtClean="0"/>
+              <a:t>5</a:t>
+            </a:fld>
+            <a:endParaRPr lang="en-US"/>
+          </a:p>
+        </p:txBody>
+      </p:sp>
+    </p:spTree>
+    <p:extLst>
+      <p:ext uri="{BB962C8B-B14F-4D97-AF65-F5344CB8AC3E}">
+        <p14:creationId xmlns:p14="http://schemas.microsoft.com/office/powerpoint/2010/main" val="2371014091"/>
+      </p:ext>
+    </p:extLst>
+  </p:cSld>
+  <p:clrMapOvr>
+    <a:masterClrMapping/>
+  </p:clrMapOvr>
+</p:notes>
+</file>
+
+<file path=ppt/notesSlides/notesSlide5.xml><?xml version="1.0" encoding="utf-8"?>
+<p:notes xmlns:a="http://schemas.openxmlformats.org/drawingml/2006/main" xmlns:r="http://schemas.openxmlformats.org/officeDocument/2006/relationships" xmlns:p="http://schemas.openxmlformats.org/presentationml/2006/main">
+  <p:cSld>
+    <p:spTree>
+      <p:nvGrpSpPr>
+        <p:cNvPr id="1" name=""/>
+        <p:cNvGrpSpPr/>
+        <p:nvPr/>
+      </p:nvGrpSpPr>
+      <p:grpSpPr>
+        <a:xfrm>
+          <a:off x="0" y="0"/>
+          <a:ext cx="0" cy="0"/>
+          <a:chOff x="0" y="0"/>
+          <a:chExt cx="0" cy="0"/>
+        </a:xfrm>
+      </p:grpSpPr>
+      <p:sp>
+        <p:nvSpPr>
+          <p:cNvPr id="2" name="Slide Image Placeholder 1"/>
+          <p:cNvSpPr>
+            <a:spLocks noGrp="1" noRot="1" noChangeAspect="1"/>
+          </p:cNvSpPr>
+          <p:nvPr>
+            <p:ph type="sldImg"/>
+          </p:nvPr>
+        </p:nvSpPr>
+        <p:spPr/>
+      </p:sp>
       <p:sp>
         <p:nvSpPr>
           <p:cNvPr id="3" name="Notes Placeholder 2"/>
@@ -5192,10 +5736,42 @@
           <a:bodyPr/>
           <a:lstStyle/>
           <a:p>
+            <a:pPr marL="0" marR="0" lvl="0" indent="0" algn="l" defTabSz="914400" rtl="0" eaLnBrk="1" fontAlgn="auto" latinLnBrk="0" hangingPunct="1">
+              <a:lnSpc>
+                <a:spcPct val="100000"/>
+              </a:lnSpc>
+              <a:spcBef>
+                <a:spcPts val="0"/>
+              </a:spcBef>
+              <a:spcAft>
+                <a:spcPts val="0"/>
+              </a:spcAft>
+              <a:buClrTx/>
+              <a:buSzTx/>
+              <a:buFontTx/>
+              <a:buNone/>
+              <a:tabLst/>
+              <a:defRPr/>
+            </a:pPr>
+            <a:r>
+              <a:rPr lang="en-US" dirty="0"/>
+              <a:t>After familiarizing myself with the framework, I began comparing different settings and training methods for the students. </a:t>
+            </a:r>
+          </a:p>
+          <a:p>
+            <a:endParaRPr lang="en-US" dirty="0"/>
+          </a:p>
+          <a:p>
             <a:r>
               <a:rPr lang="en-US" dirty="0"/>
               <a:t>What I was hoping to see S11 is not optimal. Even though there are no grounds to believe that – Discuss in the next meeting. I believe, that if the second perturbation cancels the first, it will be lucrative to utilize the history. Otherwise, only train on the latest model (T1 in this case). So maybe, if we have a lot of perturbations, they might bring us back at some point? </a:t>
             </a:r>
+          </a:p>
+          <a:p>
+            <a:endParaRPr lang="en-US" dirty="0"/>
+          </a:p>
+          <a:p>
+            <a:endParaRPr lang="en-US" dirty="0"/>
           </a:p>
         </p:txBody>
       </p:sp>
@@ -5235,7 +5811,7 @@
 </p:notes>
 </file>
 
-<file path=ppt/notesSlides/notesSlide5.xml><?xml version="1.0" encoding="utf-8"?>
+<file path=ppt/notesSlides/notesSlide6.xml><?xml version="1.0" encoding="utf-8"?>
 <p:notes xmlns:a="http://schemas.openxmlformats.org/drawingml/2006/main" xmlns:r="http://schemas.openxmlformats.org/officeDocument/2006/relationships" xmlns:p="http://schemas.openxmlformats.org/presentationml/2006/main">
   <p:cSld>
     <p:spTree>
@@ -5313,6 +5889,486 @@
     <p:extLst>
       <p:ext uri="{BB962C8B-B14F-4D97-AF65-F5344CB8AC3E}">
         <p14:creationId xmlns:p14="http://schemas.microsoft.com/office/powerpoint/2010/main" val="3529368562"/>
+      </p:ext>
+    </p:extLst>
+  </p:cSld>
+  <p:clrMapOvr>
+    <a:masterClrMapping/>
+  </p:clrMapOvr>
+</p:notes>
+</file>
+
+<file path=ppt/notesSlides/notesSlide7.xml><?xml version="1.0" encoding="utf-8"?>
+<p:notes xmlns:a="http://schemas.openxmlformats.org/drawingml/2006/main" xmlns:r="http://schemas.openxmlformats.org/officeDocument/2006/relationships" xmlns:p="http://schemas.openxmlformats.org/presentationml/2006/main">
+  <p:cSld>
+    <p:spTree>
+      <p:nvGrpSpPr>
+        <p:cNvPr id="1" name=""/>
+        <p:cNvGrpSpPr/>
+        <p:nvPr/>
+      </p:nvGrpSpPr>
+      <p:grpSpPr>
+        <a:xfrm>
+          <a:off x="0" y="0"/>
+          <a:ext cx="0" cy="0"/>
+          <a:chOff x="0" y="0"/>
+          <a:chExt cx="0" cy="0"/>
+        </a:xfrm>
+      </p:grpSpPr>
+      <p:sp>
+        <p:nvSpPr>
+          <p:cNvPr id="2" name="Slide Image Placeholder 1"/>
+          <p:cNvSpPr>
+            <a:spLocks noGrp="1" noRot="1" noChangeAspect="1"/>
+          </p:cNvSpPr>
+          <p:nvPr>
+            <p:ph type="sldImg"/>
+          </p:nvPr>
+        </p:nvSpPr>
+        <p:spPr/>
+      </p:sp>
+      <mc:AlternateContent xmlns:mc="http://schemas.openxmlformats.org/markup-compatibility/2006">
+        <mc:Choice xmlns:a14="http://schemas.microsoft.com/office/drawing/2010/main" Requires="a14">
+          <p:sp>
+            <p:nvSpPr>
+              <p:cNvPr id="3" name="Notes Placeholder 2"/>
+              <p:cNvSpPr>
+                <a:spLocks noGrp="1"/>
+              </p:cNvSpPr>
+              <p:nvPr>
+                <p:ph type="body" idx="1"/>
+              </p:nvPr>
+            </p:nvSpPr>
+            <p:spPr/>
+            <p:txBody>
+              <a:bodyPr/>
+              <a:lstStyle/>
+              <a:p>
+                <a:pPr marL="0" marR="0" lvl="0" indent="0" algn="l" defTabSz="914400" rtl="0" eaLnBrk="1" fontAlgn="auto" latinLnBrk="0" hangingPunct="1">
+                  <a:lnSpc>
+                    <a:spcPct val="100000"/>
+                  </a:lnSpc>
+                  <a:spcBef>
+                    <a:spcPts val="0"/>
+                  </a:spcBef>
+                  <a:spcAft>
+                    <a:spcPts val="0"/>
+                  </a:spcAft>
+                  <a:buClrTx/>
+                  <a:buSzTx/>
+                  <a:buFontTx/>
+                  <a:buNone/>
+                  <a:tabLst/>
+                  <a:defRPr/>
+                </a:pPr>
+                <a:r>
+                  <a:rPr lang="en-US" sz="1200" kern="0" dirty="0">
+                    <a:uFill>
+                      <a:solidFill>
+                        <a:srgbClr val="000000"/>
+                      </a:solidFill>
+                    </a:uFill>
+                    <a:latin typeface="Calibri" panose="020F0502020204030204" pitchFamily="34" charset="0"/>
+                    <a:ea typeface="Arial Unicode MS" panose="020B0604020202020204" pitchFamily="34" charset="-128"/>
+                    <a:cs typeface="Arial Unicode MS" panose="020B0604020202020204" pitchFamily="34" charset="-128"/>
+                  </a:rPr>
+                  <a:t>Then, perhaps, we’ll choose the likelihood over </a:t>
+                </a:r>
+                <a14:m>
+                  <m:oMath xmlns:m="http://schemas.openxmlformats.org/officeDocument/2006/math">
+                    <m:sSub>
+                      <m:sSubPr>
+                        <m:ctrlPr>
+                          <a:rPr lang="en-US" sz="1200" i="1" dirty="0">
+                            <a:latin typeface="Cambria Math" panose="02040503050406030204" pitchFamily="18" charset="0"/>
+                          </a:rPr>
+                        </m:ctrlPr>
+                      </m:sSubPr>
+                      <m:e>
+                        <m:r>
+                          <a:rPr lang="en-US" sz="1200" i="1" dirty="0">
+                            <a:latin typeface="Cambria Math" panose="02040503050406030204" pitchFamily="18" charset="0"/>
+                          </a:rPr>
+                          <m:t>𝑇</m:t>
+                        </m:r>
+                      </m:e>
+                      <m:sub>
+                        <m:r>
+                          <a:rPr lang="en-US" sz="1200" i="1" dirty="0">
+                            <a:latin typeface="Cambria Math" panose="02040503050406030204" pitchFamily="18" charset="0"/>
+                          </a:rPr>
+                          <m:t>𝑘</m:t>
+                        </m:r>
+                      </m:sub>
+                    </m:sSub>
+                    <m:r>
+                      <a:rPr lang="en-US" sz="1200" i="1" dirty="0">
+                        <a:latin typeface="Cambria Math" panose="02040503050406030204" pitchFamily="18" charset="0"/>
+                      </a:rPr>
+                      <m:t> </m:t>
+                    </m:r>
+                  </m:oMath>
+                </a14:m>
+                <a:r>
+                  <a:rPr lang="en-US" sz="1200" kern="0" dirty="0">
+                    <a:uFill>
+                      <a:solidFill>
+                        <a:srgbClr val="000000"/>
+                      </a:solidFill>
+                    </a:uFill>
+                    <a:latin typeface="Calibri" panose="020F0502020204030204" pitchFamily="34" charset="0"/>
+                    <a:ea typeface="Arial Unicode MS" panose="020B0604020202020204" pitchFamily="34" charset="-128"/>
+                    <a:cs typeface="Arial Unicode MS" panose="020B0604020202020204" pitchFamily="34" charset="-128"/>
+                  </a:rPr>
+                  <a:t> as one of the axes. For the other/s there are several options. One could be the highest likelihood each model had over any of the models (the detect if ”overfitting” helped), and a third one could simply be a discrete grid [1…k] representing the teacher’s num over which the likelihood of each model was the best.</a:t>
+                </a:r>
+                <a:br>
+                  <a:rPr lang="en-US" sz="1200" kern="0" dirty="0">
+                    <a:uFill>
+                      <a:solidFill>
+                        <a:srgbClr val="000000"/>
+                      </a:solidFill>
+                    </a:uFill>
+                    <a:latin typeface="Calibri" panose="020F0502020204030204" pitchFamily="34" charset="0"/>
+                    <a:ea typeface="Arial Unicode MS" panose="020B0604020202020204" pitchFamily="34" charset="-128"/>
+                    <a:cs typeface="Arial Unicode MS" panose="020B0604020202020204" pitchFamily="34" charset="-128"/>
+                  </a:rPr>
+                </a:br>
+                <a:endParaRPr lang="en-US" sz="1200" kern="0" dirty="0">
+                  <a:uFill>
+                    <a:solidFill>
+                      <a:srgbClr val="000000"/>
+                    </a:solidFill>
+                  </a:uFill>
+                  <a:latin typeface="Calibri" panose="020F0502020204030204" pitchFamily="34" charset="0"/>
+                  <a:ea typeface="Arial Unicode MS" panose="020B0604020202020204" pitchFamily="34" charset="-128"/>
+                  <a:cs typeface="Arial Unicode MS" panose="020B0604020202020204" pitchFamily="34" charset="-128"/>
+                </a:endParaRPr>
+              </a:p>
+              <a:p>
+                <a:pPr marL="0" marR="0" lvl="0" indent="0" algn="l" defTabSz="914400" rtl="0" eaLnBrk="1" fontAlgn="auto" latinLnBrk="0" hangingPunct="1">
+                  <a:lnSpc>
+                    <a:spcPct val="100000"/>
+                  </a:lnSpc>
+                  <a:spcBef>
+                    <a:spcPts val="0"/>
+                  </a:spcBef>
+                  <a:spcAft>
+                    <a:spcPts val="0"/>
+                  </a:spcAft>
+                  <a:buClrTx/>
+                  <a:buSzTx/>
+                  <a:buFontTx/>
+                  <a:buNone/>
+                  <a:tabLst/>
+                  <a:defRPr/>
+                </a:pPr>
+                <a:endParaRPr lang="en-US" sz="1200" u="none" strike="noStrike" kern="0" spc="0" dirty="0">
+                  <a:solidFill>
+                    <a:schemeClr val="tx1"/>
+                  </a:solidFill>
+                  <a:effectLst/>
+                  <a:uFill>
+                    <a:solidFill>
+                      <a:srgbClr val="000000"/>
+                    </a:solidFill>
+                  </a:uFill>
+                  <a:latin typeface="Calibri" panose="020F0502020204030204" pitchFamily="34" charset="0"/>
+                  <a:ea typeface="Arial Unicode MS" panose="020B0604020202020204" pitchFamily="34" charset="-128"/>
+                  <a:cs typeface="Arial Unicode MS" panose="020B0604020202020204" pitchFamily="34" charset="-128"/>
+                </a:endParaRPr>
+              </a:p>
+              <a:p>
+                <a:pPr marL="0" marR="0" lvl="0" indent="0" algn="l" defTabSz="914400" rtl="0" eaLnBrk="1" fontAlgn="auto" latinLnBrk="0" hangingPunct="1">
+                  <a:lnSpc>
+                    <a:spcPct val="100000"/>
+                  </a:lnSpc>
+                  <a:spcBef>
+                    <a:spcPts val="0"/>
+                  </a:spcBef>
+                  <a:spcAft>
+                    <a:spcPts val="0"/>
+                  </a:spcAft>
+                  <a:buClrTx/>
+                  <a:buSzTx/>
+                  <a:buFontTx/>
+                  <a:buNone/>
+                  <a:tabLst/>
+                  <a:defRPr/>
+                </a:pPr>
+                <a:r>
+                  <a:rPr lang="en-US" sz="1200" kern="0" dirty="0">
+                    <a:uFill>
+                      <a:solidFill>
+                        <a:srgbClr val="000000"/>
+                      </a:solidFill>
+                    </a:uFill>
+                    <a:latin typeface="Calibri" panose="020F0502020204030204" pitchFamily="34" charset="0"/>
+                    <a:ea typeface="Arial Unicode MS" panose="020B0604020202020204" pitchFamily="34" charset="-128"/>
+                    <a:cs typeface="Arial Unicode MS" panose="020B0604020202020204" pitchFamily="34" charset="-128"/>
+                  </a:rPr>
+                  <a:t>Perturbations - (right now some of the perturbations are diagonal matrices)</a:t>
+                </a:r>
+              </a:p>
+              <a:p>
+                <a:pPr marL="0" marR="0" lvl="0" indent="0" algn="l" defTabSz="914400" rtl="0" eaLnBrk="1" fontAlgn="auto" latinLnBrk="0" hangingPunct="1">
+                  <a:lnSpc>
+                    <a:spcPct val="100000"/>
+                  </a:lnSpc>
+                  <a:spcBef>
+                    <a:spcPts val="0"/>
+                  </a:spcBef>
+                  <a:spcAft>
+                    <a:spcPts val="0"/>
+                  </a:spcAft>
+                  <a:buClrTx/>
+                  <a:buSzTx/>
+                  <a:buFontTx/>
+                  <a:buNone/>
+                  <a:tabLst/>
+                  <a:defRPr/>
+                </a:pPr>
+                <a:endParaRPr lang="en-US" sz="1200" u="none" strike="noStrike" kern="0" spc="0" dirty="0">
+                  <a:solidFill>
+                    <a:schemeClr val="tx1"/>
+                  </a:solidFill>
+                  <a:effectLst/>
+                  <a:uFill>
+                    <a:solidFill>
+                      <a:srgbClr val="000000"/>
+                    </a:solidFill>
+                  </a:uFill>
+                  <a:latin typeface="Calibri" panose="020F0502020204030204" pitchFamily="34" charset="0"/>
+                  <a:ea typeface="Arial Unicode MS" panose="020B0604020202020204" pitchFamily="34" charset="-128"/>
+                  <a:cs typeface="Arial Unicode MS" panose="020B0604020202020204" pitchFamily="34" charset="-128"/>
+                </a:endParaRPr>
+              </a:p>
+              <a:p>
+                <a:endParaRPr lang="en-US" dirty="0"/>
+              </a:p>
+            </p:txBody>
+          </p:sp>
+        </mc:Choice>
+        <mc:Fallback>
+          <p:sp>
+            <p:nvSpPr>
+              <p:cNvPr id="3" name="Notes Placeholder 2"/>
+              <p:cNvSpPr>
+                <a:spLocks noGrp="1"/>
+              </p:cNvSpPr>
+              <p:nvPr>
+                <p:ph type="body" idx="1"/>
+              </p:nvPr>
+            </p:nvSpPr>
+            <p:spPr/>
+            <p:txBody>
+              <a:bodyPr/>
+              <a:lstStyle/>
+              <a:p>
+                <a:pPr marL="0" marR="0" lvl="0" indent="0" algn="l" defTabSz="914400" rtl="0" eaLnBrk="1" fontAlgn="auto" latinLnBrk="0" hangingPunct="1">
+                  <a:lnSpc>
+                    <a:spcPct val="100000"/>
+                  </a:lnSpc>
+                  <a:spcBef>
+                    <a:spcPts val="0"/>
+                  </a:spcBef>
+                  <a:spcAft>
+                    <a:spcPts val="0"/>
+                  </a:spcAft>
+                  <a:buClrTx/>
+                  <a:buSzTx/>
+                  <a:buFontTx/>
+                  <a:buNone/>
+                  <a:tabLst/>
+                  <a:defRPr/>
+                </a:pPr>
+                <a:r>
+                  <a:rPr lang="en-US" sz="1200" kern="0" dirty="0">
+                    <a:uFill>
+                      <a:solidFill>
+                        <a:srgbClr val="000000"/>
+                      </a:solidFill>
+                    </a:uFill>
+                    <a:latin typeface="Calibri" panose="020F0502020204030204" pitchFamily="34" charset="0"/>
+                    <a:ea typeface="Arial Unicode MS" panose="020B0604020202020204" pitchFamily="34" charset="-128"/>
+                    <a:cs typeface="Arial Unicode MS" panose="020B0604020202020204" pitchFamily="34" charset="-128"/>
+                  </a:rPr>
+                  <a:t>Then, perhaps, we’ll choose the likelihood over </a:t>
+                </a:r>
+                <a:r>
+                  <a:rPr lang="en-US" sz="1200" i="0" dirty="0">
+                    <a:latin typeface="Cambria Math" panose="02040503050406030204" pitchFamily="18" charset="0"/>
+                  </a:rPr>
+                  <a:t>𝑇_𝑘  </a:t>
+                </a:r>
+                <a:r>
+                  <a:rPr lang="en-US" sz="1200" kern="0" dirty="0">
+                    <a:uFill>
+                      <a:solidFill>
+                        <a:srgbClr val="000000"/>
+                      </a:solidFill>
+                    </a:uFill>
+                    <a:latin typeface="Calibri" panose="020F0502020204030204" pitchFamily="34" charset="0"/>
+                    <a:ea typeface="Arial Unicode MS" panose="020B0604020202020204" pitchFamily="34" charset="-128"/>
+                    <a:cs typeface="Arial Unicode MS" panose="020B0604020202020204" pitchFamily="34" charset="-128"/>
+                  </a:rPr>
+                  <a:t> as one of the axes. For the other/s there are several options. One could be the highest likelihood each model had over any of the models (the detect if ”overfitting” helped), and a third one could simply be a discrete grid [1…k] representing the teacher’s num over which the likelihood of each model was the best.</a:t>
+                </a:r>
+                <a:br>
+                  <a:rPr lang="en-US" sz="1200" kern="0" dirty="0">
+                    <a:uFill>
+                      <a:solidFill>
+                        <a:srgbClr val="000000"/>
+                      </a:solidFill>
+                    </a:uFill>
+                    <a:latin typeface="Calibri" panose="020F0502020204030204" pitchFamily="34" charset="0"/>
+                    <a:ea typeface="Arial Unicode MS" panose="020B0604020202020204" pitchFamily="34" charset="-128"/>
+                    <a:cs typeface="Arial Unicode MS" panose="020B0604020202020204" pitchFamily="34" charset="-128"/>
+                  </a:rPr>
+                </a:br>
+                <a:endParaRPr lang="en-US" sz="1200" kern="0" dirty="0">
+                  <a:uFill>
+                    <a:solidFill>
+                      <a:srgbClr val="000000"/>
+                    </a:solidFill>
+                  </a:uFill>
+                  <a:latin typeface="Calibri" panose="020F0502020204030204" pitchFamily="34" charset="0"/>
+                  <a:ea typeface="Arial Unicode MS" panose="020B0604020202020204" pitchFamily="34" charset="-128"/>
+                  <a:cs typeface="Arial Unicode MS" panose="020B0604020202020204" pitchFamily="34" charset="-128"/>
+                </a:endParaRPr>
+              </a:p>
+              <a:p>
+                <a:pPr marL="0" marR="0" lvl="0" indent="0" algn="l" defTabSz="914400" rtl="0" eaLnBrk="1" fontAlgn="auto" latinLnBrk="0" hangingPunct="1">
+                  <a:lnSpc>
+                    <a:spcPct val="100000"/>
+                  </a:lnSpc>
+                  <a:spcBef>
+                    <a:spcPts val="0"/>
+                  </a:spcBef>
+                  <a:spcAft>
+                    <a:spcPts val="0"/>
+                  </a:spcAft>
+                  <a:buClrTx/>
+                  <a:buSzTx/>
+                  <a:buFontTx/>
+                  <a:buNone/>
+                  <a:tabLst/>
+                  <a:defRPr/>
+                </a:pPr>
+                <a:endParaRPr lang="en-US" sz="1200" u="none" strike="noStrike" kern="0" spc="0" dirty="0">
+                  <a:solidFill>
+                    <a:schemeClr val="tx1"/>
+                  </a:solidFill>
+                  <a:effectLst/>
+                  <a:uFill>
+                    <a:solidFill>
+                      <a:srgbClr val="000000"/>
+                    </a:solidFill>
+                  </a:uFill>
+                  <a:latin typeface="Calibri" panose="020F0502020204030204" pitchFamily="34" charset="0"/>
+                  <a:ea typeface="Arial Unicode MS" panose="020B0604020202020204" pitchFamily="34" charset="-128"/>
+                  <a:cs typeface="Arial Unicode MS" panose="020B0604020202020204" pitchFamily="34" charset="-128"/>
+                </a:endParaRPr>
+              </a:p>
+              <a:p>
+                <a:pPr marL="0" marR="0" lvl="0" indent="0" algn="l" defTabSz="914400" rtl="0" eaLnBrk="1" fontAlgn="auto" latinLnBrk="0" hangingPunct="1">
+                  <a:lnSpc>
+                    <a:spcPct val="100000"/>
+                  </a:lnSpc>
+                  <a:spcBef>
+                    <a:spcPts val="0"/>
+                  </a:spcBef>
+                  <a:spcAft>
+                    <a:spcPts val="0"/>
+                  </a:spcAft>
+                  <a:buClrTx/>
+                  <a:buSzTx/>
+                  <a:buFontTx/>
+                  <a:buNone/>
+                  <a:tabLst/>
+                  <a:defRPr/>
+                </a:pPr>
+                <a:r>
+                  <a:rPr lang="en-US" sz="1200" kern="0" dirty="0">
+                    <a:uFill>
+                      <a:solidFill>
+                        <a:srgbClr val="000000"/>
+                      </a:solidFill>
+                    </a:uFill>
+                    <a:latin typeface="Calibri" panose="020F0502020204030204" pitchFamily="34" charset="0"/>
+                    <a:ea typeface="Arial Unicode MS" panose="020B0604020202020204" pitchFamily="34" charset="-128"/>
+                    <a:cs typeface="Arial Unicode MS" panose="020B0604020202020204" pitchFamily="34" charset="-128"/>
+                  </a:rPr>
+                  <a:t>Perturbations - (right now some of the perturbations are diagonal matrices)</a:t>
+                </a:r>
+              </a:p>
+              <a:p>
+                <a:pPr marL="0" marR="0" lvl="0" indent="0" algn="l" defTabSz="914400" rtl="0" eaLnBrk="1" fontAlgn="auto" latinLnBrk="0" hangingPunct="1">
+                  <a:lnSpc>
+                    <a:spcPct val="100000"/>
+                  </a:lnSpc>
+                  <a:spcBef>
+                    <a:spcPts val="0"/>
+                  </a:spcBef>
+                  <a:spcAft>
+                    <a:spcPts val="0"/>
+                  </a:spcAft>
+                  <a:buClrTx/>
+                  <a:buSzTx/>
+                  <a:buFontTx/>
+                  <a:buNone/>
+                  <a:tabLst/>
+                  <a:defRPr/>
+                </a:pPr>
+                <a:endParaRPr lang="en-US" sz="1200" u="none" strike="noStrike" kern="0" spc="0" dirty="0">
+                  <a:solidFill>
+                    <a:schemeClr val="tx1"/>
+                  </a:solidFill>
+                  <a:effectLst/>
+                  <a:uFill>
+                    <a:solidFill>
+                      <a:srgbClr val="000000"/>
+                    </a:solidFill>
+                  </a:uFill>
+                  <a:latin typeface="Calibri" panose="020F0502020204030204" pitchFamily="34" charset="0"/>
+                  <a:ea typeface="Arial Unicode MS" panose="020B0604020202020204" pitchFamily="34" charset="-128"/>
+                  <a:cs typeface="Arial Unicode MS" panose="020B0604020202020204" pitchFamily="34" charset="-128"/>
+                </a:endParaRPr>
+              </a:p>
+              <a:p>
+                <a:endParaRPr lang="en-US" dirty="0"/>
+              </a:p>
+            </p:txBody>
+          </p:sp>
+        </mc:Fallback>
+      </mc:AlternateContent>
+      <p:sp>
+        <p:nvSpPr>
+          <p:cNvPr id="4" name="Slide Number Placeholder 3"/>
+          <p:cNvSpPr>
+            <a:spLocks noGrp="1"/>
+          </p:cNvSpPr>
+          <p:nvPr>
+            <p:ph type="sldNum" sz="quarter" idx="5"/>
+          </p:nvPr>
+        </p:nvSpPr>
+        <p:spPr/>
+        <p:txBody>
+          <a:bodyPr/>
+          <a:lstStyle/>
+          <a:p>
+            <a:fld id="{24D2F596-B250-E649-AFF0-5D7C58A4148A}" type="slidenum">
+              <a:rPr lang="en-US" smtClean="0"/>
+              <a:t>8</a:t>
+            </a:fld>
+            <a:endParaRPr lang="en-US"/>
+          </a:p>
+        </p:txBody>
+      </p:sp>
+    </p:spTree>
+    <p:extLst>
+      <p:ext uri="{BB962C8B-B14F-4D97-AF65-F5344CB8AC3E}">
+        <p14:creationId xmlns:p14="http://schemas.microsoft.com/office/powerpoint/2010/main" val="177275650"/>
       </p:ext>
     </p:extLst>
   </p:cSld>
@@ -11221,7 +12277,7 @@
             <p:ph idx="1"/>
             <p:extLst>
               <p:ext uri="{D42A27DB-BD31-4B8C-83A1-F6EECF244321}">
-                <p14:modId xmlns:p14="http://schemas.microsoft.com/office/powerpoint/2010/main" val="490073394"/>
+                <p14:modId xmlns:p14="http://schemas.microsoft.com/office/powerpoint/2010/main" val="2734951438"/>
               </p:ext>
             </p:extLst>
           </p:nvPr>
@@ -11573,8 +12629,8 @@
         </p:nvSpPr>
         <p:spPr>
           <a:xfrm>
-            <a:off x="758952" y="2160588"/>
-            <a:ext cx="4767031" cy="3925887"/>
+            <a:off x="587007" y="1915262"/>
+            <a:ext cx="7586837" cy="3925887"/>
           </a:xfrm>
         </p:spPr>
         <p:txBody>
@@ -11588,7 +12644,17 @@
             </a:pPr>
             <a:r>
               <a:rPr lang="en-US" b="1" dirty="0"/>
-              <a:t>Deduce whether the learning process could help discriminate “bad” models. </a:t>
+              <a:t>Deduce whether observing the learning process could help discriminate “bad” models  </a:t>
+            </a:r>
+            <a:r>
+              <a:rPr lang="en-US" b="1" dirty="0">
+                <a:sym typeface="Wingdings" pitchFamily="2" charset="2"/>
+              </a:rPr>
+              <a:t> </a:t>
+            </a:r>
+            <a:r>
+              <a:rPr lang="en-US" b="1" dirty="0"/>
+              <a:t>better models</a:t>
             </a:r>
           </a:p>
           <a:p>
@@ -11629,8 +12695,8 @@
         </p:blipFill>
         <p:spPr bwMode="auto">
           <a:xfrm>
-            <a:off x="6680250" y="1076683"/>
-            <a:ext cx="4025842" cy="4704634"/>
+            <a:off x="7552097" y="2439368"/>
+            <a:ext cx="2799877" cy="3271961"/>
           </a:xfrm>
           <a:prstGeom prst="rect">
             <a:avLst/>
@@ -11647,6 +12713,274 @@
           </a:extLst>
         </p:spPr>
       </p:pic>
+      <p:sp>
+        <p:nvSpPr>
+          <p:cNvPr id="6" name="TextBox 5">
+            <a:extLst>
+              <a:ext uri="{FF2B5EF4-FFF2-40B4-BE49-F238E27FC236}">
+                <a16:creationId xmlns:a16="http://schemas.microsoft.com/office/drawing/2014/main" id="{1B90ABE3-6EB0-5470-FEDD-621E81DE997A}"/>
+              </a:ext>
+            </a:extLst>
+          </p:cNvPr>
+          <p:cNvSpPr txBox="1"/>
+          <p:nvPr/>
+        </p:nvSpPr>
+        <p:spPr>
+          <a:xfrm>
+            <a:off x="136938" y="6035704"/>
+            <a:ext cx="9062818" cy="710707"/>
+          </a:xfrm>
+          <a:prstGeom prst="rect">
+            <a:avLst/>
+          </a:prstGeom>
+          <a:noFill/>
+        </p:spPr>
+        <p:txBody>
+          <a:bodyPr wrap="square">
+            <a:spAutoFit/>
+          </a:bodyPr>
+          <a:lstStyle/>
+          <a:p>
+            <a:pPr marL="0" marR="0">
+              <a:lnSpc>
+                <a:spcPct val="115000"/>
+              </a:lnSpc>
+              <a:spcBef>
+                <a:spcPts val="0"/>
+              </a:spcBef>
+              <a:spcAft>
+                <a:spcPts val="0"/>
+              </a:spcAft>
+            </a:pPr>
+            <a:r>
+              <a:rPr lang="en-US" sz="1800" dirty="0">
+                <a:ln>
+                  <a:noFill/>
+                </a:ln>
+                <a:effectLst/>
+                <a:uFill>
+                  <a:solidFill>
+                    <a:srgbClr val="000000"/>
+                  </a:solidFill>
+                </a:uFill>
+                <a:latin typeface="Calibri" panose="020F0502020204030204" pitchFamily="34" charset="0"/>
+                <a:ea typeface="Arial Unicode MS" panose="020B0604020202020204" pitchFamily="34" charset="-128"/>
+                <a:cs typeface="Arial Unicode MS" panose="020B0604020202020204" pitchFamily="34" charset="-128"/>
+              </a:rPr>
+              <a:t>Dabholkar, K., &amp; Barak, O. (2024). </a:t>
+            </a:r>
+            <a:r>
+              <a:rPr lang="en-US" sz="1800" i="1" dirty="0">
+                <a:ln>
+                  <a:noFill/>
+                </a:ln>
+                <a:effectLst/>
+                <a:uFill>
+                  <a:solidFill>
+                    <a:srgbClr val="000000"/>
+                  </a:solidFill>
+                </a:uFill>
+                <a:latin typeface="Calibri" panose="020F0502020204030204" pitchFamily="34" charset="0"/>
+                <a:ea typeface="Arial Unicode MS" panose="020B0604020202020204" pitchFamily="34" charset="-128"/>
+                <a:cs typeface="Arial Unicode MS" panose="020B0604020202020204" pitchFamily="34" charset="-128"/>
+              </a:rPr>
+              <a:t>When predict can also explain: Few-shot prediction to select better neural </a:t>
+            </a:r>
+            <a:r>
+              <a:rPr lang="en-US" sz="1800" i="1" dirty="0" err="1">
+                <a:ln>
+                  <a:noFill/>
+                </a:ln>
+                <a:effectLst/>
+                <a:uFill>
+                  <a:solidFill>
+                    <a:srgbClr val="000000"/>
+                  </a:solidFill>
+                </a:uFill>
+                <a:latin typeface="Calibri" panose="020F0502020204030204" pitchFamily="34" charset="0"/>
+                <a:ea typeface="Arial Unicode MS" panose="020B0604020202020204" pitchFamily="34" charset="-128"/>
+                <a:cs typeface="Arial Unicode MS" panose="020B0604020202020204" pitchFamily="34" charset="-128"/>
+              </a:rPr>
+              <a:t>latents</a:t>
+            </a:r>
+            <a:r>
+              <a:rPr lang="en-US" sz="1800" dirty="0">
+                <a:ln>
+                  <a:noFill/>
+                </a:ln>
+                <a:effectLst/>
+                <a:uFill>
+                  <a:solidFill>
+                    <a:srgbClr val="000000"/>
+                  </a:solidFill>
+                </a:uFill>
+                <a:latin typeface="Calibri" panose="020F0502020204030204" pitchFamily="34" charset="0"/>
+                <a:ea typeface="Arial Unicode MS" panose="020B0604020202020204" pitchFamily="34" charset="-128"/>
+                <a:cs typeface="Arial Unicode MS" panose="020B0604020202020204" pitchFamily="34" charset="-128"/>
+              </a:rPr>
+              <a:t> (arXiv:2405.14425). </a:t>
+            </a:r>
+            <a:r>
+              <a:rPr lang="en-US" sz="1800" dirty="0" err="1">
+                <a:ln>
+                  <a:noFill/>
+                </a:ln>
+                <a:effectLst/>
+                <a:uFill>
+                  <a:solidFill>
+                    <a:srgbClr val="000000"/>
+                  </a:solidFill>
+                </a:uFill>
+                <a:latin typeface="Calibri" panose="020F0502020204030204" pitchFamily="34" charset="0"/>
+                <a:ea typeface="Arial Unicode MS" panose="020B0604020202020204" pitchFamily="34" charset="-128"/>
+                <a:cs typeface="Arial Unicode MS" panose="020B0604020202020204" pitchFamily="34" charset="-128"/>
+              </a:rPr>
+              <a:t>arXiv</a:t>
+            </a:r>
+            <a:r>
+              <a:rPr lang="en-US" sz="1800" dirty="0">
+                <a:ln>
+                  <a:noFill/>
+                </a:ln>
+                <a:effectLst/>
+                <a:uFill>
+                  <a:solidFill>
+                    <a:srgbClr val="000000"/>
+                  </a:solidFill>
+                </a:uFill>
+                <a:latin typeface="Calibri" panose="020F0502020204030204" pitchFamily="34" charset="0"/>
+                <a:ea typeface="Arial Unicode MS" panose="020B0604020202020204" pitchFamily="34" charset="-128"/>
+                <a:cs typeface="Arial Unicode MS" panose="020B0604020202020204" pitchFamily="34" charset="-128"/>
+              </a:rPr>
+              <a:t>. </a:t>
+            </a:r>
+            <a:r>
+              <a:rPr lang="en-US" sz="1800" u="sng" dirty="0">
+                <a:ln>
+                  <a:noFill/>
+                </a:ln>
+                <a:effectLst/>
+                <a:uFill>
+                  <a:solidFill>
+                    <a:srgbClr val="0563C1"/>
+                  </a:solidFill>
+                </a:uFill>
+                <a:latin typeface="Calibri" panose="020F0502020204030204" pitchFamily="34" charset="0"/>
+                <a:ea typeface="Calibri" panose="020F0502020204030204" pitchFamily="34" charset="0"/>
+                <a:cs typeface="Calibri" panose="020F0502020204030204" pitchFamily="34" charset="0"/>
+                <a:hlinkClick r:id="rId4">
+                  <a:extLst>
+                    <a:ext uri="{A12FA001-AC4F-418D-AE19-62706E023703}">
+                      <ahyp:hlinkClr xmlns:ahyp="http://schemas.microsoft.com/office/drawing/2018/hyperlinkcolor" val="tx"/>
+                    </a:ext>
+                  </a:extLst>
+                </a:hlinkClick>
+              </a:rPr>
+              <a:t>http://arxiv.org/abs/2405.14425</a:t>
+            </a:r>
+            <a:endParaRPr lang="en-US" sz="1800" dirty="0">
+              <a:ln>
+                <a:noFill/>
+              </a:ln>
+              <a:effectLst/>
+              <a:uFill>
+                <a:solidFill>
+                  <a:srgbClr val="000000"/>
+                </a:solidFill>
+              </a:uFill>
+              <a:latin typeface="Calibri" panose="020F0502020204030204" pitchFamily="34" charset="0"/>
+              <a:ea typeface="Arial Unicode MS" panose="020B0604020202020204" pitchFamily="34" charset="-128"/>
+              <a:cs typeface="Arial Unicode MS" panose="020B0604020202020204" pitchFamily="34" charset="-128"/>
+            </a:endParaRPr>
+          </a:p>
+        </p:txBody>
+      </p:sp>
+      <mc:AlternateContent xmlns:mc="http://schemas.openxmlformats.org/markup-compatibility/2006">
+        <mc:Choice xmlns:p14="http://schemas.microsoft.com/office/powerpoint/2010/main" Requires="p14">
+          <p:contentPart p14:bwMode="auto" r:id="rId5">
+            <p14:nvContentPartPr>
+              <p14:cNvPr id="7" name="Ink 6">
+                <a:extLst>
+                  <a:ext uri="{FF2B5EF4-FFF2-40B4-BE49-F238E27FC236}">
+                    <a16:creationId xmlns:a16="http://schemas.microsoft.com/office/drawing/2014/main" id="{4367FD67-910A-4C07-2BDC-763B30C69D61}"/>
+                  </a:ext>
+                </a:extLst>
+              </p14:cNvPr>
+              <p14:cNvContentPartPr/>
+              <p14:nvPr/>
+            </p14:nvContentPartPr>
+            <p14:xfrm>
+              <a:off x="7902834" y="3083760"/>
+              <a:ext cx="2515680" cy="2345760"/>
+            </p14:xfrm>
+          </p:contentPart>
+        </mc:Choice>
+        <mc:Fallback>
+          <p:pic>
+            <p:nvPicPr>
+              <p:cNvPr id="7" name="Ink 6">
+                <a:extLst>
+                  <a:ext uri="{FF2B5EF4-FFF2-40B4-BE49-F238E27FC236}">
+                    <a16:creationId xmlns:a16="http://schemas.microsoft.com/office/drawing/2014/main" id="{4367FD67-910A-4C07-2BDC-763B30C69D61}"/>
+                  </a:ext>
+                </a:extLst>
+              </p:cNvPr>
+              <p:cNvPicPr/>
+              <p:nvPr/>
+            </p:nvPicPr>
+            <p:blipFill>
+              <a:blip r:embed="rId6"/>
+              <a:stretch>
+                <a:fillRect/>
+              </a:stretch>
+            </p:blipFill>
+            <p:spPr>
+              <a:xfrm>
+                <a:off x="7894194" y="3075120"/>
+                <a:ext cx="2533320" cy="2363400"/>
+              </a:xfrm>
+              <a:prstGeom prst="rect">
+                <a:avLst/>
+              </a:prstGeom>
+            </p:spPr>
+          </p:pic>
+        </mc:Fallback>
+      </mc:AlternateContent>
+      <p:sp>
+        <p:nvSpPr>
+          <p:cNvPr id="9" name="TextBox 8">
+            <a:extLst>
+              <a:ext uri="{FF2B5EF4-FFF2-40B4-BE49-F238E27FC236}">
+                <a16:creationId xmlns:a16="http://schemas.microsoft.com/office/drawing/2014/main" id="{6E8DA2F2-46A9-EBC3-33A9-FBB729F33022}"/>
+              </a:ext>
+            </a:extLst>
+          </p:cNvPr>
+          <p:cNvSpPr txBox="1"/>
+          <p:nvPr/>
+        </p:nvSpPr>
+        <p:spPr>
+          <a:xfrm>
+            <a:off x="1694985" y="3878205"/>
+            <a:ext cx="2685440" cy="923330"/>
+          </a:xfrm>
+          <a:prstGeom prst="rect">
+            <a:avLst/>
+          </a:prstGeom>
+          <a:noFill/>
+        </p:spPr>
+        <p:txBody>
+          <a:bodyPr wrap="square" rtlCol="0">
+            <a:spAutoFit/>
+          </a:bodyPr>
+          <a:lstStyle/>
+          <a:p>
+            <a:r>
+              <a:rPr lang="en-US" dirty="0"/>
+              <a:t>Can use previous monkey illustration with time axis to show how </a:t>
+            </a:r>
+          </a:p>
+        </p:txBody>
+      </p:sp>
     </p:spTree>
     <p:extLst>
       <p:ext uri="{BB962C8B-B14F-4D97-AF65-F5344CB8AC3E}">
@@ -12017,7 +13351,7 @@
                     <a:ea typeface="Aptos" panose="020B0004020202020204" pitchFamily="34" charset="0"/>
                     <a:cs typeface="Arial" panose="020B0604020202020204" pitchFamily="34" charset="0"/>
                   </a:rPr>
-                  <a:t>HMM is a NN structure that is uniquely defined by the tuple </a:t>
+                  <a:t>HMM is an LVM structure that is uniquely defined by the tuple </a:t>
                 </a:r>
                 <a14:m>
                   <m:oMath xmlns:m="http://schemas.openxmlformats.org/officeDocument/2006/math">
@@ -12071,7 +13405,7 @@
                         <m:begChr m:val="{"/>
                         <m:endChr m:val="}"/>
                         <m:ctrlPr>
-                          <a:rPr lang="en-US" sz="2000" i="1">
+                          <a:rPr lang="en-US" sz="2000" i="1" smtClean="0">
                             <a:effectLst/>
                             <a:latin typeface="Cambria Math" panose="02040503050406030204" pitchFamily="18" charset="0"/>
                           </a:rPr>
@@ -12142,13 +13476,77 @@
                 </a:br>
                 <a:r>
                   <a:rPr lang="en-US" sz="1600" dirty="0"/>
-                  <a:t>To train an HMM we must get the emissions from the trials. A trial is a trajectory of observations, </a:t>
+                  <a:t>Training HMM</a:t>
+                </a:r>
+              </a:p>
+              <a:p>
+                <a:pPr marL="0" indent="0">
+                  <a:lnSpc>
+                    <a:spcPct val="100000"/>
+                  </a:lnSpc>
+                  <a:buNone/>
+                </a:pPr>
+                <a:r>
+                  <a:rPr lang="en-US" sz="1600" dirty="0"/>
+                  <a:t> Trial = </a:t>
+                </a:r>
+                <a14:m>
+                  <m:oMath xmlns:m="http://schemas.openxmlformats.org/officeDocument/2006/math">
+                    <m:d>
+                      <m:dPr>
+                        <m:ctrlPr>
+                          <a:rPr lang="en-US" sz="1600" i="1">
+                            <a:latin typeface="Cambria Math" panose="02040503050406030204" pitchFamily="18" charset="0"/>
+                          </a:rPr>
+                        </m:ctrlPr>
+                      </m:dPr>
+                      <m:e>
+                        <m:sSub>
+                          <m:sSubPr>
+                            <m:ctrlPr>
+                              <a:rPr lang="en-US" sz="1600" i="1">
+                                <a:latin typeface="Cambria Math" panose="02040503050406030204" pitchFamily="18" charset="0"/>
+                              </a:rPr>
+                            </m:ctrlPr>
+                          </m:sSubPr>
+                          <m:e>
+                            <m:r>
+                              <a:rPr lang="en-US" sz="1600" i="1">
+                                <a:latin typeface="Cambria Math" panose="02040503050406030204" pitchFamily="18" charset="0"/>
+                              </a:rPr>
+                              <m:t>𝑣</m:t>
+                            </m:r>
+                          </m:e>
+                          <m:sub>
+                            <m:r>
+                              <a:rPr lang="en-US" sz="1600" i="1">
+                                <a:latin typeface="Cambria Math" panose="02040503050406030204" pitchFamily="18" charset="0"/>
+                              </a:rPr>
+                              <m:t>1:</m:t>
+                            </m:r>
+                            <m:r>
+                              <a:rPr lang="en-US" sz="1600" i="1">
+                                <a:latin typeface="Cambria Math" panose="02040503050406030204" pitchFamily="18" charset="0"/>
+                              </a:rPr>
+                              <m:t>𝑇</m:t>
+                            </m:r>
+                          </m:sub>
+                        </m:sSub>
+                      </m:e>
+                    </m:d>
+                  </m:oMath>
+                </a14:m>
+                <a:r>
+                  <a:rPr lang="en-US" sz="1600" dirty="0"/>
+                  <a:t>,  HMM gives </a:t>
                 </a:r>
                 <a14:m>
                   <m:oMath xmlns:m="http://schemas.openxmlformats.org/officeDocument/2006/math">
                     <m:r>
                       <a:rPr lang="en-US" sz="1600" i="1">
                         <a:latin typeface="Cambria Math" panose="02040503050406030204" pitchFamily="18" charset="0"/>
+                        <a:ea typeface="Aptos" panose="020B0004020202020204" pitchFamily="34" charset="0"/>
+                        <a:cs typeface="Arial" panose="020B0604020202020204" pitchFamily="34" charset="0"/>
                       </a:rPr>
                       <m:t>𝑝</m:t>
                     </m:r>
@@ -12196,10 +13594,7 @@
                     </m:d>
                   </m:oMath>
                 </a14:m>
-                <a:r>
-                  <a:rPr lang="en-US" sz="1600" dirty="0"/>
-                  <a:t>, which we obtain through the following steps:</a:t>
-                </a:r>
+                <a:endParaRPr lang="en-US" sz="1600" dirty="0"/>
               </a:p>
               <a:p>
                 <a:pPr marL="342900" indent="-342900">
@@ -12209,23 +13604,19 @@
                   <a:buFont typeface="+mj-lt"/>
                   <a:buAutoNum type="arabicPeriod"/>
                 </a:pPr>
-                <a:r>
-                  <a:rPr lang="en-US" sz="1600" dirty="0"/>
-                  <a:t>Sample the initial hidden states using the initial distributions π. We can get, for instance, </a:t>
-                </a:r>
                 <a14:m>
                   <m:oMath xmlns:m="http://schemas.openxmlformats.org/officeDocument/2006/math">
                     <m:sSub>
                       <m:sSubPr>
                         <m:ctrlPr>
-                          <a:rPr lang="en-US" sz="1600" i="1">
+                          <a:rPr lang="en-US" sz="1600" b="0" i="1" smtClean="0">
                             <a:latin typeface="Cambria Math" panose="02040503050406030204" pitchFamily="18" charset="0"/>
                           </a:rPr>
                         </m:ctrlPr>
                       </m:sSubPr>
                       <m:e>
                         <m:r>
-                          <a:rPr lang="en-US" sz="1600" i="1">
+                          <a:rPr lang="en-US" sz="1600" b="0" i="1" smtClean="0">
                             <a:latin typeface="Cambria Math" panose="02040503050406030204" pitchFamily="18" charset="0"/>
                           </a:rPr>
                           <m:t>h</m:t>
@@ -12233,7 +13624,7 @@
                       </m:e>
                       <m:sub>
                         <m:r>
-                          <a:rPr lang="en-US" sz="1600" i="1">
+                          <a:rPr lang="en-US" sz="1600" b="0" i="1" smtClean="0">
                             <a:latin typeface="Cambria Math" panose="02040503050406030204" pitchFamily="18" charset="0"/>
                           </a:rPr>
                           <m:t>1</m:t>
@@ -12241,10 +13632,76 @@
                       </m:sub>
                     </m:sSub>
                     <m:r>
-                      <a:rPr lang="en-US" sz="1600" i="1">
+                      <a:rPr lang="en-US" sz="1600" b="0" i="1" smtClean="0">
                         <a:latin typeface="Cambria Math" panose="02040503050406030204" pitchFamily="18" charset="0"/>
                       </a:rPr>
-                      <m:t>=3</m:t>
+                      <m:t>~</m:t>
+                    </m:r>
+                    <m:r>
+                      <a:rPr lang="en-US" sz="1600" b="0" i="1" smtClean="0">
+                        <a:latin typeface="Cambria Math" panose="02040503050406030204" pitchFamily="18" charset="0"/>
+                      </a:rPr>
+                      <m:t>𝜋</m:t>
+                    </m:r>
+                    <m:r>
+                      <a:rPr lang="en-US" sz="1600" b="0" i="1" smtClean="0">
+                        <a:latin typeface="Cambria Math" panose="02040503050406030204" pitchFamily="18" charset="0"/>
+                      </a:rPr>
+                      <m:t>  ,  </m:t>
+                    </m:r>
+                    <m:r>
+                      <a:rPr lang="en-US" sz="1600" b="0" i="1" smtClean="0">
+                        <a:latin typeface="Cambria Math" panose="02040503050406030204" pitchFamily="18" charset="0"/>
+                      </a:rPr>
+                      <m:t>𝑃</m:t>
+                    </m:r>
+                    <m:d>
+                      <m:dPr>
+                        <m:ctrlPr>
+                          <a:rPr lang="en-US" sz="1600" b="0" i="1" smtClean="0">
+                            <a:latin typeface="Cambria Math" panose="02040503050406030204" pitchFamily="18" charset="0"/>
+                          </a:rPr>
+                        </m:ctrlPr>
+                      </m:dPr>
+                      <m:e>
+                        <m:sSub>
+                          <m:sSubPr>
+                            <m:ctrlPr>
+                              <a:rPr lang="en-US" sz="1600" b="0" i="1" smtClean="0">
+                                <a:latin typeface="Cambria Math" panose="02040503050406030204" pitchFamily="18" charset="0"/>
+                              </a:rPr>
+                            </m:ctrlPr>
+                          </m:sSubPr>
+                          <m:e>
+                            <m:r>
+                              <a:rPr lang="en-US" sz="1600" b="0" i="1" smtClean="0">
+                                <a:latin typeface="Cambria Math" panose="02040503050406030204" pitchFamily="18" charset="0"/>
+                              </a:rPr>
+                              <m:t>h</m:t>
+                            </m:r>
+                          </m:e>
+                          <m:sub>
+                            <m:r>
+                              <a:rPr lang="en-US" sz="1600" b="0" i="1" smtClean="0">
+                                <a:latin typeface="Cambria Math" panose="02040503050406030204" pitchFamily="18" charset="0"/>
+                              </a:rPr>
+                              <m:t>1</m:t>
+                            </m:r>
+                          </m:sub>
+                        </m:sSub>
+                      </m:e>
+                    </m:d>
+                    <m:r>
+                      <a:rPr lang="en-US" sz="1600" b="0" i="1" smtClean="0">
+                        <a:latin typeface="Cambria Math" panose="02040503050406030204" pitchFamily="18" charset="0"/>
+                      </a:rPr>
+                      <m:t>=</m:t>
+                    </m:r>
+                    <m:r>
+                      <a:rPr lang="en-US" sz="1600" b="0" i="1" smtClean="0">
+                        <a:latin typeface="Cambria Math" panose="02040503050406030204" pitchFamily="18" charset="0"/>
+                      </a:rPr>
+                      <m:t>𝜋</m:t>
                     </m:r>
                   </m:oMath>
                 </a14:m>
@@ -12261,100 +13718,19 @@
                   <a:buFont typeface="+mj-lt"/>
                   <a:buAutoNum type="arabicPeriod"/>
                 </a:pPr>
-                <a:r>
-                  <a:rPr lang="en-US" sz="1600" dirty="0"/>
-                  <a:t>Sample the following hidden states using the transition matrix. E.g., if </a:t>
-                </a:r>
                 <a14:m>
                   <m:oMath xmlns:m="http://schemas.openxmlformats.org/officeDocument/2006/math">
-                    <m:sSub>
-                      <m:sSubPr>
-                        <m:ctrlPr>
-                          <a:rPr lang="en-US" sz="1600" i="1">
-                            <a:latin typeface="Cambria Math" panose="02040503050406030204" pitchFamily="18" charset="0"/>
-                          </a:rPr>
-                        </m:ctrlPr>
-                      </m:sSubPr>
-                      <m:e>
-                        <m:r>
-                          <a:rPr lang="en-US" sz="1600" i="1">
-                            <a:latin typeface="Cambria Math" panose="02040503050406030204" pitchFamily="18" charset="0"/>
-                          </a:rPr>
-                          <m:t>h</m:t>
-                        </m:r>
-                      </m:e>
-                      <m:sub>
-                        <m:r>
-                          <a:rPr lang="en-US" sz="1600" i="1">
-                            <a:latin typeface="Cambria Math" panose="02040503050406030204" pitchFamily="18" charset="0"/>
-                          </a:rPr>
-                          <m:t>1</m:t>
-                        </m:r>
-                      </m:sub>
-                    </m:sSub>
                     <m:r>
-                      <a:rPr lang="en-US" sz="1600" i="1">
+                      <a:rPr lang="en-US" sz="1600" b="0" i="1" smtClean="0">
                         <a:latin typeface="Cambria Math" panose="02040503050406030204" pitchFamily="18" charset="0"/>
                       </a:rPr>
-                      <m:t>=3 </m:t>
+                      <m:t>𝐴</m:t>
                     </m:r>
                     <m:r>
-                      <a:rPr lang="en-US" sz="1600" i="1">
+                      <a:rPr lang="en-US" sz="1600" b="0" i="1" smtClean="0">
                         <a:latin typeface="Cambria Math" panose="02040503050406030204" pitchFamily="18" charset="0"/>
                       </a:rPr>
-                      <m:t>𝑡h𝑒𝑛</m:t>
-                    </m:r>
-                  </m:oMath>
-                </a14:m>
-                <a:r>
-                  <a:rPr lang="en-US" sz="1600" dirty="0"/>
-                  <a:t> we sample </a:t>
-                </a:r>
-                <a14:m>
-                  <m:oMath xmlns:m="http://schemas.openxmlformats.org/officeDocument/2006/math">
-                    <m:sSub>
-                      <m:sSubPr>
-                        <m:ctrlPr>
-                          <a:rPr lang="en-US" sz="1600" i="1">
-                            <a:latin typeface="Cambria Math" panose="02040503050406030204" pitchFamily="18" charset="0"/>
-                          </a:rPr>
-                        </m:ctrlPr>
-                      </m:sSubPr>
-                      <m:e>
-                        <m:r>
-                          <a:rPr lang="en-US" sz="1600" i="1">
-                            <a:latin typeface="Cambria Math" panose="02040503050406030204" pitchFamily="18" charset="0"/>
-                          </a:rPr>
-                          <m:t>h</m:t>
-                        </m:r>
-                      </m:e>
-                      <m:sub>
-                        <m:r>
-                          <a:rPr lang="en-US" sz="1600" i="1">
-                            <a:latin typeface="Cambria Math" panose="02040503050406030204" pitchFamily="18" charset="0"/>
-                          </a:rPr>
-                          <m:t>1</m:t>
-                        </m:r>
-                      </m:sub>
-                    </m:sSub>
-                    <m:r>
-                      <a:rPr lang="en-US" sz="1600" i="1">
-                        <a:latin typeface="Cambria Math" panose="02040503050406030204" pitchFamily="18" charset="0"/>
-                      </a:rPr>
-                      <m:t> </m:t>
-                    </m:r>
-                    <m:r>
-                      <m:rPr>
-                        <m:nor/>
-                      </m:rPr>
-                      <a:rPr lang="en-US" sz="1600"/>
-                      <m:t>from</m:t>
-                    </m:r>
-                    <m:r>
-                      <a:rPr lang="en-US" sz="1600" i="1">
-                        <a:latin typeface="Cambria Math" panose="02040503050406030204" pitchFamily="18" charset="0"/>
-                      </a:rPr>
-                      <m:t> </m:t>
+                      <m:t>= </m:t>
                     </m:r>
                     <m:r>
                       <a:rPr lang="en-US" sz="1600" i="1">
@@ -12362,74 +13738,69 @@
                       </a:rPr>
                       <m:t>𝑝</m:t>
                     </m:r>
-                    <m:r>
-                      <a:rPr lang="en-US" sz="1600" i="1">
-                        <a:latin typeface="Cambria Math" panose="02040503050406030204" pitchFamily="18" charset="0"/>
-                      </a:rPr>
-                      <m:t>(</m:t>
-                    </m:r>
-                    <m:sSub>
-                      <m:sSubPr>
+                    <m:d>
+                      <m:dPr>
                         <m:ctrlPr>
                           <a:rPr lang="en-US" sz="1600" i="1">
                             <a:latin typeface="Cambria Math" panose="02040503050406030204" pitchFamily="18" charset="0"/>
                           </a:rPr>
                         </m:ctrlPr>
-                      </m:sSubPr>
+                      </m:dPr>
                       <m:e>
-                        <m:r>
-                          <a:rPr lang="en-US" sz="1600" i="1">
-                            <a:latin typeface="Cambria Math" panose="02040503050406030204" pitchFamily="18" charset="0"/>
-                          </a:rPr>
-                          <m:t>h</m:t>
-                        </m:r>
+                        <m:sSub>
+                          <m:sSubPr>
+                            <m:ctrlPr>
+                              <a:rPr lang="en-US" sz="1600" i="1">
+                                <a:latin typeface="Cambria Math" panose="02040503050406030204" pitchFamily="18" charset="0"/>
+                              </a:rPr>
+                            </m:ctrlPr>
+                          </m:sSubPr>
+                          <m:e>
+                            <m:r>
+                              <a:rPr lang="en-US" sz="1600" i="1">
+                                <a:latin typeface="Cambria Math" panose="02040503050406030204" pitchFamily="18" charset="0"/>
+                              </a:rPr>
+                              <m:t>h</m:t>
+                            </m:r>
+                          </m:e>
+                          <m:sub>
+                            <m:r>
+                              <a:rPr lang="en-US" sz="1600" i="1">
+                                <a:latin typeface="Cambria Math" panose="02040503050406030204" pitchFamily="18" charset="0"/>
+                              </a:rPr>
+                              <m:t>2</m:t>
+                            </m:r>
+                          </m:sub>
+                        </m:sSub>
                       </m:e>
-                      <m:sub>
-                        <m:r>
-                          <a:rPr lang="en-US" sz="1600" i="1">
-                            <a:latin typeface="Cambria Math" panose="02040503050406030204" pitchFamily="18" charset="0"/>
-                          </a:rPr>
-                          <m:t>2</m:t>
-                        </m:r>
-                      </m:sub>
-                    </m:sSub>
-                    <m:r>
-                      <a:rPr lang="en-US" sz="1600" i="1">
-                        <a:latin typeface="Cambria Math" panose="02040503050406030204" pitchFamily="18" charset="0"/>
-                      </a:rPr>
-                      <m:t>|</m:t>
-                    </m:r>
-                    <m:sSub>
-                      <m:sSubPr>
-                        <m:ctrlPr>
-                          <a:rPr lang="en-US" sz="1600" i="1">
-                            <a:latin typeface="Cambria Math" panose="02040503050406030204" pitchFamily="18" charset="0"/>
-                          </a:rPr>
-                        </m:ctrlPr>
-                      </m:sSubPr>
                       <m:e>
-                        <m:r>
-                          <a:rPr lang="en-US" sz="1600" i="1">
-                            <a:latin typeface="Cambria Math" panose="02040503050406030204" pitchFamily="18" charset="0"/>
-                          </a:rPr>
-                          <m:t>h</m:t>
-                        </m:r>
+                        <m:sSub>
+                          <m:sSubPr>
+                            <m:ctrlPr>
+                              <a:rPr lang="en-US" sz="1600" i="1">
+                                <a:latin typeface="Cambria Math" panose="02040503050406030204" pitchFamily="18" charset="0"/>
+                              </a:rPr>
+                            </m:ctrlPr>
+                          </m:sSubPr>
+                          <m:e>
+                            <m:r>
+                              <a:rPr lang="en-US" sz="1600" i="1">
+                                <a:latin typeface="Cambria Math" panose="02040503050406030204" pitchFamily="18" charset="0"/>
+                              </a:rPr>
+                              <m:t>h</m:t>
+                            </m:r>
+                          </m:e>
+                          <m:sub>
+                            <m:r>
+                              <a:rPr lang="en-US" sz="1600" i="1">
+                                <a:latin typeface="Cambria Math" panose="02040503050406030204" pitchFamily="18" charset="0"/>
+                              </a:rPr>
+                              <m:t>1</m:t>
+                            </m:r>
+                          </m:sub>
+                        </m:sSub>
                       </m:e>
-                      <m:sub>
-                        <m:r>
-                          <a:rPr lang="en-US" sz="1600" i="1">
-                            <a:latin typeface="Cambria Math" panose="02040503050406030204" pitchFamily="18" charset="0"/>
-                          </a:rPr>
-                          <m:t>1</m:t>
-                        </m:r>
-                      </m:sub>
-                    </m:sSub>
-                    <m:r>
-                      <a:rPr lang="en-US" sz="1600" i="1">
-                        <a:latin typeface="Cambria Math" panose="02040503050406030204" pitchFamily="18" charset="0"/>
-                      </a:rPr>
-                      <m:t>=3)</m:t>
-                    </m:r>
+                    </m:d>
                   </m:oMath>
                 </a14:m>
                 <a:r>
@@ -12445,12 +13816,38 @@
                   <a:buFont typeface="+mj-lt"/>
                   <a:buAutoNum type="arabicPeriod"/>
                 </a:pPr>
-                <a:r>
-                  <a:rPr lang="en-US" sz="1600" dirty="0"/>
-                  <a:t>Similarly, we repeat the process for </a:t>
-                </a:r>
                 <a14:m>
                   <m:oMath xmlns:m="http://schemas.openxmlformats.org/officeDocument/2006/math">
+                    <m:r>
+                      <m:rPr>
+                        <m:sty m:val="p"/>
+                      </m:rPr>
+                      <a:rPr lang="en-US" sz="1600" b="0" i="0" smtClean="0">
+                        <a:latin typeface="Cambria Math" panose="02040503050406030204" pitchFamily="18" charset="0"/>
+                      </a:rPr>
+                      <m:t>Repeat</m:t>
+                    </m:r>
+                    <m:r>
+                      <a:rPr lang="en-US" sz="1600" b="0" i="0" smtClean="0">
+                        <a:latin typeface="Cambria Math" panose="02040503050406030204" pitchFamily="18" charset="0"/>
+                      </a:rPr>
+                      <m:t> </m:t>
+                    </m:r>
+                    <m:r>
+                      <m:rPr>
+                        <m:sty m:val="p"/>
+                      </m:rPr>
+                      <a:rPr lang="en-US" sz="1600" b="0" i="0" smtClean="0">
+                        <a:latin typeface="Cambria Math" panose="02040503050406030204" pitchFamily="18" charset="0"/>
+                      </a:rPr>
+                      <m:t>for</m:t>
+                    </m:r>
+                    <m:r>
+                      <a:rPr lang="en-US" sz="1600" b="0" i="0" smtClean="0">
+                        <a:latin typeface="Cambria Math" panose="02040503050406030204" pitchFamily="18" charset="0"/>
+                      </a:rPr>
+                      <m:t>  </m:t>
+                    </m:r>
                     <m:sSub>
                       <m:sSubPr>
                         <m:ctrlPr>
@@ -12772,15 +14169,29 @@
                 <a:endParaRPr lang="en-US" sz="1600" dirty="0"/>
               </a:p>
               <a:p>
-                <a:pPr marL="0" indent="0">
+                <a:pPr>
                   <a:lnSpc>
                     <a:spcPct val="100000"/>
                   </a:lnSpc>
-                  <a:buNone/>
+                  <a:buFont typeface="Wingdings" pitchFamily="2" charset="2"/>
+                  <a:buChar char="à"/>
                 </a:pPr>
                 <a:r>
                   <a:rPr lang="en-US" sz="1600" dirty="0"/>
-                  <a:t>Using optimization algo (e.g. GD) we then find the optimal parameters (</a:t>
+                  <a:t>Optimization algo, e.g. gradient descent (GD) </a:t>
+                </a:r>
+              </a:p>
+              <a:p>
+                <a:pPr>
+                  <a:lnSpc>
+                    <a:spcPct val="100000"/>
+                  </a:lnSpc>
+                  <a:buFont typeface="Wingdings" pitchFamily="2" charset="2"/>
+                  <a:buChar char="à"/>
+                </a:pPr>
+                <a:r>
+                  <a:rPr lang="en-US" sz="1600" dirty="0"/>
+                  <a:t>Optimal parameters (</a:t>
                 </a:r>
                 <a14:m>
                   <m:oMath xmlns:m="http://schemas.openxmlformats.org/officeDocument/2006/math">
@@ -12903,7 +14314,7 @@
                 </a14:m>
                 <a:r>
                   <a:rPr lang="en-US" sz="1600" dirty="0"/>
-                  <a:t>) which maximize the (log) likelihood, </a:t>
+                  <a:t>) which maximize </a:t>
                 </a:r>
                 <a14:m>
                   <m:oMath xmlns:m="http://schemas.openxmlformats.org/officeDocument/2006/math">
@@ -13179,12 +14590,9 @@
                   <a:rPr lang="en-US" sz="1200" dirty="0">
                     <a:effectLst/>
                   </a:rPr>
-                  <a:t> , </a:t>
+                  <a:t> </a:t>
                 </a:r>
-                <a:r>
-                  <a:rPr lang="en-US" sz="1600" dirty="0"/>
-                  <a:t>or minimize the negative likelihood.</a:t>
-                </a:r>
+                <a:endParaRPr lang="en-US" sz="1600" dirty="0"/>
               </a:p>
             </p:txBody>
           </p:sp>
@@ -13214,7 +14622,7 @@
               <a:blipFill>
                 <a:blip r:embed="rId3"/>
                 <a:stretch>
-                  <a:fillRect l="-752" t="-698" r="-752"/>
+                  <a:fillRect l="-752" t="-698" r="-376"/>
                 </a:stretch>
               </a:blipFill>
             </p:spPr>
@@ -13324,6 +14732,351 @@
           </a:extLst>
         </p:spPr>
       </p:pic>
+      <mc:AlternateContent xmlns:mc="http://schemas.openxmlformats.org/markup-compatibility/2006">
+        <mc:Choice xmlns:a14="http://schemas.microsoft.com/office/drawing/2010/main" Requires="a14">
+          <p:sp>
+            <p:nvSpPr>
+              <p:cNvPr id="4282" name="TextBox 4281">
+                <a:extLst>
+                  <a:ext uri="{FF2B5EF4-FFF2-40B4-BE49-F238E27FC236}">
+                    <a16:creationId xmlns:a16="http://schemas.microsoft.com/office/drawing/2014/main" id="{27949D08-3669-64AA-598E-B4372B13B48D}"/>
+                  </a:ext>
+                </a:extLst>
+              </p:cNvPr>
+              <p:cNvSpPr txBox="1"/>
+              <p:nvPr/>
+            </p:nvSpPr>
+            <p:spPr>
+              <a:xfrm>
+                <a:off x="3689444" y="2241895"/>
+                <a:ext cx="933913" cy="369332"/>
+              </a:xfrm>
+              <a:prstGeom prst="rect">
+                <a:avLst/>
+              </a:prstGeom>
+              <a:noFill/>
+            </p:spPr>
+            <p:txBody>
+              <a:bodyPr wrap="square">
+                <a:spAutoFit/>
+              </a:bodyPr>
+              <a:lstStyle/>
+              <a:p>
+                <a:pPr/>
+                <a14:m>
+                  <m:oMathPara xmlns:m="http://schemas.openxmlformats.org/officeDocument/2006/math">
+                    <m:oMathParaPr>
+                      <m:jc m:val="centerGroup"/>
+                    </m:oMathParaPr>
+                    <m:oMath xmlns:m="http://schemas.openxmlformats.org/officeDocument/2006/math">
+                      <m:r>
+                        <a:rPr lang="en-US" sz="1800" i="1" smtClean="0">
+                          <a:latin typeface="Cambria Math" panose="02040503050406030204" pitchFamily="18" charset="0"/>
+                        </a:rPr>
+                        <m:t>𝑝</m:t>
+                      </m:r>
+                      <m:d>
+                        <m:dPr>
+                          <m:ctrlPr>
+                            <a:rPr lang="en-US" sz="1800" i="1">
+                              <a:latin typeface="Cambria Math" panose="02040503050406030204" pitchFamily="18" charset="0"/>
+                            </a:rPr>
+                          </m:ctrlPr>
+                        </m:dPr>
+                        <m:e>
+                          <m:sSub>
+                            <m:sSubPr>
+                              <m:ctrlPr>
+                                <a:rPr lang="en-US" sz="1800" i="1">
+                                  <a:latin typeface="Cambria Math" panose="02040503050406030204" pitchFamily="18" charset="0"/>
+                                </a:rPr>
+                              </m:ctrlPr>
+                            </m:sSubPr>
+                            <m:e>
+                              <m:r>
+                                <a:rPr lang="en-US" sz="1800" i="1">
+                                  <a:latin typeface="Cambria Math" panose="02040503050406030204" pitchFamily="18" charset="0"/>
+                                </a:rPr>
+                                <m:t>𝑣</m:t>
+                              </m:r>
+                            </m:e>
+                            <m:sub>
+                              <m:r>
+                                <a:rPr lang="en-US" sz="1800" i="1">
+                                  <a:latin typeface="Cambria Math" panose="02040503050406030204" pitchFamily="18" charset="0"/>
+                                </a:rPr>
+                                <m:t>1:</m:t>
+                              </m:r>
+                              <m:r>
+                                <a:rPr lang="en-US" sz="1800" i="1">
+                                  <a:latin typeface="Cambria Math" panose="02040503050406030204" pitchFamily="18" charset="0"/>
+                                </a:rPr>
+                                <m:t>𝑇</m:t>
+                              </m:r>
+                            </m:sub>
+                          </m:sSub>
+                        </m:e>
+                      </m:d>
+                    </m:oMath>
+                  </m:oMathPara>
+                </a14:m>
+                <a:endParaRPr lang="en-US" dirty="0"/>
+              </a:p>
+            </p:txBody>
+          </p:sp>
+        </mc:Choice>
+        <mc:Fallback>
+          <p:sp>
+            <p:nvSpPr>
+              <p:cNvPr id="4282" name="TextBox 4281">
+                <a:extLst>
+                  <a:ext uri="{FF2B5EF4-FFF2-40B4-BE49-F238E27FC236}">
+                    <a16:creationId xmlns:a16="http://schemas.microsoft.com/office/drawing/2014/main" id="{27949D08-3669-64AA-598E-B4372B13B48D}"/>
+                  </a:ext>
+                </a:extLst>
+              </p:cNvPr>
+              <p:cNvSpPr txBox="1">
+                <a:spLocks noRot="1" noChangeAspect="1" noMove="1" noResize="1" noEditPoints="1" noAdjustHandles="1" noChangeArrowheads="1" noChangeShapeType="1" noTextEdit="1"/>
+              </p:cNvSpPr>
+              <p:nvPr/>
+            </p:nvSpPr>
+            <p:spPr>
+              <a:xfrm>
+                <a:off x="3689444" y="2241895"/>
+                <a:ext cx="933913" cy="369332"/>
+              </a:xfrm>
+              <a:prstGeom prst="rect">
+                <a:avLst/>
+              </a:prstGeom>
+              <a:blipFill>
+                <a:blip r:embed="rId6"/>
+                <a:stretch>
+                  <a:fillRect b="-6667"/>
+                </a:stretch>
+              </a:blipFill>
+            </p:spPr>
+            <p:txBody>
+              <a:bodyPr/>
+              <a:lstStyle/>
+              <a:p>
+                <a:r>
+                  <a:rPr lang="en-US">
+                    <a:noFill/>
+                  </a:rPr>
+                  <a:t> </a:t>
+                </a:r>
+              </a:p>
+            </p:txBody>
+          </p:sp>
+        </mc:Fallback>
+      </mc:AlternateContent>
+      <mc:AlternateContent xmlns:mc="http://schemas.openxmlformats.org/markup-compatibility/2006">
+        <mc:Choice xmlns:a14="http://schemas.microsoft.com/office/drawing/2010/main" Requires="a14">
+          <p:sp>
+            <p:nvSpPr>
+              <p:cNvPr id="4286" name="TextBox 4285">
+                <a:extLst>
+                  <a:ext uri="{FF2B5EF4-FFF2-40B4-BE49-F238E27FC236}">
+                    <a16:creationId xmlns:a16="http://schemas.microsoft.com/office/drawing/2014/main" id="{15FF9758-6D6F-03A5-FD2A-0A4AFAA638E7}"/>
+                  </a:ext>
+                </a:extLst>
+              </p:cNvPr>
+              <p:cNvSpPr txBox="1"/>
+              <p:nvPr/>
+            </p:nvSpPr>
+            <p:spPr>
+              <a:xfrm>
+                <a:off x="892653" y="3318471"/>
+                <a:ext cx="3545532" cy="369332"/>
+              </a:xfrm>
+              <a:prstGeom prst="rect">
+                <a:avLst/>
+              </a:prstGeom>
+              <a:noFill/>
+            </p:spPr>
+            <p:txBody>
+              <a:bodyPr wrap="square">
+                <a:spAutoFit/>
+              </a:bodyPr>
+              <a:lstStyle/>
+              <a:p>
+                <a:r>
+                  <a:rPr lang="en-US" sz="1800" dirty="0"/>
+                  <a:t>(</a:t>
+                </a:r>
+                <a14:m>
+                  <m:oMath xmlns:m="http://schemas.openxmlformats.org/officeDocument/2006/math">
+                    <m:sSub>
+                      <m:sSubPr>
+                        <m:ctrlPr>
+                          <a:rPr lang="en-US" sz="1800" i="1">
+                            <a:latin typeface="Cambria Math" panose="02040503050406030204" pitchFamily="18" charset="0"/>
+                          </a:rPr>
+                        </m:ctrlPr>
+                      </m:sSubPr>
+                      <m:e>
+                        <m:r>
+                          <a:rPr lang="en-US" sz="1800" i="1">
+                            <a:latin typeface="Cambria Math" panose="02040503050406030204" pitchFamily="18" charset="0"/>
+                          </a:rPr>
+                          <m:t>𝐴</m:t>
+                        </m:r>
+                      </m:e>
+                      <m:sub>
+                        <m:r>
+                          <a:rPr lang="en-US" sz="1800" i="1">
+                            <a:latin typeface="Cambria Math" panose="02040503050406030204" pitchFamily="18" charset="0"/>
+                          </a:rPr>
+                          <m:t>𝑠𝑡𝑢𝑑𝑒𝑛𝑡</m:t>
+                        </m:r>
+                      </m:sub>
+                    </m:sSub>
+                  </m:oMath>
+                </a14:m>
+                <a:r>
+                  <a:rPr lang="en-US" sz="1800" dirty="0"/>
+                  <a:t>, </a:t>
+                </a:r>
+                <a14:m>
+                  <m:oMath xmlns:m="http://schemas.openxmlformats.org/officeDocument/2006/math">
+                    <m:sSub>
+                      <m:sSubPr>
+                        <m:ctrlPr>
+                          <a:rPr lang="en-US" sz="1800" i="1">
+                            <a:latin typeface="Cambria Math" panose="02040503050406030204" pitchFamily="18" charset="0"/>
+                          </a:rPr>
+                        </m:ctrlPr>
+                      </m:sSubPr>
+                      <m:e>
+                        <m:r>
+                          <a:rPr lang="en-US" sz="1800" b="0" i="1" smtClean="0">
+                            <a:latin typeface="Cambria Math" panose="02040503050406030204" pitchFamily="18" charset="0"/>
+                          </a:rPr>
+                          <m:t>𝜋</m:t>
+                        </m:r>
+                      </m:e>
+                      <m:sub>
+                        <m:r>
+                          <a:rPr lang="en-US" sz="1800" i="1">
+                            <a:latin typeface="Cambria Math" panose="02040503050406030204" pitchFamily="18" charset="0"/>
+                          </a:rPr>
+                          <m:t>𝑠𝑡𝑢𝑑𝑒𝑛𝑡</m:t>
+                        </m:r>
+                      </m:sub>
+                    </m:sSub>
+                  </m:oMath>
+                </a14:m>
+                <a:r>
+                  <a:rPr lang="en-US" sz="1800" dirty="0"/>
+                  <a:t>, </a:t>
+                </a:r>
+                <a14:m>
+                  <m:oMath xmlns:m="http://schemas.openxmlformats.org/officeDocument/2006/math">
+                    <m:sSub>
+                      <m:sSubPr>
+                        <m:ctrlPr>
+                          <a:rPr lang="en-US" sz="1800" i="1">
+                            <a:latin typeface="Cambria Math" panose="02040503050406030204" pitchFamily="18" charset="0"/>
+                          </a:rPr>
+                        </m:ctrlPr>
+                      </m:sSubPr>
+                      <m:e>
+                        <m:r>
+                          <a:rPr lang="el-GR" sz="1800" i="1">
+                            <a:latin typeface="Cambria Math" panose="02040503050406030204" pitchFamily="18" charset="0"/>
+                          </a:rPr>
+                          <m:t>{</m:t>
+                        </m:r>
+                        <m:r>
+                          <a:rPr lang="el-GR" sz="1800" i="1">
+                            <a:latin typeface="Cambria Math" panose="02040503050406030204" pitchFamily="18" charset="0"/>
+                          </a:rPr>
+                          <m:t>𝜇</m:t>
+                        </m:r>
+                        <m:r>
+                          <a:rPr lang="el-GR" sz="1800" i="1">
+                            <a:latin typeface="Cambria Math" panose="02040503050406030204" pitchFamily="18" charset="0"/>
+                          </a:rPr>
+                          <m:t>,</m:t>
+                        </m:r>
+                        <m:r>
+                          <a:rPr lang="el-GR" sz="1800" i="1">
+                            <a:latin typeface="Cambria Math" panose="02040503050406030204" pitchFamily="18" charset="0"/>
+                          </a:rPr>
+                          <m:t>𝛴</m:t>
+                        </m:r>
+                        <m:r>
+                          <a:rPr lang="el-GR" sz="1800" i="1">
+                            <a:latin typeface="Cambria Math" panose="02040503050406030204" pitchFamily="18" charset="0"/>
+                          </a:rPr>
+                          <m:t>}</m:t>
+                        </m:r>
+                      </m:e>
+                      <m:sub>
+                        <m:r>
+                          <a:rPr lang="en-US" sz="1800" i="1">
+                            <a:latin typeface="Cambria Math" panose="02040503050406030204" pitchFamily="18" charset="0"/>
+                          </a:rPr>
+                          <m:t>𝑠𝑡𝑢𝑑𝑒𝑛𝑡</m:t>
+                        </m:r>
+                      </m:sub>
+                    </m:sSub>
+                  </m:oMath>
+                </a14:m>
+                <a:r>
+                  <a:rPr lang="en-US" sz="1800" dirty="0"/>
+                  <a:t>) </a:t>
+                </a:r>
+                <a:endParaRPr lang="en-US" dirty="0"/>
+              </a:p>
+            </p:txBody>
+          </p:sp>
+        </mc:Choice>
+        <mc:Fallback>
+          <p:sp>
+            <p:nvSpPr>
+              <p:cNvPr id="4286" name="TextBox 4285">
+                <a:extLst>
+                  <a:ext uri="{FF2B5EF4-FFF2-40B4-BE49-F238E27FC236}">
+                    <a16:creationId xmlns:a16="http://schemas.microsoft.com/office/drawing/2014/main" id="{15FF9758-6D6F-03A5-FD2A-0A4AFAA638E7}"/>
+                  </a:ext>
+                </a:extLst>
+              </p:cNvPr>
+              <p:cNvSpPr txBox="1">
+                <a:spLocks noRot="1" noChangeAspect="1" noMove="1" noResize="1" noEditPoints="1" noAdjustHandles="1" noChangeArrowheads="1" noChangeShapeType="1" noTextEdit="1"/>
+              </p:cNvSpPr>
+              <p:nvPr/>
+            </p:nvSpPr>
+            <p:spPr>
+              <a:xfrm>
+                <a:off x="892653" y="3318471"/>
+                <a:ext cx="3545532" cy="369332"/>
+              </a:xfrm>
+              <a:prstGeom prst="rect">
+                <a:avLst/>
+              </a:prstGeom>
+              <a:blipFill>
+                <a:blip r:embed="rId7"/>
+                <a:stretch>
+                  <a:fillRect l="-1429" t="-6667" b="-23333"/>
+                </a:stretch>
+              </a:blipFill>
+            </p:spPr>
+            <p:txBody>
+              <a:bodyPr/>
+              <a:lstStyle/>
+              <a:p>
+                <a:r>
+                  <a:rPr lang="en-US">
+                    <a:noFill/>
+                  </a:rPr>
+                  <a:t> </a:t>
+                </a:r>
+              </a:p>
+            </p:txBody>
+          </p:sp>
+        </mc:Fallback>
+      </mc:AlternateContent>
     </p:spTree>
     <p:extLst>
       <p:ext uri="{BB962C8B-B14F-4D97-AF65-F5344CB8AC3E}">
@@ -13414,8 +15167,16 @@
                   <a:buNone/>
                 </a:pPr>
                 <a:r>
+                  <a:rPr lang="en-US" b="0" dirty="0"/>
+                  <a:t>The learning brain (</a:t>
+                </a:r>
+                <a:r>
                   <a:rPr lang="en-US" dirty="0"/>
-                  <a:t>Considering a randomly generated model (</a:t>
+                  <a:t>our “ground truth”)</a:t>
+                </a:r>
+                <a:r>
+                  <a:rPr lang="en-US" b="0" dirty="0"/>
+                  <a:t> - </a:t>
                 </a:r>
                 <a14:m>
                   <m:oMath xmlns:m="http://schemas.openxmlformats.org/officeDocument/2006/math">
@@ -13444,14 +15205,12 @@
                         </m:r>
                       </m:sub>
                     </m:sSub>
-                  </m:oMath>
-                </a14:m>
-                <a:r>
-                  <a:rPr lang="en-US" dirty="0"/>
-                  <a:t>, our “ground truth”) to represent the brain, we will model the changes as a series of perturbations on </a:t>
-                </a:r>
-                <a14:m>
-                  <m:oMath xmlns:m="http://schemas.openxmlformats.org/officeDocument/2006/math">
+                    <m:r>
+                      <a:rPr lang="en-US" b="0" i="1" dirty="0" smtClean="0">
+                        <a:latin typeface="Cambria Math" panose="02040503050406030204" pitchFamily="18" charset="0"/>
+                      </a:rPr>
+                      <m:t>, </m:t>
+                    </m:r>
                     <m:sSub>
                       <m:sSubPr>
                         <m:ctrlPr>
@@ -13473,45 +15232,12 @@
                           <a:rPr lang="en-US" i="1" dirty="0">
                             <a:latin typeface="Cambria Math" panose="02040503050406030204" pitchFamily="18" charset="0"/>
                           </a:rPr>
-                          <m:t>0</m:t>
-                        </m:r>
-                      </m:sub>
-                    </m:sSub>
-                  </m:oMath>
-                </a14:m>
-                <a:r>
-                  <a:rPr lang="en-US" dirty="0"/>
-                  <a:t>, giving us  </a:t>
-                </a:r>
-                <a14:m>
-                  <m:oMath xmlns:m="http://schemas.openxmlformats.org/officeDocument/2006/math">
-                    <m:sSub>
-                      <m:sSubPr>
-                        <m:ctrlPr>
-                          <a:rPr lang="en-US" i="1" dirty="0">
-                            <a:latin typeface="Cambria Math" panose="02040503050406030204" pitchFamily="18" charset="0"/>
-                          </a:rPr>
-                        </m:ctrlPr>
-                      </m:sSubPr>
-                      <m:e>
-                        <m:r>
-                          <a:rPr lang="en-US" i="1" dirty="0">
-                            <a:latin typeface="Cambria Math" panose="02040503050406030204" pitchFamily="18" charset="0"/>
-                          </a:rPr>
-                          <m:t>𝑇</m:t>
-                        </m:r>
-                      </m:e>
-                      <m:sub>
-                        <m:r>
-                          <a:rPr lang="en-US" b="0" i="1" dirty="0" smtClean="0">
-                            <a:latin typeface="Cambria Math" panose="02040503050406030204" pitchFamily="18" charset="0"/>
-                          </a:rPr>
                           <m:t>1</m:t>
                         </m:r>
                       </m:sub>
                     </m:sSub>
                     <m:r>
-                      <a:rPr lang="en-US" b="0" i="1" dirty="0" smtClean="0">
+                      <a:rPr lang="en-US" i="1" dirty="0">
                         <a:latin typeface="Cambria Math" panose="02040503050406030204" pitchFamily="18" charset="0"/>
                       </a:rPr>
                       <m:t>,</m:t>
@@ -13534,7 +15260,7 @@
                       </m:e>
                       <m:sub>
                         <m:r>
-                          <a:rPr lang="en-US" b="0" i="1" dirty="0" smtClean="0">
+                          <a:rPr lang="en-US" i="1" dirty="0">
                             <a:latin typeface="Cambria Math" panose="02040503050406030204" pitchFamily="18" charset="0"/>
                           </a:rPr>
                           <m:t>2</m:t>
@@ -13542,7 +15268,7 @@
                       </m:sub>
                     </m:sSub>
                     <m:r>
-                      <a:rPr lang="en-US" b="0" i="1" dirty="0" smtClean="0">
+                      <a:rPr lang="en-US" i="1" dirty="0">
                         <a:latin typeface="Cambria Math" panose="02040503050406030204" pitchFamily="18" charset="0"/>
                       </a:rPr>
                       <m:t>…</m:t>
@@ -13565,21 +15291,20 @@
                       </m:e>
                       <m:sub>
                         <m:r>
-                          <a:rPr lang="en-US" b="0" i="1" dirty="0" smtClean="0">
+                          <a:rPr lang="en-US" i="1" dirty="0">
                             <a:latin typeface="Cambria Math" panose="02040503050406030204" pitchFamily="18" charset="0"/>
                           </a:rPr>
                           <m:t>𝑘</m:t>
                         </m:r>
                       </m:sub>
                     </m:sSub>
-                  </m:oMath>
-                </a14:m>
-                <a:r>
-                  <a:rPr lang="en-US" dirty="0"/>
-                  <a:t>  (</a:t>
-                </a:r>
-                <a14:m>
-                  <m:oMath xmlns:m="http://schemas.openxmlformats.org/officeDocument/2006/math">
+                    <m:r>
+                      <m:rPr>
+                        <m:nor/>
+                      </m:rPr>
+                      <a:rPr lang="en-US" dirty="0"/>
+                      <m:t>  (</m:t>
+                    </m:r>
                     <m:sSub>
                       <m:sSubPr>
                         <m:ctrlPr>
@@ -13612,7 +15337,7 @@
                       </m:e>
                       <m:sub>
                         <m:r>
-                          <a:rPr lang="en-US" sz="2400" b="0" i="1" kern="0" smtClean="0">
+                          <a:rPr lang="en-US" sz="2400" i="1" kern="0">
                             <a:uFill>
                               <a:solidFill>
                                 <a:srgbClr val="000000"/>
@@ -13626,23 +15351,22 @@
                         </m:r>
                       </m:sub>
                     </m:sSub>
-                  </m:oMath>
-                </a14:m>
-                <a:r>
-                  <a:rPr lang="en-US" sz="2400" kern="0" dirty="0">
-                    <a:uFill>
-                      <a:solidFill>
-                        <a:srgbClr val="000000"/>
-                      </a:solidFill>
-                    </a:uFill>
-                    <a:latin typeface="Calibri" panose="020F0502020204030204" pitchFamily="34" charset="0"/>
-                    <a:ea typeface="Arial Unicode MS" panose="020B0604020202020204" pitchFamily="34" charset="-128"/>
-                    <a:cs typeface="Arial Unicode MS" panose="020B0604020202020204" pitchFamily="34" charset="-128"/>
-                  </a:rPr>
-                  <a:t> = </a:t>
-                </a:r>
-                <a14:m>
-                  <m:oMath xmlns:m="http://schemas.openxmlformats.org/officeDocument/2006/math">
+                    <m:r>
+                      <m:rPr>
+                        <m:nor/>
+                      </m:rPr>
+                      <a:rPr lang="en-US" sz="2400" kern="0" dirty="0">
+                        <a:uFill>
+                          <a:solidFill>
+                            <a:srgbClr val="000000"/>
+                          </a:solidFill>
+                        </a:uFill>
+                        <a:latin typeface="Calibri" panose="020F0502020204030204" pitchFamily="34" charset="0"/>
+                        <a:ea typeface="Arial Unicode MS" panose="020B0604020202020204" pitchFamily="34" charset="-128"/>
+                        <a:cs typeface="Arial Unicode MS" panose="020B0604020202020204" pitchFamily="34" charset="-128"/>
+                      </a:rPr>
+                      <m:t> = </m:t>
+                    </m:r>
                     <m:sSub>
                       <m:sSubPr>
                         <m:ctrlPr>
@@ -13675,7 +15399,7 @@
                       </m:e>
                       <m:sub>
                         <m:r>
-                          <a:rPr lang="en-US" sz="2400" b="0" i="1" kern="0" smtClean="0">
+                          <a:rPr lang="en-US" sz="2400" i="1" kern="0">
                             <a:uFill>
                               <a:solidFill>
                                 <a:srgbClr val="000000"/>
@@ -13688,7 +15412,7 @@
                           <m:t>𝑖</m:t>
                         </m:r>
                         <m:r>
-                          <a:rPr lang="en-US" sz="2400" b="0" i="1" kern="0" smtClean="0">
+                          <a:rPr lang="en-US" sz="2400" i="1" kern="0">
                             <a:uFill>
                               <a:solidFill>
                                 <a:srgbClr val="000000"/>
@@ -13702,23 +15426,22 @@
                         </m:r>
                       </m:sub>
                     </m:sSub>
-                  </m:oMath>
-                </a14:m>
-                <a:r>
-                  <a:rPr lang="en-US" sz="2400" kern="0" dirty="0">
-                    <a:uFill>
-                      <a:solidFill>
-                        <a:srgbClr val="000000"/>
-                      </a:solidFill>
-                    </a:uFill>
-                    <a:latin typeface="Calibri" panose="020F0502020204030204" pitchFamily="34" charset="0"/>
-                    <a:ea typeface="Arial Unicode MS" panose="020B0604020202020204" pitchFamily="34" charset="-128"/>
-                    <a:cs typeface="Arial Unicode MS" panose="020B0604020202020204" pitchFamily="34" charset="-128"/>
-                  </a:rPr>
-                  <a:t> + </a:t>
-                </a:r>
-                <a14:m>
-                  <m:oMath xmlns:m="http://schemas.openxmlformats.org/officeDocument/2006/math">
+                    <m:r>
+                      <m:rPr>
+                        <m:nor/>
+                      </m:rPr>
+                      <a:rPr lang="en-US" sz="2400" kern="0" dirty="0">
+                        <a:uFill>
+                          <a:solidFill>
+                            <a:srgbClr val="000000"/>
+                          </a:solidFill>
+                        </a:uFill>
+                        <a:latin typeface="Calibri" panose="020F0502020204030204" pitchFamily="34" charset="0"/>
+                        <a:ea typeface="Arial Unicode MS" panose="020B0604020202020204" pitchFamily="34" charset="-128"/>
+                        <a:cs typeface="Arial Unicode MS" panose="020B0604020202020204" pitchFamily="34" charset="-128"/>
+                      </a:rPr>
+                      <m:t> + </m:t>
+                    </m:r>
                     <m:r>
                       <a:rPr lang="en-US" sz="2400" i="1" kern="0">
                         <a:uFill>
@@ -13732,12 +15455,89 @@
                       </a:rPr>
                       <m:t>𝜖</m:t>
                     </m:r>
+                    <m:r>
+                      <m:rPr>
+                        <m:nor/>
+                      </m:rPr>
+                      <a:rPr lang="en-US" dirty="0"/>
+                      <m:t>)</m:t>
+                    </m:r>
                   </m:oMath>
                 </a14:m>
+                <a:endParaRPr lang="en-US" dirty="0"/>
+              </a:p>
+              <a:p>
+                <a:pPr marL="0" indent="0">
+                  <a:buNone/>
+                </a:pPr>
+                <a:endParaRPr lang="en-US" sz="2400" u="none" strike="noStrike" kern="0" spc="0" dirty="0">
+                  <a:solidFill>
+                    <a:schemeClr val="tx1"/>
+                  </a:solidFill>
+                  <a:effectLst/>
+                  <a:uFill>
+                    <a:solidFill>
+                      <a:srgbClr val="000000"/>
+                    </a:solidFill>
+                  </a:uFill>
+                  <a:latin typeface="Calibri" panose="020F0502020204030204" pitchFamily="34" charset="0"/>
+                  <a:ea typeface="Arial Unicode MS" panose="020B0604020202020204" pitchFamily="34" charset="-128"/>
+                  <a:cs typeface="Arial Unicode MS" panose="020B0604020202020204" pitchFamily="34" charset="-128"/>
+                </a:endParaRPr>
+              </a:p>
+              <a:p>
+                <a:pPr marL="0" indent="0">
+                  <a:buNone/>
+                </a:pPr>
                 <a:r>
-                  <a:rPr lang="en-US" dirty="0"/>
-                  <a:t>)</a:t>
+                  <a:rPr lang="en-US" sz="2400" kern="0" dirty="0">
+                    <a:uFill>
+                      <a:solidFill>
+                        <a:srgbClr val="000000"/>
+                      </a:solidFill>
+                    </a:uFill>
+                    <a:latin typeface="Calibri" panose="020F0502020204030204" pitchFamily="34" charset="0"/>
+                    <a:ea typeface="Arial Unicode MS" panose="020B0604020202020204" pitchFamily="34" charset="-128"/>
+                    <a:cs typeface="Arial Unicode MS" panose="020B0604020202020204" pitchFamily="34" charset="-128"/>
+                  </a:rPr>
+                  <a:t>Our t</a:t>
                 </a:r>
+                <a:r>
+                  <a:rPr lang="en-US" sz="2400" u="none" strike="noStrike" kern="0" spc="0" dirty="0">
+                    <a:solidFill>
+                      <a:schemeClr val="tx1"/>
+                    </a:solidFill>
+                    <a:effectLst/>
+                    <a:uFill>
+                      <a:solidFill>
+                        <a:srgbClr val="000000"/>
+                      </a:solidFill>
+                    </a:uFill>
+                    <a:latin typeface="Calibri" panose="020F0502020204030204" pitchFamily="34" charset="0"/>
+                    <a:ea typeface="Arial Unicode MS" panose="020B0604020202020204" pitchFamily="34" charset="-128"/>
+                    <a:cs typeface="Arial Unicode MS" panose="020B0604020202020204" pitchFamily="34" charset="-128"/>
+                  </a:rPr>
+                  <a:t>raining approach = curriculum </a:t>
+                </a:r>
+              </a:p>
+              <a:p>
+                <a:pPr marL="0" indent="0">
+                  <a:buNone/>
+                </a:pPr>
+                <a:endParaRPr lang="en-US" sz="2400" u="none" strike="noStrike" kern="0" spc="0" dirty="0">
+                  <a:solidFill>
+                    <a:schemeClr val="tx1"/>
+                  </a:solidFill>
+                  <a:effectLst/>
+                  <a:uFill>
+                    <a:solidFill>
+                      <a:srgbClr val="000000"/>
+                    </a:solidFill>
+                  </a:uFill>
+                  <a:latin typeface="Calibri" panose="020F0502020204030204" pitchFamily="34" charset="0"/>
+                  <a:ea typeface="Arial Unicode MS" panose="020B0604020202020204" pitchFamily="34" charset="-128"/>
+                  <a:cs typeface="Arial Unicode MS" panose="020B0604020202020204" pitchFamily="34" charset="-128"/>
+                </a:endParaRPr>
               </a:p>
               <a:p>
                 <a:pPr marL="0" indent="0">
@@ -13758,7 +15558,7 @@
                     <a:ea typeface="Arial Unicode MS" panose="020B0604020202020204" pitchFamily="34" charset="-128"/>
                     <a:cs typeface="Arial Unicode MS" panose="020B0604020202020204" pitchFamily="34" charset="-128"/>
                   </a:rPr>
-                  <a:t>We want to start by training students with several different curricula, </a:t>
+                  <a:t>Students -  </a:t>
                 </a:r>
                 <a14:m>
                   <m:oMath xmlns:m="http://schemas.openxmlformats.org/officeDocument/2006/math">
@@ -14137,7 +15937,7 @@
                     <a:ea typeface="Arial Unicode MS" panose="020B0604020202020204" pitchFamily="34" charset="-128"/>
                     <a:cs typeface="Arial Unicode MS" panose="020B0604020202020204" pitchFamily="34" charset="-128"/>
                   </a:rPr>
-                  <a:t> respectively on </a:t>
+                  <a:t> trained on </a:t>
                 </a:r>
                 <a14:m>
                   <m:oMath xmlns:m="http://schemas.openxmlformats.org/officeDocument/2006/math">
@@ -14516,8 +16316,27 @@
                     <a:ea typeface="Arial Unicode MS" panose="020B0604020202020204" pitchFamily="34" charset="-128"/>
                     <a:cs typeface="Arial Unicode MS" panose="020B0604020202020204" pitchFamily="34" charset="-128"/>
                   </a:rPr>
-                  <a:t> and so on...</a:t>
+                  <a:t> …</a:t>
                 </a:r>
+              </a:p>
+              <a:p>
+                <a:pPr marL="0" indent="0">
+                  <a:buNone/>
+                </a:pPr>
+                <a:endParaRPr lang="en-US" sz="2400" u="none" strike="noStrike" kern="0" spc="0" dirty="0">
+                  <a:solidFill>
+                    <a:schemeClr val="tx1"/>
+                  </a:solidFill>
+                  <a:effectLst/>
+                  <a:uFill>
+                    <a:solidFill>
+                      <a:srgbClr val="000000"/>
+                    </a:solidFill>
+                  </a:uFill>
+                  <a:latin typeface="Calibri" panose="020F0502020204030204" pitchFamily="34" charset="0"/>
+                  <a:ea typeface="Arial Unicode MS" panose="020B0604020202020204" pitchFamily="34" charset="-128"/>
+                  <a:cs typeface="Arial Unicode MS" panose="020B0604020202020204" pitchFamily="34" charset="-128"/>
+                </a:endParaRPr>
               </a:p>
               <a:p>
                 <a:pPr marL="0" indent="0">
@@ -14538,30 +16357,57 @@
                     <a:ea typeface="Arial Unicode MS" panose="020B0604020202020204" pitchFamily="34" charset="-128"/>
                     <a:cs typeface="Arial Unicode MS" panose="020B0604020202020204" pitchFamily="34" charset="-128"/>
                   </a:rPr>
-                  <a:t>Repeat each curriculum with many randomly initialized students.</a:t>
+                  <a:t>Evaluate on unseen </a:t>
                 </a:r>
-              </a:p>
-              <a:p>
-                <a:pPr marL="0" indent="0">
-                  <a:buNone/>
-                </a:pPr>
-                <a:r>
-                  <a:rPr lang="en-US" sz="2400" u="none" strike="noStrike" kern="0" spc="0" dirty="0">
+                <a14:m>
+                  <m:oMath xmlns:m="http://schemas.openxmlformats.org/officeDocument/2006/math">
+                    <m:sSub>
+                      <m:sSubPr>
+                        <m:ctrlPr>
+                          <a:rPr lang="en-US" sz="2400" i="1" dirty="0" smtClean="0">
+                            <a:latin typeface="Cambria Math" panose="02040503050406030204" pitchFamily="18" charset="0"/>
+                          </a:rPr>
+                        </m:ctrlPr>
+                      </m:sSubPr>
+                      <m:e>
+                        <m:r>
+                          <a:rPr lang="en-US" sz="2400" i="1" dirty="0">
+                            <a:latin typeface="Cambria Math" panose="02040503050406030204" pitchFamily="18" charset="0"/>
+                          </a:rPr>
+                          <m:t>𝑇</m:t>
+                        </m:r>
+                      </m:e>
+                      <m:sub>
+                        <m:r>
+                          <a:rPr lang="en-US" sz="2400" i="1" dirty="0">
+                            <a:latin typeface="Cambria Math" panose="02040503050406030204" pitchFamily="18" charset="0"/>
+                          </a:rPr>
+                          <m:t>𝑘</m:t>
+                        </m:r>
+                        <m:r>
+                          <a:rPr lang="en-US" sz="2400" b="0" i="1" dirty="0" smtClean="0">
+                            <a:latin typeface="Cambria Math" panose="02040503050406030204" pitchFamily="18" charset="0"/>
+                          </a:rPr>
+                          <m:t>+1</m:t>
+                        </m:r>
+                      </m:sub>
+                    </m:sSub>
+                  </m:oMath>
+                </a14:m>
+                <a:endParaRPr lang="en-US" sz="2400" u="none" strike="noStrike" kern="0" spc="0" dirty="0">
+                  <a:solidFill>
+                    <a:schemeClr val="tx1"/>
+                  </a:solidFill>
+                  <a:effectLst/>
+                  <a:uFill>
                     <a:solidFill>
-                      <a:schemeClr val="tx1"/>
+                      <a:srgbClr val="000000"/>
                     </a:solidFill>
-                    <a:effectLst/>
-                    <a:uFill>
-                      <a:solidFill>
-                        <a:srgbClr val="000000"/>
-                      </a:solidFill>
-                    </a:uFill>
-                    <a:latin typeface="Calibri" panose="020F0502020204030204" pitchFamily="34" charset="0"/>
-                    <a:ea typeface="Arial Unicode MS" panose="020B0604020202020204" pitchFamily="34" charset="-128"/>
-                    <a:cs typeface="Arial Unicode MS" panose="020B0604020202020204" pitchFamily="34" charset="-128"/>
-                  </a:rPr>
-                  <a:t>Evaluate students 𝑆_1,𝑆_11,𝑆_12,𝑆_2, "and" 𝑆_22 on an unseen teacher 𝑇_3</a:t>
-                </a:r>
+                  </a:uFill>
+                  <a:latin typeface="Calibri" panose="020F0502020204030204" pitchFamily="34" charset="0"/>
+                  <a:ea typeface="Arial Unicode MS" panose="020B0604020202020204" pitchFamily="34" charset="-128"/>
+                  <a:cs typeface="Arial Unicode MS" panose="020B0604020202020204" pitchFamily="34" charset="-128"/>
+                </a:endParaRPr>
               </a:p>
               <a:p>
                 <a:pPr marL="0" indent="0">
@@ -14636,9 +16482,9 @@
                 <a:ext cx="9486690" cy="3926152"/>
               </a:xfrm>
               <a:blipFill>
-                <a:blip r:embed="rId2"/>
+                <a:blip r:embed="rId3"/>
                 <a:stretch>
-                  <a:fillRect l="-935" t="-645"/>
+                  <a:fillRect l="-935" t="-1290"/>
                 </a:stretch>
               </a:blipFill>
             </p:spPr>
@@ -14743,7 +16589,13 @@
           <a:p>
             <a:r>
               <a:rPr lang="en-US" dirty="0"/>
-              <a:t>After familiarizing myself with the framework, I began comparing different settings and training methods for the students. </a:t>
+              <a:t>Remove 3D, add 2Ds instead</a:t>
+            </a:r>
+          </a:p>
+          <a:p>
+            <a:r>
+              <a:rPr lang="en-US" dirty="0"/>
+              <a:t>*build up the right graph, start with less busy notations</a:t>
             </a:r>
           </a:p>
           <a:p>
@@ -18373,12 +20225,8 @@
           <a:lstStyle/>
           <a:p>
             <a:r>
-              <a:rPr lang="en-US"/>
-              <a:t>Students </a:t>
-            </a:r>
-            <a:r>
               <a:rPr lang="en-US" dirty="0"/>
-              <a:t>with varying of states</a:t>
+              <a:t>Students with varying of states</a:t>
             </a:r>
           </a:p>
         </p:txBody>
@@ -18516,7 +20364,53 @@
                     <a:ea typeface="Arial Unicode MS" panose="020B0604020202020204" pitchFamily="34" charset="-128"/>
                     <a:cs typeface="Arial Unicode MS" panose="020B0604020202020204" pitchFamily="34" charset="-128"/>
                   </a:rPr>
-                  <a:t>Generalize the training to more complex curricula </a:t>
+                  <a:t>C</a:t>
+                </a:r>
+                <a:r>
+                  <a:rPr lang="en-US" sz="2000" kern="0" dirty="0">
+                    <a:uFill>
+                      <a:solidFill>
+                        <a:srgbClr val="000000"/>
+                      </a:solidFill>
+                    </a:uFill>
+                    <a:latin typeface="Calibri" panose="020F0502020204030204" pitchFamily="34" charset="0"/>
+                    <a:ea typeface="Arial Unicode MS" panose="020B0604020202020204" pitchFamily="34" charset="-128"/>
+                    <a:cs typeface="Arial Unicode MS" panose="020B0604020202020204" pitchFamily="34" charset="-128"/>
+                  </a:rPr>
+                  <a:t>alculate trajectory</a:t>
+                </a:r>
+                <a:endParaRPr lang="en-US" sz="2000" u="none" strike="noStrike" kern="0" spc="0" dirty="0">
+                  <a:solidFill>
+                    <a:schemeClr val="tx1"/>
+                  </a:solidFill>
+                  <a:effectLst/>
+                  <a:uFill>
+                    <a:solidFill>
+                      <a:srgbClr val="000000"/>
+                    </a:solidFill>
+                  </a:uFill>
+                  <a:latin typeface="Calibri" panose="020F0502020204030204" pitchFamily="34" charset="0"/>
+                  <a:ea typeface="Arial Unicode MS" panose="020B0604020202020204" pitchFamily="34" charset="-128"/>
+                  <a:cs typeface="Arial Unicode MS" panose="020B0604020202020204" pitchFamily="34" charset="-128"/>
+                </a:endParaRPr>
+              </a:p>
+              <a:p>
+                <a:r>
+                  <a:rPr lang="en-US" sz="2000" u="none" strike="noStrike" kern="0" spc="0" dirty="0">
+                    <a:solidFill>
+                      <a:schemeClr val="tx1"/>
+                    </a:solidFill>
+                    <a:effectLst/>
+                    <a:uFill>
+                      <a:solidFill>
+                        <a:srgbClr val="000000"/>
+                      </a:solidFill>
+                    </a:uFill>
+                    <a:latin typeface="Calibri" panose="020F0502020204030204" pitchFamily="34" charset="0"/>
+                    <a:ea typeface="Arial Unicode MS" panose="020B0604020202020204" pitchFamily="34" charset="-128"/>
+                    <a:cs typeface="Arial Unicode MS" panose="020B0604020202020204" pitchFamily="34" charset="-128"/>
+                  </a:rPr>
+                  <a:t>More complex curricula </a:t>
                 </a:r>
                 <a14:m>
                   <m:oMath xmlns:m="http://schemas.openxmlformats.org/officeDocument/2006/math">
@@ -18983,55 +20877,7 @@
                     <a:ea typeface="Arial Unicode MS" panose="020B0604020202020204" pitchFamily="34" charset="-128"/>
                     <a:cs typeface="Arial Unicode MS" panose="020B0604020202020204" pitchFamily="34" charset="-128"/>
                   </a:rPr>
-                  <a:t> Then, perhaps, we’ll choose the likelihood over </a:t>
-                </a:r>
-                <a14:m>
-                  <m:oMath xmlns:m="http://schemas.openxmlformats.org/officeDocument/2006/math">
-                    <m:sSub>
-                      <m:sSubPr>
-                        <m:ctrlPr>
-                          <a:rPr lang="en-US" sz="2000" i="1" dirty="0">
-                            <a:latin typeface="Cambria Math" panose="02040503050406030204" pitchFamily="18" charset="0"/>
-                          </a:rPr>
-                        </m:ctrlPr>
-                      </m:sSubPr>
-                      <m:e>
-                        <m:r>
-                          <a:rPr lang="en-US" sz="2000" i="1" dirty="0">
-                            <a:latin typeface="Cambria Math" panose="02040503050406030204" pitchFamily="18" charset="0"/>
-                          </a:rPr>
-                          <m:t>𝑇</m:t>
-                        </m:r>
-                      </m:e>
-                      <m:sub>
-                        <m:r>
-                          <a:rPr lang="en-US" sz="2000" i="1" dirty="0">
-                            <a:latin typeface="Cambria Math" panose="02040503050406030204" pitchFamily="18" charset="0"/>
-                          </a:rPr>
-                          <m:t>𝑘</m:t>
-                        </m:r>
-                      </m:sub>
-                    </m:sSub>
-                    <m:r>
-                      <a:rPr lang="en-US" sz="2000" i="1" dirty="0">
-                        <a:latin typeface="Cambria Math" panose="02040503050406030204" pitchFamily="18" charset="0"/>
-                      </a:rPr>
-                      <m:t> </m:t>
-                    </m:r>
-                  </m:oMath>
-                </a14:m>
-                <a:r>
-                  <a:rPr lang="en-US" sz="2000" kern="0" dirty="0">
-                    <a:uFill>
-                      <a:solidFill>
-                        <a:srgbClr val="000000"/>
-                      </a:solidFill>
-                    </a:uFill>
-                    <a:latin typeface="Calibri" panose="020F0502020204030204" pitchFamily="34" charset="0"/>
-                    <a:ea typeface="Arial Unicode MS" panose="020B0604020202020204" pitchFamily="34" charset="-128"/>
-                    <a:cs typeface="Arial Unicode MS" panose="020B0604020202020204" pitchFamily="34" charset="-128"/>
-                  </a:rPr>
-                  <a:t> as one of the axes. For the other/s there are several options. One could be the highest likelihood each model had over any of the models (the detect if ”overfitting” helped), and a third one could simply be a discrete grid [1…k] representing the teacher’s num over which the likelihood of each model was the best.</a:t>
+                  <a:t> </a:t>
                 </a:r>
               </a:p>
               <a:p>
@@ -19078,32 +20924,7 @@
                     <a:ea typeface="Arial Unicode MS" panose="020B0604020202020204" pitchFamily="34" charset="-128"/>
                     <a:cs typeface="Arial Unicode MS" panose="020B0604020202020204" pitchFamily="34" charset="-128"/>
                   </a:rPr>
-                  <a:t>Generalize all the hyper-parameters and try several values for comparison. </a:t>
-                </a:r>
-                <a:br>
-                  <a:rPr lang="en-US" sz="2000" kern="0" dirty="0">
-                    <a:uFill>
-                      <a:solidFill>
-                        <a:srgbClr val="000000"/>
-                      </a:solidFill>
-                    </a:uFill>
-                    <a:latin typeface="Calibri" panose="020F0502020204030204" pitchFamily="34" charset="0"/>
-                    <a:ea typeface="Arial Unicode MS" panose="020B0604020202020204" pitchFamily="34" charset="-128"/>
-                    <a:cs typeface="Arial Unicode MS" panose="020B0604020202020204" pitchFamily="34" charset="-128"/>
-                  </a:rPr>
-                </a:br>
-                <a:r>
-                  <a:rPr lang="en-US" sz="2000" kern="0" dirty="0">
-                    <a:uFill>
-                      <a:solidFill>
-                        <a:srgbClr val="000000"/>
-                      </a:solidFill>
-                    </a:uFill>
-                    <a:latin typeface="Calibri" panose="020F0502020204030204" pitchFamily="34" charset="0"/>
-                    <a:ea typeface="Arial Unicode MS" panose="020B0604020202020204" pitchFamily="34" charset="-128"/>
-                    <a:cs typeface="Arial Unicode MS" panose="020B0604020202020204" pitchFamily="34" charset="-128"/>
-                  </a:rPr>
-                  <a:t>Hyper-parameters include:</a:t>
+                  <a:t>Generalize hyper-parameters:</a:t>
                 </a:r>
               </a:p>
               <a:p>
@@ -19122,7 +20943,7 @@
                     <a:ea typeface="Arial Unicode MS" panose="020B0604020202020204" pitchFamily="34" charset="-128"/>
                     <a:cs typeface="Arial Unicode MS" panose="020B0604020202020204" pitchFamily="34" charset="-128"/>
                   </a:rPr>
-                  <a:t>Num of states teachers have</a:t>
+                  <a:t>Teachers’ size</a:t>
                 </a:r>
               </a:p>
               <a:p>
@@ -19141,7 +20962,7 @@
                     <a:ea typeface="Arial Unicode MS" panose="020B0604020202020204" pitchFamily="34" charset="-128"/>
                     <a:cs typeface="Arial Unicode MS" panose="020B0604020202020204" pitchFamily="34" charset="-128"/>
                   </a:rPr>
-                  <a:t>Emissions dimensions </a:t>
+                  <a:t>Emissions’ dimensions </a:t>
                 </a:r>
               </a:p>
               <a:p>
@@ -19160,27 +20981,116 @@
                     <a:ea typeface="Arial Unicode MS" panose="020B0604020202020204" pitchFamily="34" charset="-128"/>
                     <a:cs typeface="Arial Unicode MS" panose="020B0604020202020204" pitchFamily="34" charset="-128"/>
                   </a:rPr>
-                  <a:t>Perturbation types (right now some of the perturbations are diagonal matrices)</a:t>
+                  <a:t>Perturbation types (</a:t>
                 </a:r>
-              </a:p>
-              <a:p>
-                <a:pPr marL="0" indent="0">
-                  <a:buNone/>
-                </a:pPr>
-                <a:endParaRPr lang="en-US" sz="2000" u="none" strike="noStrike" kern="0" spc="0" dirty="0">
-                  <a:solidFill>
-                    <a:schemeClr val="tx1"/>
-                  </a:solidFill>
-                  <a:effectLst/>
-                  <a:uFill>
+                <a14:m>
+                  <m:oMath xmlns:m="http://schemas.openxmlformats.org/officeDocument/2006/math">
+                    <m:sSub>
+                      <m:sSubPr>
+                        <m:ctrlPr>
+                          <a:rPr lang="en-US" sz="2000" i="1" dirty="0">
+                            <a:latin typeface="Cambria Math" panose="02040503050406030204" pitchFamily="18" charset="0"/>
+                          </a:rPr>
+                        </m:ctrlPr>
+                      </m:sSubPr>
+                      <m:e>
+                        <m:r>
+                          <a:rPr lang="en-US" sz="2000" i="1" dirty="0">
+                            <a:latin typeface="Cambria Math" panose="02040503050406030204" pitchFamily="18" charset="0"/>
+                          </a:rPr>
+                          <m:t>𝑇</m:t>
+                        </m:r>
+                      </m:e>
+                      <m:sub>
+                        <m:r>
+                          <a:rPr lang="en-US" sz="2000" i="1" dirty="0">
+                            <a:latin typeface="Cambria Math" panose="02040503050406030204" pitchFamily="18" charset="0"/>
+                          </a:rPr>
+                          <m:t>1</m:t>
+                        </m:r>
+                      </m:sub>
+                    </m:sSub>
+                    <m:r>
+                      <a:rPr lang="en-US" sz="2000" i="1" dirty="0">
+                        <a:latin typeface="Cambria Math" panose="02040503050406030204" pitchFamily="18" charset="0"/>
+                      </a:rPr>
+                      <m:t>,</m:t>
+                    </m:r>
+                    <m:sSub>
+                      <m:sSubPr>
+                        <m:ctrlPr>
+                          <a:rPr lang="en-US" sz="2000" i="1" dirty="0">
+                            <a:latin typeface="Cambria Math" panose="02040503050406030204" pitchFamily="18" charset="0"/>
+                          </a:rPr>
+                        </m:ctrlPr>
+                      </m:sSubPr>
+                      <m:e>
+                        <m:r>
+                          <a:rPr lang="en-US" sz="2000" i="1" dirty="0">
+                            <a:latin typeface="Cambria Math" panose="02040503050406030204" pitchFamily="18" charset="0"/>
+                          </a:rPr>
+                          <m:t>𝑇</m:t>
+                        </m:r>
+                      </m:e>
+                      <m:sub>
+                        <m:r>
+                          <a:rPr lang="en-US" sz="2000" i="1" dirty="0">
+                            <a:latin typeface="Cambria Math" panose="02040503050406030204" pitchFamily="18" charset="0"/>
+                          </a:rPr>
+                          <m:t>2</m:t>
+                        </m:r>
+                      </m:sub>
+                    </m:sSub>
+                    <m:r>
+                      <a:rPr lang="en-US" sz="2000" i="1" dirty="0">
+                        <a:latin typeface="Cambria Math" panose="02040503050406030204" pitchFamily="18" charset="0"/>
+                      </a:rPr>
+                      <m:t>…</m:t>
+                    </m:r>
+                    <m:sSub>
+                      <m:sSubPr>
+                        <m:ctrlPr>
+                          <a:rPr lang="en-US" sz="2000" i="1" dirty="0">
+                            <a:latin typeface="Cambria Math" panose="02040503050406030204" pitchFamily="18" charset="0"/>
+                          </a:rPr>
+                        </m:ctrlPr>
+                      </m:sSubPr>
+                      <m:e>
+                        <m:r>
+                          <a:rPr lang="en-US" sz="2000" i="1" dirty="0">
+                            <a:latin typeface="Cambria Math" panose="02040503050406030204" pitchFamily="18" charset="0"/>
+                          </a:rPr>
+                          <m:t>𝑇</m:t>
+                        </m:r>
+                      </m:e>
+                      <m:sub>
+                        <m:r>
+                          <a:rPr lang="en-US" sz="2000" i="1" dirty="0">
+                            <a:latin typeface="Cambria Math" panose="02040503050406030204" pitchFamily="18" charset="0"/>
+                          </a:rPr>
+                          <m:t>𝑘</m:t>
+                        </m:r>
+                      </m:sub>
+                    </m:sSub>
+                  </m:oMath>
+                </a14:m>
+                <a:r>
+                  <a:rPr lang="en-US" sz="2000" u="none" strike="noStrike" kern="0" spc="0" dirty="0">
                     <a:solidFill>
-                      <a:srgbClr val="000000"/>
+                      <a:schemeClr val="tx1"/>
                     </a:solidFill>
-                  </a:uFill>
-                  <a:latin typeface="Calibri" panose="020F0502020204030204" pitchFamily="34" charset="0"/>
-                  <a:ea typeface="Arial Unicode MS" panose="020B0604020202020204" pitchFamily="34" charset="-128"/>
-                  <a:cs typeface="Arial Unicode MS" panose="020B0604020202020204" pitchFamily="34" charset="-128"/>
-                </a:endParaRPr>
+                    <a:effectLst/>
+                    <a:uFill>
+                      <a:solidFill>
+                        <a:srgbClr val="000000"/>
+                      </a:solidFill>
+                    </a:uFill>
+                    <a:latin typeface="Calibri" panose="020F0502020204030204" pitchFamily="34" charset="0"/>
+                    <a:ea typeface="Arial Unicode MS" panose="020B0604020202020204" pitchFamily="34" charset="-128"/>
+                    <a:cs typeface="Arial Unicode MS" panose="020B0604020202020204" pitchFamily="34" charset="-128"/>
+                  </a:rPr>
+                  <a:t> from gradient descent)</a:t>
+                </a:r>
               </a:p>
             </p:txBody>
           </p:sp>
@@ -19208,9 +21118,9 @@
                 <a:ext cx="9987256" cy="4703417"/>
               </a:xfrm>
               <a:blipFill>
-                <a:blip r:embed="rId2"/>
+                <a:blip r:embed="rId3"/>
                 <a:stretch>
-                  <a:fillRect l="-508" t="-269" r="-1015"/>
+                  <a:fillRect l="-508" t="-269"/>
                 </a:stretch>
               </a:blipFill>
             </p:spPr>

</xml_diff>